<commit_message>
causeway logo asf candidates
</commit_message>
<xml_diff>
--- a/antora/supplemental-ui/img/home/causeway-logo.pptx
+++ b/antora/supplemental-ui/img/home/causeway-logo.pptx
@@ -5,10 +5,18 @@
     <p:sldMasterId id="2147483780" r:id="rId1"/>
   </p:sldMasterIdLst>
   <p:notesMasterIdLst>
-    <p:notesMasterId r:id="rId3"/>
+    <p:notesMasterId r:id="rId11"/>
   </p:notesMasterIdLst>
   <p:sldIdLst>
     <p:sldId id="270" r:id="rId2"/>
+    <p:sldId id="281" r:id="rId3"/>
+    <p:sldId id="279" r:id="rId4"/>
+    <p:sldId id="280" r:id="rId5"/>
+    <p:sldId id="277" r:id="rId6"/>
+    <p:sldId id="278" r:id="rId7"/>
+    <p:sldId id="275" r:id="rId8"/>
+    <p:sldId id="276" r:id="rId9"/>
+    <p:sldId id="274" r:id="rId10"/>
   </p:sldIdLst>
   <p:sldSz cx="5759450" cy="4279900"/>
   <p:notesSz cx="7077075" cy="9363075"/>
@@ -110,13 +118,26 @@
   <p:extLst>
     <p:ext uri="{521415D9-36F7-43E2-AB2F-B90AF26B5E84}">
       <p14:sectionLst xmlns:p14="http://schemas.microsoft.com/office/powerpoint/2010/main">
-        <p14:section name="selected" id="{1A2DAAEF-A24D-4989-A740-AA401E0139D1}">
+        <p14:section name="current" id="{1A2DAAEF-A24D-4989-A740-AA401E0139D1}">
           <p14:sldIdLst>
             <p14:sldId id="270"/>
           </p14:sldIdLst>
         </p14:section>
-        <p14:section name="rejected ..." id="{426C8A0A-A020-45D3-A84C-61E4393A51A7}">
-          <p14:sldIdLst/>
+        <p14:section name="asf candidates" id="{426C8A0A-A020-45D3-A84C-61E4393A51A7}">
+          <p14:sldIdLst>
+            <p14:sldId id="281"/>
+            <p14:sldId id="279"/>
+          </p14:sldIdLst>
+        </p14:section>
+        <p14:section name="asf version rejects" id="{3ADF3438-BA67-46F1-A802-4CFFB429484F}">
+          <p14:sldIdLst>
+            <p14:sldId id="280"/>
+            <p14:sldId id="277"/>
+            <p14:sldId id="278"/>
+            <p14:sldId id="275"/>
+            <p14:sldId id="276"/>
+            <p14:sldId id="274"/>
+          </p14:sldIdLst>
         </p14:section>
       </p14:sectionLst>
     </p:ext>
@@ -2233,7 +2254,7 @@
           <a:p>
             <a:fld id="{9CE68B46-7DAB-46E1-BB37-1AB0860C476C}" type="datetimeFigureOut">
               <a:rPr lang="en-GB" smtClean="0"/>
-              <a:t>29/01/2023</a:t>
+              <a:t>23/02/2023</a:t>
             </a:fld>
             <a:endParaRPr lang="en-GB"/>
           </a:p>
@@ -2632,7 +2653,7 @@
           <a:p>
             <a:fld id="{00FED85C-4F06-49A0-B339-8C08B1EAAF5D}" type="datetimeFigureOut">
               <a:rPr lang="en-GB" smtClean="0"/>
-              <a:t>29/01/2023</a:t>
+              <a:t>23/02/2023</a:t>
             </a:fld>
             <a:endParaRPr lang="en-GB"/>
           </a:p>
@@ -2802,7 +2823,7 @@
           <a:p>
             <a:fld id="{00FED85C-4F06-49A0-B339-8C08B1EAAF5D}" type="datetimeFigureOut">
               <a:rPr lang="en-GB" smtClean="0"/>
-              <a:t>29/01/2023</a:t>
+              <a:t>23/02/2023</a:t>
             </a:fld>
             <a:endParaRPr lang="en-GB"/>
           </a:p>
@@ -2982,7 +3003,7 @@
           <a:p>
             <a:fld id="{00FED85C-4F06-49A0-B339-8C08B1EAAF5D}" type="datetimeFigureOut">
               <a:rPr lang="en-GB" smtClean="0"/>
-              <a:t>29/01/2023</a:t>
+              <a:t>23/02/2023</a:t>
             </a:fld>
             <a:endParaRPr lang="en-GB"/>
           </a:p>
@@ -3152,7 +3173,7 @@
           <a:p>
             <a:fld id="{00FED85C-4F06-49A0-B339-8C08B1EAAF5D}" type="datetimeFigureOut">
               <a:rPr lang="en-GB" smtClean="0"/>
-              <a:t>29/01/2023</a:t>
+              <a:t>23/02/2023</a:t>
             </a:fld>
             <a:endParaRPr lang="en-GB"/>
           </a:p>
@@ -3396,7 +3417,7 @@
           <a:p>
             <a:fld id="{00FED85C-4F06-49A0-B339-8C08B1EAAF5D}" type="datetimeFigureOut">
               <a:rPr lang="en-GB" smtClean="0"/>
-              <a:t>29/01/2023</a:t>
+              <a:t>23/02/2023</a:t>
             </a:fld>
             <a:endParaRPr lang="en-GB"/>
           </a:p>
@@ -3628,7 +3649,7 @@
           <a:p>
             <a:fld id="{00FED85C-4F06-49A0-B339-8C08B1EAAF5D}" type="datetimeFigureOut">
               <a:rPr lang="en-GB" smtClean="0"/>
-              <a:t>29/01/2023</a:t>
+              <a:t>23/02/2023</a:t>
             </a:fld>
             <a:endParaRPr lang="en-GB"/>
           </a:p>
@@ -3995,7 +4016,7 @@
           <a:p>
             <a:fld id="{00FED85C-4F06-49A0-B339-8C08B1EAAF5D}" type="datetimeFigureOut">
               <a:rPr lang="en-GB" smtClean="0"/>
-              <a:t>29/01/2023</a:t>
+              <a:t>23/02/2023</a:t>
             </a:fld>
             <a:endParaRPr lang="en-GB"/>
           </a:p>
@@ -4113,7 +4134,7 @@
           <a:p>
             <a:fld id="{00FED85C-4F06-49A0-B339-8C08B1EAAF5D}" type="datetimeFigureOut">
               <a:rPr lang="en-GB" smtClean="0"/>
-              <a:t>29/01/2023</a:t>
+              <a:t>23/02/2023</a:t>
             </a:fld>
             <a:endParaRPr lang="en-GB"/>
           </a:p>
@@ -4208,7 +4229,7 @@
           <a:p>
             <a:fld id="{00FED85C-4F06-49A0-B339-8C08B1EAAF5D}" type="datetimeFigureOut">
               <a:rPr lang="en-GB" smtClean="0"/>
-              <a:t>29/01/2023</a:t>
+              <a:t>23/02/2023</a:t>
             </a:fld>
             <a:endParaRPr lang="en-GB"/>
           </a:p>
@@ -4485,7 +4506,7 @@
           <a:p>
             <a:fld id="{00FED85C-4F06-49A0-B339-8C08B1EAAF5D}" type="datetimeFigureOut">
               <a:rPr lang="en-GB" smtClean="0"/>
-              <a:t>29/01/2023</a:t>
+              <a:t>23/02/2023</a:t>
             </a:fld>
             <a:endParaRPr lang="en-GB"/>
           </a:p>
@@ -4742,7 +4763,7 @@
           <a:p>
             <a:fld id="{00FED85C-4F06-49A0-B339-8C08B1EAAF5D}" type="datetimeFigureOut">
               <a:rPr lang="en-GB" smtClean="0"/>
-              <a:t>29/01/2023</a:t>
+              <a:t>23/02/2023</a:t>
             </a:fld>
             <a:endParaRPr lang="en-GB"/>
           </a:p>
@@ -4955,7 +4976,7 @@
           <a:p>
             <a:fld id="{00FED85C-4F06-49A0-B339-8C08B1EAAF5D}" type="datetimeFigureOut">
               <a:rPr lang="en-GB" smtClean="0"/>
-              <a:t>29/01/2023</a:t>
+              <a:t>23/02/2023</a:t>
             </a:fld>
             <a:endParaRPr lang="en-GB"/>
           </a:p>
@@ -5771,7 +5792,7 @@
           <a:lstStyle/>
           <a:p>
             <a:r>
-              <a:rPr lang="en-GB" sz="9644" b="1" err="1">
+              <a:rPr lang="en-GB" sz="9644" b="1">
                 <a:solidFill>
                   <a:srgbClr val="5AB1BB"/>
                 </a:solidFill>
@@ -5782,7 +5803,7 @@
               <a:t>apa</a:t>
             </a:r>
             <a:r>
-              <a:rPr lang="en-GB" sz="9644" b="1" err="1">
+              <a:rPr lang="en-GB" sz="9644" b="1">
                 <a:solidFill>
                   <a:srgbClr val="7F7F7F"/>
                 </a:solidFill>
@@ -5793,7 +5814,7 @@
               <a:t>c</a:t>
             </a:r>
             <a:r>
-              <a:rPr lang="en-GB" sz="9644" b="1" err="1">
+              <a:rPr lang="en-GB" sz="9644" b="1">
                 <a:solidFill>
                   <a:srgbClr val="5AB1BB"/>
                 </a:solidFill>
@@ -5803,14 +5824,6 @@
               </a:rPr>
               <a:t>he</a:t>
             </a:r>
-            <a:endParaRPr lang="en-GB" sz="9644" b="1">
-              <a:solidFill>
-                <a:srgbClr val="5AB1BB"/>
-              </a:solidFill>
-              <a:latin typeface="Android Insomnia" pitchFamily="2" charset="-128"/>
-              <a:ea typeface="Android Insomnia" pitchFamily="2" charset="-128"/>
-              <a:cs typeface="Android Insomnia" pitchFamily="2" charset="-128"/>
-            </a:endParaRPr>
           </a:p>
         </p:txBody>
       </p:sp>
@@ -6121,6 +6134,3194 @@
     <p:extLst>
       <p:ext uri="{BB962C8B-B14F-4D97-AF65-F5344CB8AC3E}">
         <p14:creationId xmlns:p14="http://schemas.microsoft.com/office/powerpoint/2010/main" val="4130262757"/>
+      </p:ext>
+    </p:extLst>
+  </p:cSld>
+  <p:clrMapOvr>
+    <a:masterClrMapping/>
+  </p:clrMapOvr>
+</p:sld>
+</file>
+
+<file path=ppt/slides/slide2.xml><?xml version="1.0" encoding="utf-8"?>
+<p:sld xmlns:a="http://schemas.openxmlformats.org/drawingml/2006/main" xmlns:r="http://schemas.openxmlformats.org/officeDocument/2006/relationships" xmlns:p="http://schemas.openxmlformats.org/presentationml/2006/main">
+  <p:cSld>
+    <p:spTree>
+      <p:nvGrpSpPr>
+        <p:cNvPr id="1" name=""/>
+        <p:cNvGrpSpPr/>
+        <p:nvPr/>
+      </p:nvGrpSpPr>
+      <p:grpSpPr>
+        <a:xfrm>
+          <a:off x="0" y="0"/>
+          <a:ext cx="0" cy="0"/>
+          <a:chOff x="0" y="0"/>
+          <a:chExt cx="0" cy="0"/>
+        </a:xfrm>
+      </p:grpSpPr>
+      <p:sp>
+        <p:nvSpPr>
+          <p:cNvPr id="5" name="Rectangle: Rounded Corners 4">
+            <a:extLst>
+              <a:ext uri="{FF2B5EF4-FFF2-40B4-BE49-F238E27FC236}">
+                <a16:creationId xmlns:a16="http://schemas.microsoft.com/office/drawing/2014/main" id="{4035679B-9375-4A3B-9740-2D1E7E3D6445}"/>
+              </a:ext>
+            </a:extLst>
+          </p:cNvPr>
+          <p:cNvSpPr/>
+          <p:nvPr/>
+        </p:nvSpPr>
+        <p:spPr>
+          <a:xfrm>
+            <a:off x="1" y="2888566"/>
+            <a:ext cx="965996" cy="1391334"/>
+          </a:xfrm>
+          <a:prstGeom prst="roundRect">
+            <a:avLst>
+              <a:gd name="adj" fmla="val 0"/>
+            </a:avLst>
+          </a:prstGeom>
+          <a:solidFill>
+            <a:srgbClr val="5AB1BB"/>
+          </a:solidFill>
+          <a:ln w="101600">
+            <a:noFill/>
+          </a:ln>
+        </p:spPr>
+        <p:style>
+          <a:lnRef idx="2">
+            <a:schemeClr val="accent1">
+              <a:shade val="50000"/>
+            </a:schemeClr>
+          </a:lnRef>
+          <a:fillRef idx="1">
+            <a:schemeClr val="accent1"/>
+          </a:fillRef>
+          <a:effectRef idx="0">
+            <a:schemeClr val="accent1"/>
+          </a:effectRef>
+          <a:fontRef idx="minor">
+            <a:schemeClr val="lt1"/>
+          </a:fontRef>
+        </p:style>
+        <p:txBody>
+          <a:bodyPr rtlCol="0" anchor="ctr"/>
+          <a:lstStyle/>
+          <a:p>
+            <a:pPr algn="ctr"/>
+            <a:endParaRPr lang="en-GB" sz="1808">
+              <a:solidFill>
+                <a:srgbClr val="95BFE5"/>
+              </a:solidFill>
+            </a:endParaRPr>
+          </a:p>
+        </p:txBody>
+      </p:sp>
+      <p:sp>
+        <p:nvSpPr>
+          <p:cNvPr id="7" name="Rectangle: Rounded Corners 6">
+            <a:extLst>
+              <a:ext uri="{FF2B5EF4-FFF2-40B4-BE49-F238E27FC236}">
+                <a16:creationId xmlns:a16="http://schemas.microsoft.com/office/drawing/2014/main" id="{33E43F3B-B6E1-7210-879B-27AFE9595588}"/>
+              </a:ext>
+            </a:extLst>
+          </p:cNvPr>
+          <p:cNvSpPr/>
+          <p:nvPr/>
+        </p:nvSpPr>
+        <p:spPr>
+          <a:xfrm>
+            <a:off x="1" y="0"/>
+            <a:ext cx="965996" cy="2888566"/>
+          </a:xfrm>
+          <a:prstGeom prst="roundRect">
+            <a:avLst>
+              <a:gd name="adj" fmla="val 0"/>
+            </a:avLst>
+          </a:prstGeom>
+          <a:solidFill>
+            <a:srgbClr val="EEB4B3"/>
+          </a:solidFill>
+          <a:ln w="101600">
+            <a:noFill/>
+          </a:ln>
+        </p:spPr>
+        <p:style>
+          <a:lnRef idx="2">
+            <a:schemeClr val="accent1">
+              <a:shade val="50000"/>
+            </a:schemeClr>
+          </a:lnRef>
+          <a:fillRef idx="1">
+            <a:schemeClr val="accent1"/>
+          </a:fillRef>
+          <a:effectRef idx="0">
+            <a:schemeClr val="accent1"/>
+          </a:effectRef>
+          <a:fontRef idx="minor">
+            <a:schemeClr val="lt1"/>
+          </a:fontRef>
+        </p:style>
+        <p:txBody>
+          <a:bodyPr rtlCol="0" anchor="ctr"/>
+          <a:lstStyle/>
+          <a:p>
+            <a:pPr algn="ctr"/>
+            <a:endParaRPr lang="en-GB" sz="1808">
+              <a:solidFill>
+                <a:srgbClr val="95BFE5"/>
+              </a:solidFill>
+            </a:endParaRPr>
+          </a:p>
+        </p:txBody>
+      </p:sp>
+      <p:sp>
+        <p:nvSpPr>
+          <p:cNvPr id="6" name="Rectangle: Rounded Corners 5">
+            <a:extLst>
+              <a:ext uri="{FF2B5EF4-FFF2-40B4-BE49-F238E27FC236}">
+                <a16:creationId xmlns:a16="http://schemas.microsoft.com/office/drawing/2014/main" id="{FEC4D2F5-1B5F-8B94-75B0-128AD20C2F6A}"/>
+              </a:ext>
+            </a:extLst>
+          </p:cNvPr>
+          <p:cNvSpPr/>
+          <p:nvPr/>
+        </p:nvSpPr>
+        <p:spPr>
+          <a:xfrm>
+            <a:off x="965997" y="2888563"/>
+            <a:ext cx="4793997" cy="1391335"/>
+          </a:xfrm>
+          <a:prstGeom prst="roundRect">
+            <a:avLst>
+              <a:gd name="adj" fmla="val 0"/>
+            </a:avLst>
+          </a:prstGeom>
+          <a:solidFill>
+            <a:srgbClr val="7A263A"/>
+          </a:solidFill>
+          <a:ln w="101600">
+            <a:noFill/>
+          </a:ln>
+        </p:spPr>
+        <p:style>
+          <a:lnRef idx="2">
+            <a:schemeClr val="accent1">
+              <a:shade val="50000"/>
+            </a:schemeClr>
+          </a:lnRef>
+          <a:fillRef idx="1">
+            <a:schemeClr val="accent1"/>
+          </a:fillRef>
+          <a:effectRef idx="0">
+            <a:schemeClr val="accent1"/>
+          </a:effectRef>
+          <a:fontRef idx="minor">
+            <a:schemeClr val="lt1"/>
+          </a:fontRef>
+        </p:style>
+        <p:txBody>
+          <a:bodyPr rtlCol="0" anchor="ctr"/>
+          <a:lstStyle/>
+          <a:p>
+            <a:pPr algn="ctr"/>
+            <a:endParaRPr lang="en-GB" sz="1808">
+              <a:solidFill>
+                <a:srgbClr val="95BFE5"/>
+              </a:solidFill>
+            </a:endParaRPr>
+          </a:p>
+        </p:txBody>
+      </p:sp>
+      <p:sp>
+        <p:nvSpPr>
+          <p:cNvPr id="2" name="TextBox 1">
+            <a:extLst>
+              <a:ext uri="{FF2B5EF4-FFF2-40B4-BE49-F238E27FC236}">
+                <a16:creationId xmlns:a16="http://schemas.microsoft.com/office/drawing/2014/main" id="{4D875408-3E42-5D08-7FED-62C7D1F59918}"/>
+              </a:ext>
+            </a:extLst>
+          </p:cNvPr>
+          <p:cNvSpPr txBox="1"/>
+          <p:nvPr/>
+        </p:nvSpPr>
+        <p:spPr>
+          <a:xfrm rot="16200000">
+            <a:off x="-567708" y="1808118"/>
+            <a:ext cx="2262759" cy="1446550"/>
+          </a:xfrm>
+          <a:prstGeom prst="rect">
+            <a:avLst/>
+          </a:prstGeom>
+          <a:noFill/>
+        </p:spPr>
+        <p:txBody>
+          <a:bodyPr wrap="square" rtlCol="0">
+            <a:spAutoFit/>
+          </a:bodyPr>
+          <a:lstStyle/>
+          <a:p>
+            <a:r>
+              <a:rPr lang="en-GB" sz="8800" b="1">
+                <a:solidFill>
+                  <a:schemeClr val="bg1"/>
+                </a:solidFill>
+                <a:latin typeface="Android Insomnia" pitchFamily="2" charset="-128"/>
+                <a:ea typeface="Android Insomnia" pitchFamily="2" charset="-128"/>
+                <a:cs typeface="Android Insomnia" pitchFamily="2" charset="-128"/>
+              </a:rPr>
+              <a:t>asf</a:t>
+            </a:r>
+          </a:p>
+        </p:txBody>
+      </p:sp>
+      <p:sp>
+        <p:nvSpPr>
+          <p:cNvPr id="4" name="Rectangle: Rounded Corners 3">
+            <a:extLst>
+              <a:ext uri="{FF2B5EF4-FFF2-40B4-BE49-F238E27FC236}">
+                <a16:creationId xmlns:a16="http://schemas.microsoft.com/office/drawing/2014/main" id="{CAC95C35-1B48-AA1E-545D-C3E97BCC7321}"/>
+              </a:ext>
+            </a:extLst>
+          </p:cNvPr>
+          <p:cNvSpPr/>
+          <p:nvPr/>
+        </p:nvSpPr>
+        <p:spPr>
+          <a:xfrm>
+            <a:off x="965997" y="0"/>
+            <a:ext cx="4793452" cy="2888563"/>
+          </a:xfrm>
+          <a:prstGeom prst="roundRect">
+            <a:avLst>
+              <a:gd name="adj" fmla="val 0"/>
+            </a:avLst>
+          </a:prstGeom>
+          <a:solidFill>
+            <a:srgbClr val="FEC601"/>
+          </a:solidFill>
+          <a:ln w="101600">
+            <a:noFill/>
+          </a:ln>
+        </p:spPr>
+        <p:style>
+          <a:lnRef idx="2">
+            <a:schemeClr val="accent1">
+              <a:shade val="50000"/>
+            </a:schemeClr>
+          </a:lnRef>
+          <a:fillRef idx="1">
+            <a:schemeClr val="accent1"/>
+          </a:fillRef>
+          <a:effectRef idx="0">
+            <a:schemeClr val="accent1"/>
+          </a:effectRef>
+          <a:fontRef idx="minor">
+            <a:schemeClr val="lt1"/>
+          </a:fontRef>
+        </p:style>
+        <p:txBody>
+          <a:bodyPr rtlCol="0" anchor="ctr"/>
+          <a:lstStyle/>
+          <a:p>
+            <a:pPr algn="ctr"/>
+            <a:endParaRPr lang="en-GB" sz="1808">
+              <a:solidFill>
+                <a:srgbClr val="95BFE5"/>
+              </a:solidFill>
+            </a:endParaRPr>
+          </a:p>
+        </p:txBody>
+      </p:sp>
+      <p:sp>
+        <p:nvSpPr>
+          <p:cNvPr id="3" name="TextBox 2">
+            <a:extLst>
+              <a:ext uri="{FF2B5EF4-FFF2-40B4-BE49-F238E27FC236}">
+                <a16:creationId xmlns:a16="http://schemas.microsoft.com/office/drawing/2014/main" id="{56BA9D04-7576-0017-8F07-92AFBC13D6A6}"/>
+              </a:ext>
+            </a:extLst>
+          </p:cNvPr>
+          <p:cNvSpPr txBox="1"/>
+          <p:nvPr/>
+        </p:nvSpPr>
+        <p:spPr>
+          <a:xfrm>
+            <a:off x="188643" y="2444114"/>
+            <a:ext cx="5675652" cy="1446550"/>
+          </a:xfrm>
+          <a:prstGeom prst="rect">
+            <a:avLst/>
+          </a:prstGeom>
+          <a:noFill/>
+        </p:spPr>
+        <p:txBody>
+          <a:bodyPr wrap="square" rtlCol="0">
+            <a:spAutoFit/>
+          </a:bodyPr>
+          <a:lstStyle/>
+          <a:p>
+            <a:r>
+              <a:rPr lang="en-GB" sz="8800" b="1">
+                <a:solidFill>
+                  <a:schemeClr val="bg1"/>
+                </a:solidFill>
+                <a:latin typeface="Android Insomnia" pitchFamily="2" charset="-128"/>
+                <a:ea typeface="Android Insomnia" pitchFamily="2" charset="-128"/>
+                <a:cs typeface="Android Insomnia" pitchFamily="2" charset="-128"/>
+              </a:rPr>
+              <a:t>causeway</a:t>
+            </a:r>
+            <a:endParaRPr lang="en-GB" sz="8800" b="1">
+              <a:solidFill>
+                <a:srgbClr val="7A263A"/>
+              </a:solidFill>
+              <a:latin typeface="Android Insomnia" pitchFamily="2" charset="-128"/>
+              <a:ea typeface="Android Insomnia" pitchFamily="2" charset="-128"/>
+              <a:cs typeface="Android Insomnia" pitchFamily="2" charset="-128"/>
+            </a:endParaRPr>
+          </a:p>
+        </p:txBody>
+      </p:sp>
+    </p:spTree>
+    <p:extLst>
+      <p:ext uri="{BB962C8B-B14F-4D97-AF65-F5344CB8AC3E}">
+        <p14:creationId xmlns:p14="http://schemas.microsoft.com/office/powerpoint/2010/main" val="801946939"/>
+      </p:ext>
+    </p:extLst>
+  </p:cSld>
+  <p:clrMapOvr>
+    <a:masterClrMapping/>
+  </p:clrMapOvr>
+</p:sld>
+</file>
+
+<file path=ppt/slides/slide3.xml><?xml version="1.0" encoding="utf-8"?>
+<p:sld xmlns:a="http://schemas.openxmlformats.org/drawingml/2006/main" xmlns:r="http://schemas.openxmlformats.org/officeDocument/2006/relationships" xmlns:p="http://schemas.openxmlformats.org/presentationml/2006/main">
+  <p:cSld>
+    <p:spTree>
+      <p:nvGrpSpPr>
+        <p:cNvPr id="1" name=""/>
+        <p:cNvGrpSpPr/>
+        <p:nvPr/>
+      </p:nvGrpSpPr>
+      <p:grpSpPr>
+        <a:xfrm>
+          <a:off x="0" y="0"/>
+          <a:ext cx="0" cy="0"/>
+          <a:chOff x="0" y="0"/>
+          <a:chExt cx="0" cy="0"/>
+        </a:xfrm>
+      </p:grpSpPr>
+      <p:sp>
+        <p:nvSpPr>
+          <p:cNvPr id="12" name="Rectangle: Rounded Corners 11">
+            <a:extLst>
+              <a:ext uri="{FF2B5EF4-FFF2-40B4-BE49-F238E27FC236}">
+                <a16:creationId xmlns:a16="http://schemas.microsoft.com/office/drawing/2014/main" id="{A31F33E6-48C6-2F14-D301-2E0B7985B91A}"/>
+              </a:ext>
+            </a:extLst>
+          </p:cNvPr>
+          <p:cNvSpPr/>
+          <p:nvPr/>
+        </p:nvSpPr>
+        <p:spPr>
+          <a:xfrm>
+            <a:off x="0" y="-6980"/>
+            <a:ext cx="1138136" cy="2509736"/>
+          </a:xfrm>
+          <a:prstGeom prst="roundRect">
+            <a:avLst>
+              <a:gd name="adj" fmla="val 0"/>
+            </a:avLst>
+          </a:prstGeom>
+          <a:solidFill>
+            <a:srgbClr val="EEB4B3"/>
+          </a:solidFill>
+          <a:ln w="101600">
+            <a:noFill/>
+          </a:ln>
+        </p:spPr>
+        <p:style>
+          <a:lnRef idx="2">
+            <a:schemeClr val="accent1">
+              <a:shade val="50000"/>
+            </a:schemeClr>
+          </a:lnRef>
+          <a:fillRef idx="1">
+            <a:schemeClr val="accent1"/>
+          </a:fillRef>
+          <a:effectRef idx="0">
+            <a:schemeClr val="accent1"/>
+          </a:effectRef>
+          <a:fontRef idx="minor">
+            <a:schemeClr val="lt1"/>
+          </a:fontRef>
+        </p:style>
+        <p:txBody>
+          <a:bodyPr rtlCol="0" anchor="ctr"/>
+          <a:lstStyle/>
+          <a:p>
+            <a:pPr algn="ctr"/>
+            <a:endParaRPr lang="en-GB" sz="1808">
+              <a:solidFill>
+                <a:srgbClr val="95BFE5"/>
+              </a:solidFill>
+            </a:endParaRPr>
+          </a:p>
+        </p:txBody>
+      </p:sp>
+      <p:sp>
+        <p:nvSpPr>
+          <p:cNvPr id="6" name="Rectangle: Rounded Corners 5">
+            <a:extLst>
+              <a:ext uri="{FF2B5EF4-FFF2-40B4-BE49-F238E27FC236}">
+                <a16:creationId xmlns:a16="http://schemas.microsoft.com/office/drawing/2014/main" id="{FEC4D2F5-1B5F-8B94-75B0-128AD20C2F6A}"/>
+              </a:ext>
+            </a:extLst>
+          </p:cNvPr>
+          <p:cNvSpPr/>
+          <p:nvPr/>
+        </p:nvSpPr>
+        <p:spPr>
+          <a:xfrm>
+            <a:off x="1175372" y="2544866"/>
+            <a:ext cx="4584078" cy="1735034"/>
+          </a:xfrm>
+          <a:prstGeom prst="roundRect">
+            <a:avLst>
+              <a:gd name="adj" fmla="val 0"/>
+            </a:avLst>
+          </a:prstGeom>
+          <a:solidFill>
+            <a:srgbClr val="7A263A"/>
+          </a:solidFill>
+          <a:ln w="101600">
+            <a:noFill/>
+          </a:ln>
+        </p:spPr>
+        <p:style>
+          <a:lnRef idx="2">
+            <a:schemeClr val="accent1">
+              <a:shade val="50000"/>
+            </a:schemeClr>
+          </a:lnRef>
+          <a:fillRef idx="1">
+            <a:schemeClr val="accent1"/>
+          </a:fillRef>
+          <a:effectRef idx="0">
+            <a:schemeClr val="accent1"/>
+          </a:effectRef>
+          <a:fontRef idx="minor">
+            <a:schemeClr val="lt1"/>
+          </a:fontRef>
+        </p:style>
+        <p:txBody>
+          <a:bodyPr rtlCol="0" anchor="ctr"/>
+          <a:lstStyle/>
+          <a:p>
+            <a:pPr algn="ctr"/>
+            <a:endParaRPr lang="en-GB" sz="1808">
+              <a:solidFill>
+                <a:srgbClr val="95BFE5"/>
+              </a:solidFill>
+            </a:endParaRPr>
+          </a:p>
+        </p:txBody>
+      </p:sp>
+      <p:sp>
+        <p:nvSpPr>
+          <p:cNvPr id="4" name="Rectangle: Rounded Corners 3">
+            <a:extLst>
+              <a:ext uri="{FF2B5EF4-FFF2-40B4-BE49-F238E27FC236}">
+                <a16:creationId xmlns:a16="http://schemas.microsoft.com/office/drawing/2014/main" id="{CAC95C35-1B48-AA1E-545D-C3E97BCC7321}"/>
+              </a:ext>
+            </a:extLst>
+          </p:cNvPr>
+          <p:cNvSpPr/>
+          <p:nvPr/>
+        </p:nvSpPr>
+        <p:spPr>
+          <a:xfrm>
+            <a:off x="1175372" y="0"/>
+            <a:ext cx="4584078" cy="2502756"/>
+          </a:xfrm>
+          <a:prstGeom prst="roundRect">
+            <a:avLst>
+              <a:gd name="adj" fmla="val 0"/>
+            </a:avLst>
+          </a:prstGeom>
+          <a:solidFill>
+            <a:srgbClr val="FEC601"/>
+          </a:solidFill>
+          <a:ln w="101600">
+            <a:noFill/>
+          </a:ln>
+        </p:spPr>
+        <p:style>
+          <a:lnRef idx="2">
+            <a:schemeClr val="accent1">
+              <a:shade val="50000"/>
+            </a:schemeClr>
+          </a:lnRef>
+          <a:fillRef idx="1">
+            <a:schemeClr val="accent1"/>
+          </a:fillRef>
+          <a:effectRef idx="0">
+            <a:schemeClr val="accent1"/>
+          </a:effectRef>
+          <a:fontRef idx="minor">
+            <a:schemeClr val="lt1"/>
+          </a:fontRef>
+        </p:style>
+        <p:txBody>
+          <a:bodyPr rtlCol="0" anchor="ctr"/>
+          <a:lstStyle/>
+          <a:p>
+            <a:pPr algn="ctr"/>
+            <a:endParaRPr lang="en-GB" sz="1808">
+              <a:solidFill>
+                <a:srgbClr val="95BFE5"/>
+              </a:solidFill>
+            </a:endParaRPr>
+          </a:p>
+        </p:txBody>
+      </p:sp>
+      <p:sp>
+        <p:nvSpPr>
+          <p:cNvPr id="5" name="Rectangle: Rounded Corners 4">
+            <a:extLst>
+              <a:ext uri="{FF2B5EF4-FFF2-40B4-BE49-F238E27FC236}">
+                <a16:creationId xmlns:a16="http://schemas.microsoft.com/office/drawing/2014/main" id="{4035679B-9375-4A3B-9740-2D1E7E3D6445}"/>
+              </a:ext>
+            </a:extLst>
+          </p:cNvPr>
+          <p:cNvSpPr/>
+          <p:nvPr/>
+        </p:nvSpPr>
+        <p:spPr>
+          <a:xfrm>
+            <a:off x="0" y="2544866"/>
+            <a:ext cx="1138136" cy="1735034"/>
+          </a:xfrm>
+          <a:prstGeom prst="roundRect">
+            <a:avLst>
+              <a:gd name="adj" fmla="val 0"/>
+            </a:avLst>
+          </a:prstGeom>
+          <a:solidFill>
+            <a:srgbClr val="5AB1BB"/>
+          </a:solidFill>
+          <a:ln w="101600">
+            <a:noFill/>
+          </a:ln>
+        </p:spPr>
+        <p:style>
+          <a:lnRef idx="2">
+            <a:schemeClr val="accent1">
+              <a:shade val="50000"/>
+            </a:schemeClr>
+          </a:lnRef>
+          <a:fillRef idx="1">
+            <a:schemeClr val="accent1"/>
+          </a:fillRef>
+          <a:effectRef idx="0">
+            <a:schemeClr val="accent1"/>
+          </a:effectRef>
+          <a:fontRef idx="minor">
+            <a:schemeClr val="lt1"/>
+          </a:fontRef>
+        </p:style>
+        <p:txBody>
+          <a:bodyPr rtlCol="0" anchor="ctr"/>
+          <a:lstStyle/>
+          <a:p>
+            <a:pPr algn="ctr"/>
+            <a:endParaRPr lang="en-GB" sz="1808">
+              <a:solidFill>
+                <a:srgbClr val="95BFE5"/>
+              </a:solidFill>
+            </a:endParaRPr>
+          </a:p>
+        </p:txBody>
+      </p:sp>
+      <p:sp>
+        <p:nvSpPr>
+          <p:cNvPr id="3" name="TextBox 2">
+            <a:extLst>
+              <a:ext uri="{FF2B5EF4-FFF2-40B4-BE49-F238E27FC236}">
+                <a16:creationId xmlns:a16="http://schemas.microsoft.com/office/drawing/2014/main" id="{56BA9D04-7576-0017-8F07-92AFBC13D6A6}"/>
+              </a:ext>
+            </a:extLst>
+          </p:cNvPr>
+          <p:cNvSpPr txBox="1"/>
+          <p:nvPr/>
+        </p:nvSpPr>
+        <p:spPr>
+          <a:xfrm>
+            <a:off x="1162900" y="2351235"/>
+            <a:ext cx="4584078" cy="1200329"/>
+          </a:xfrm>
+          <a:prstGeom prst="rect">
+            <a:avLst/>
+          </a:prstGeom>
+          <a:noFill/>
+        </p:spPr>
+        <p:txBody>
+          <a:bodyPr wrap="square" rtlCol="0">
+            <a:spAutoFit/>
+          </a:bodyPr>
+          <a:lstStyle/>
+          <a:p>
+            <a:r>
+              <a:rPr lang="en-GB" sz="7200" b="1">
+                <a:solidFill>
+                  <a:schemeClr val="bg1"/>
+                </a:solidFill>
+                <a:latin typeface="Android Insomnia" pitchFamily="2" charset="-128"/>
+                <a:ea typeface="Android Insomnia" pitchFamily="2" charset="-128"/>
+                <a:cs typeface="Android Insomnia" pitchFamily="2" charset="-128"/>
+              </a:rPr>
+              <a:t>causeway</a:t>
+            </a:r>
+          </a:p>
+        </p:txBody>
+      </p:sp>
+      <p:sp>
+        <p:nvSpPr>
+          <p:cNvPr id="10" name="TextBox 9">
+            <a:extLst>
+              <a:ext uri="{FF2B5EF4-FFF2-40B4-BE49-F238E27FC236}">
+                <a16:creationId xmlns:a16="http://schemas.microsoft.com/office/drawing/2014/main" id="{C64F2FFB-CDB5-6BCD-6256-EE2A05FDCE17}"/>
+              </a:ext>
+            </a:extLst>
+          </p:cNvPr>
+          <p:cNvSpPr txBox="1"/>
+          <p:nvPr/>
+        </p:nvSpPr>
+        <p:spPr>
+          <a:xfrm>
+            <a:off x="-75188" y="1760070"/>
+            <a:ext cx="1336806" cy="830997"/>
+          </a:xfrm>
+          <a:prstGeom prst="rect">
+            <a:avLst/>
+          </a:prstGeom>
+          <a:noFill/>
+        </p:spPr>
+        <p:txBody>
+          <a:bodyPr wrap="square" rtlCol="0">
+            <a:spAutoFit/>
+          </a:bodyPr>
+          <a:lstStyle/>
+          <a:p>
+            <a:r>
+              <a:rPr lang="en-US" sz="4800" b="1">
+                <a:solidFill>
+                  <a:schemeClr val="bg1"/>
+                </a:solidFill>
+                <a:latin typeface="Android Insomnia" pitchFamily="2" charset="-128"/>
+                <a:ea typeface="Android Insomnia" pitchFamily="2" charset="-128"/>
+                <a:cs typeface="Android Insomnia" pitchFamily="2" charset="-128"/>
+              </a:rPr>
+              <a:t>asf</a:t>
+            </a:r>
+            <a:endParaRPr lang="en-GB" sz="4800" b="1">
+              <a:solidFill>
+                <a:schemeClr val="bg1"/>
+              </a:solidFill>
+              <a:latin typeface="Android Insomnia" pitchFamily="2" charset="-128"/>
+              <a:ea typeface="Android Insomnia" pitchFamily="2" charset="-128"/>
+              <a:cs typeface="Android Insomnia" pitchFamily="2" charset="-128"/>
+            </a:endParaRPr>
+          </a:p>
+        </p:txBody>
+      </p:sp>
+    </p:spTree>
+    <p:extLst>
+      <p:ext uri="{BB962C8B-B14F-4D97-AF65-F5344CB8AC3E}">
+        <p14:creationId xmlns:p14="http://schemas.microsoft.com/office/powerpoint/2010/main" val="237684728"/>
+      </p:ext>
+    </p:extLst>
+  </p:cSld>
+  <p:clrMapOvr>
+    <a:masterClrMapping/>
+  </p:clrMapOvr>
+</p:sld>
+</file>
+
+<file path=ppt/slides/slide4.xml><?xml version="1.0" encoding="utf-8"?>
+<p:sld xmlns:a="http://schemas.openxmlformats.org/drawingml/2006/main" xmlns:r="http://schemas.openxmlformats.org/officeDocument/2006/relationships" xmlns:p="http://schemas.openxmlformats.org/presentationml/2006/main">
+  <p:cSld>
+    <p:spTree>
+      <p:nvGrpSpPr>
+        <p:cNvPr id="1" name=""/>
+        <p:cNvGrpSpPr/>
+        <p:nvPr/>
+      </p:nvGrpSpPr>
+      <p:grpSpPr>
+        <a:xfrm>
+          <a:off x="0" y="0"/>
+          <a:ext cx="0" cy="0"/>
+          <a:chOff x="0" y="0"/>
+          <a:chExt cx="0" cy="0"/>
+        </a:xfrm>
+      </p:grpSpPr>
+      <p:sp>
+        <p:nvSpPr>
+          <p:cNvPr id="12" name="Rectangle: Rounded Corners 11">
+            <a:extLst>
+              <a:ext uri="{FF2B5EF4-FFF2-40B4-BE49-F238E27FC236}">
+                <a16:creationId xmlns:a16="http://schemas.microsoft.com/office/drawing/2014/main" id="{A31F33E6-48C6-2F14-D301-2E0B7985B91A}"/>
+              </a:ext>
+            </a:extLst>
+          </p:cNvPr>
+          <p:cNvSpPr/>
+          <p:nvPr/>
+        </p:nvSpPr>
+        <p:spPr>
+          <a:xfrm>
+            <a:off x="0" y="0"/>
+            <a:ext cx="1138136" cy="2509736"/>
+          </a:xfrm>
+          <a:prstGeom prst="roundRect">
+            <a:avLst>
+              <a:gd name="adj" fmla="val 0"/>
+            </a:avLst>
+          </a:prstGeom>
+          <a:solidFill>
+            <a:srgbClr val="EEB4B3"/>
+          </a:solidFill>
+          <a:ln w="101600">
+            <a:noFill/>
+          </a:ln>
+        </p:spPr>
+        <p:style>
+          <a:lnRef idx="2">
+            <a:schemeClr val="accent1">
+              <a:shade val="50000"/>
+            </a:schemeClr>
+          </a:lnRef>
+          <a:fillRef idx="1">
+            <a:schemeClr val="accent1"/>
+          </a:fillRef>
+          <a:effectRef idx="0">
+            <a:schemeClr val="accent1"/>
+          </a:effectRef>
+          <a:fontRef idx="minor">
+            <a:schemeClr val="lt1"/>
+          </a:fontRef>
+        </p:style>
+        <p:txBody>
+          <a:bodyPr rtlCol="0" anchor="ctr"/>
+          <a:lstStyle/>
+          <a:p>
+            <a:pPr algn="ctr"/>
+            <a:endParaRPr lang="en-GB" sz="1808">
+              <a:solidFill>
+                <a:srgbClr val="95BFE5"/>
+              </a:solidFill>
+            </a:endParaRPr>
+          </a:p>
+        </p:txBody>
+      </p:sp>
+      <p:sp>
+        <p:nvSpPr>
+          <p:cNvPr id="6" name="Rectangle: Rounded Corners 5">
+            <a:extLst>
+              <a:ext uri="{FF2B5EF4-FFF2-40B4-BE49-F238E27FC236}">
+                <a16:creationId xmlns:a16="http://schemas.microsoft.com/office/drawing/2014/main" id="{FEC4D2F5-1B5F-8B94-75B0-128AD20C2F6A}"/>
+              </a:ext>
+            </a:extLst>
+          </p:cNvPr>
+          <p:cNvSpPr/>
+          <p:nvPr/>
+        </p:nvSpPr>
+        <p:spPr>
+          <a:xfrm>
+            <a:off x="1175372" y="2544866"/>
+            <a:ext cx="4584078" cy="1735034"/>
+          </a:xfrm>
+          <a:prstGeom prst="roundRect">
+            <a:avLst>
+              <a:gd name="adj" fmla="val 0"/>
+            </a:avLst>
+          </a:prstGeom>
+          <a:solidFill>
+            <a:srgbClr val="7A263A"/>
+          </a:solidFill>
+          <a:ln w="101600">
+            <a:noFill/>
+          </a:ln>
+        </p:spPr>
+        <p:style>
+          <a:lnRef idx="2">
+            <a:schemeClr val="accent1">
+              <a:shade val="50000"/>
+            </a:schemeClr>
+          </a:lnRef>
+          <a:fillRef idx="1">
+            <a:schemeClr val="accent1"/>
+          </a:fillRef>
+          <a:effectRef idx="0">
+            <a:schemeClr val="accent1"/>
+          </a:effectRef>
+          <a:fontRef idx="minor">
+            <a:schemeClr val="lt1"/>
+          </a:fontRef>
+        </p:style>
+        <p:txBody>
+          <a:bodyPr rtlCol="0" anchor="ctr"/>
+          <a:lstStyle/>
+          <a:p>
+            <a:pPr algn="ctr"/>
+            <a:endParaRPr lang="en-GB" sz="1808">
+              <a:solidFill>
+                <a:srgbClr val="95BFE5"/>
+              </a:solidFill>
+            </a:endParaRPr>
+          </a:p>
+        </p:txBody>
+      </p:sp>
+      <p:sp>
+        <p:nvSpPr>
+          <p:cNvPr id="4" name="Rectangle: Rounded Corners 3">
+            <a:extLst>
+              <a:ext uri="{FF2B5EF4-FFF2-40B4-BE49-F238E27FC236}">
+                <a16:creationId xmlns:a16="http://schemas.microsoft.com/office/drawing/2014/main" id="{CAC95C35-1B48-AA1E-545D-C3E97BCC7321}"/>
+              </a:ext>
+            </a:extLst>
+          </p:cNvPr>
+          <p:cNvSpPr/>
+          <p:nvPr/>
+        </p:nvSpPr>
+        <p:spPr>
+          <a:xfrm>
+            <a:off x="1175372" y="-13959"/>
+            <a:ext cx="4584078" cy="2516715"/>
+          </a:xfrm>
+          <a:prstGeom prst="roundRect">
+            <a:avLst>
+              <a:gd name="adj" fmla="val 0"/>
+            </a:avLst>
+          </a:prstGeom>
+          <a:solidFill>
+            <a:srgbClr val="FEC601"/>
+          </a:solidFill>
+          <a:ln w="101600">
+            <a:noFill/>
+          </a:ln>
+        </p:spPr>
+        <p:style>
+          <a:lnRef idx="2">
+            <a:schemeClr val="accent1">
+              <a:shade val="50000"/>
+            </a:schemeClr>
+          </a:lnRef>
+          <a:fillRef idx="1">
+            <a:schemeClr val="accent1"/>
+          </a:fillRef>
+          <a:effectRef idx="0">
+            <a:schemeClr val="accent1"/>
+          </a:effectRef>
+          <a:fontRef idx="minor">
+            <a:schemeClr val="lt1"/>
+          </a:fontRef>
+        </p:style>
+        <p:txBody>
+          <a:bodyPr rtlCol="0" anchor="ctr"/>
+          <a:lstStyle/>
+          <a:p>
+            <a:pPr algn="ctr"/>
+            <a:endParaRPr lang="en-GB" sz="1808">
+              <a:solidFill>
+                <a:srgbClr val="95BFE5"/>
+              </a:solidFill>
+            </a:endParaRPr>
+          </a:p>
+        </p:txBody>
+      </p:sp>
+      <p:sp>
+        <p:nvSpPr>
+          <p:cNvPr id="5" name="Rectangle: Rounded Corners 4">
+            <a:extLst>
+              <a:ext uri="{FF2B5EF4-FFF2-40B4-BE49-F238E27FC236}">
+                <a16:creationId xmlns:a16="http://schemas.microsoft.com/office/drawing/2014/main" id="{4035679B-9375-4A3B-9740-2D1E7E3D6445}"/>
+              </a:ext>
+            </a:extLst>
+          </p:cNvPr>
+          <p:cNvSpPr/>
+          <p:nvPr/>
+        </p:nvSpPr>
+        <p:spPr>
+          <a:xfrm>
+            <a:off x="0" y="2544866"/>
+            <a:ext cx="1138136" cy="1735034"/>
+          </a:xfrm>
+          <a:prstGeom prst="roundRect">
+            <a:avLst>
+              <a:gd name="adj" fmla="val 0"/>
+            </a:avLst>
+          </a:prstGeom>
+          <a:solidFill>
+            <a:srgbClr val="5AB1BB"/>
+          </a:solidFill>
+          <a:ln w="101600">
+            <a:noFill/>
+          </a:ln>
+        </p:spPr>
+        <p:style>
+          <a:lnRef idx="2">
+            <a:schemeClr val="accent1">
+              <a:shade val="50000"/>
+            </a:schemeClr>
+          </a:lnRef>
+          <a:fillRef idx="1">
+            <a:schemeClr val="accent1"/>
+          </a:fillRef>
+          <a:effectRef idx="0">
+            <a:schemeClr val="accent1"/>
+          </a:effectRef>
+          <a:fontRef idx="minor">
+            <a:schemeClr val="lt1"/>
+          </a:fontRef>
+        </p:style>
+        <p:txBody>
+          <a:bodyPr rtlCol="0" anchor="ctr"/>
+          <a:lstStyle/>
+          <a:p>
+            <a:pPr algn="ctr"/>
+            <a:endParaRPr lang="en-GB" sz="1808">
+              <a:solidFill>
+                <a:srgbClr val="95BFE5"/>
+              </a:solidFill>
+            </a:endParaRPr>
+          </a:p>
+        </p:txBody>
+      </p:sp>
+      <p:sp>
+        <p:nvSpPr>
+          <p:cNvPr id="3" name="TextBox 2">
+            <a:extLst>
+              <a:ext uri="{FF2B5EF4-FFF2-40B4-BE49-F238E27FC236}">
+                <a16:creationId xmlns:a16="http://schemas.microsoft.com/office/drawing/2014/main" id="{56BA9D04-7576-0017-8F07-92AFBC13D6A6}"/>
+              </a:ext>
+            </a:extLst>
+          </p:cNvPr>
+          <p:cNvSpPr txBox="1"/>
+          <p:nvPr/>
+        </p:nvSpPr>
+        <p:spPr>
+          <a:xfrm>
+            <a:off x="1155920" y="2351235"/>
+            <a:ext cx="4584078" cy="1200329"/>
+          </a:xfrm>
+          <a:prstGeom prst="rect">
+            <a:avLst/>
+          </a:prstGeom>
+          <a:noFill/>
+        </p:spPr>
+        <p:txBody>
+          <a:bodyPr wrap="square" rtlCol="0">
+            <a:spAutoFit/>
+          </a:bodyPr>
+          <a:lstStyle/>
+          <a:p>
+            <a:r>
+              <a:rPr lang="en-GB" sz="7200" b="1">
+                <a:solidFill>
+                  <a:schemeClr val="bg1"/>
+                </a:solidFill>
+                <a:latin typeface="Android Insomnia" pitchFamily="2" charset="-128"/>
+                <a:ea typeface="Android Insomnia" pitchFamily="2" charset="-128"/>
+                <a:cs typeface="Android Insomnia" pitchFamily="2" charset="-128"/>
+              </a:rPr>
+              <a:t>causeway</a:t>
+            </a:r>
+          </a:p>
+        </p:txBody>
+      </p:sp>
+      <p:sp>
+        <p:nvSpPr>
+          <p:cNvPr id="10" name="TextBox 9">
+            <a:extLst>
+              <a:ext uri="{FF2B5EF4-FFF2-40B4-BE49-F238E27FC236}">
+                <a16:creationId xmlns:a16="http://schemas.microsoft.com/office/drawing/2014/main" id="{C64F2FFB-CDB5-6BCD-6256-EE2A05FDCE17}"/>
+              </a:ext>
+            </a:extLst>
+          </p:cNvPr>
+          <p:cNvSpPr txBox="1"/>
+          <p:nvPr/>
+        </p:nvSpPr>
+        <p:spPr>
+          <a:xfrm>
+            <a:off x="-75188" y="1760070"/>
+            <a:ext cx="1336806" cy="830997"/>
+          </a:xfrm>
+          <a:prstGeom prst="rect">
+            <a:avLst/>
+          </a:prstGeom>
+          <a:noFill/>
+        </p:spPr>
+        <p:txBody>
+          <a:bodyPr wrap="square" rtlCol="0">
+            <a:spAutoFit/>
+          </a:bodyPr>
+          <a:lstStyle/>
+          <a:p>
+            <a:r>
+              <a:rPr lang="en-US" sz="4800" b="1">
+                <a:solidFill>
+                  <a:schemeClr val="bg1"/>
+                </a:solidFill>
+                <a:latin typeface="Android Insomnia" pitchFamily="2" charset="-128"/>
+                <a:ea typeface="Android Insomnia" pitchFamily="2" charset="-128"/>
+                <a:cs typeface="Android Insomnia" pitchFamily="2" charset="-128"/>
+              </a:rPr>
+              <a:t>asf</a:t>
+            </a:r>
+            <a:endParaRPr lang="en-GB" sz="4800" b="1">
+              <a:solidFill>
+                <a:schemeClr val="bg1"/>
+              </a:solidFill>
+              <a:latin typeface="Android Insomnia" pitchFamily="2" charset="-128"/>
+              <a:ea typeface="Android Insomnia" pitchFamily="2" charset="-128"/>
+              <a:cs typeface="Android Insomnia" pitchFamily="2" charset="-128"/>
+            </a:endParaRPr>
+          </a:p>
+        </p:txBody>
+      </p:sp>
+    </p:spTree>
+    <p:extLst>
+      <p:ext uri="{BB962C8B-B14F-4D97-AF65-F5344CB8AC3E}">
+        <p14:creationId xmlns:p14="http://schemas.microsoft.com/office/powerpoint/2010/main" val="494928356"/>
+      </p:ext>
+    </p:extLst>
+  </p:cSld>
+  <p:clrMapOvr>
+    <a:masterClrMapping/>
+  </p:clrMapOvr>
+</p:sld>
+</file>
+
+<file path=ppt/slides/slide5.xml><?xml version="1.0" encoding="utf-8"?>
+<p:sld xmlns:a="http://schemas.openxmlformats.org/drawingml/2006/main" xmlns:r="http://schemas.openxmlformats.org/officeDocument/2006/relationships" xmlns:p="http://schemas.openxmlformats.org/presentationml/2006/main">
+  <p:cSld>
+    <p:spTree>
+      <p:nvGrpSpPr>
+        <p:cNvPr id="1" name=""/>
+        <p:cNvGrpSpPr/>
+        <p:nvPr/>
+      </p:nvGrpSpPr>
+      <p:grpSpPr>
+        <a:xfrm>
+          <a:off x="0" y="0"/>
+          <a:ext cx="0" cy="0"/>
+          <a:chOff x="0" y="0"/>
+          <a:chExt cx="0" cy="0"/>
+        </a:xfrm>
+      </p:grpSpPr>
+      <p:sp>
+        <p:nvSpPr>
+          <p:cNvPr id="12" name="Rectangle: Rounded Corners 11">
+            <a:extLst>
+              <a:ext uri="{FF2B5EF4-FFF2-40B4-BE49-F238E27FC236}">
+                <a16:creationId xmlns:a16="http://schemas.microsoft.com/office/drawing/2014/main" id="{A31F33E6-48C6-2F14-D301-2E0B7985B91A}"/>
+              </a:ext>
+            </a:extLst>
+          </p:cNvPr>
+          <p:cNvSpPr/>
+          <p:nvPr/>
+        </p:nvSpPr>
+        <p:spPr>
+          <a:xfrm>
+            <a:off x="0" y="0"/>
+            <a:ext cx="1138136" cy="2509736"/>
+          </a:xfrm>
+          <a:prstGeom prst="roundRect">
+            <a:avLst>
+              <a:gd name="adj" fmla="val 0"/>
+            </a:avLst>
+          </a:prstGeom>
+          <a:solidFill>
+            <a:srgbClr val="EEB4B3"/>
+          </a:solidFill>
+          <a:ln w="101600">
+            <a:noFill/>
+          </a:ln>
+        </p:spPr>
+        <p:style>
+          <a:lnRef idx="2">
+            <a:schemeClr val="accent1">
+              <a:shade val="50000"/>
+            </a:schemeClr>
+          </a:lnRef>
+          <a:fillRef idx="1">
+            <a:schemeClr val="accent1"/>
+          </a:fillRef>
+          <a:effectRef idx="0">
+            <a:schemeClr val="accent1"/>
+          </a:effectRef>
+          <a:fontRef idx="minor">
+            <a:schemeClr val="lt1"/>
+          </a:fontRef>
+        </p:style>
+        <p:txBody>
+          <a:bodyPr rtlCol="0" anchor="ctr"/>
+          <a:lstStyle/>
+          <a:p>
+            <a:pPr algn="ctr"/>
+            <a:endParaRPr lang="en-GB" sz="1808">
+              <a:solidFill>
+                <a:srgbClr val="95BFE5"/>
+              </a:solidFill>
+            </a:endParaRPr>
+          </a:p>
+        </p:txBody>
+      </p:sp>
+      <p:sp>
+        <p:nvSpPr>
+          <p:cNvPr id="6" name="Rectangle: Rounded Corners 5">
+            <a:extLst>
+              <a:ext uri="{FF2B5EF4-FFF2-40B4-BE49-F238E27FC236}">
+                <a16:creationId xmlns:a16="http://schemas.microsoft.com/office/drawing/2014/main" id="{FEC4D2F5-1B5F-8B94-75B0-128AD20C2F6A}"/>
+              </a:ext>
+            </a:extLst>
+          </p:cNvPr>
+          <p:cNvSpPr/>
+          <p:nvPr/>
+        </p:nvSpPr>
+        <p:spPr>
+          <a:xfrm>
+            <a:off x="1175372" y="2544866"/>
+            <a:ext cx="4584078" cy="1750564"/>
+          </a:xfrm>
+          <a:prstGeom prst="roundRect">
+            <a:avLst>
+              <a:gd name="adj" fmla="val 0"/>
+            </a:avLst>
+          </a:prstGeom>
+          <a:solidFill>
+            <a:srgbClr val="7A263A"/>
+          </a:solidFill>
+          <a:ln w="101600">
+            <a:noFill/>
+          </a:ln>
+        </p:spPr>
+        <p:style>
+          <a:lnRef idx="2">
+            <a:schemeClr val="accent1">
+              <a:shade val="50000"/>
+            </a:schemeClr>
+          </a:lnRef>
+          <a:fillRef idx="1">
+            <a:schemeClr val="accent1"/>
+          </a:fillRef>
+          <a:effectRef idx="0">
+            <a:schemeClr val="accent1"/>
+          </a:effectRef>
+          <a:fontRef idx="minor">
+            <a:schemeClr val="lt1"/>
+          </a:fontRef>
+        </p:style>
+        <p:txBody>
+          <a:bodyPr rtlCol="0" anchor="ctr"/>
+          <a:lstStyle/>
+          <a:p>
+            <a:pPr algn="ctr"/>
+            <a:endParaRPr lang="en-GB" sz="1808">
+              <a:solidFill>
+                <a:srgbClr val="95BFE5"/>
+              </a:solidFill>
+            </a:endParaRPr>
+          </a:p>
+        </p:txBody>
+      </p:sp>
+      <p:sp>
+        <p:nvSpPr>
+          <p:cNvPr id="4" name="Rectangle: Rounded Corners 3">
+            <a:extLst>
+              <a:ext uri="{FF2B5EF4-FFF2-40B4-BE49-F238E27FC236}">
+                <a16:creationId xmlns:a16="http://schemas.microsoft.com/office/drawing/2014/main" id="{CAC95C35-1B48-AA1E-545D-C3E97BCC7321}"/>
+              </a:ext>
+            </a:extLst>
+          </p:cNvPr>
+          <p:cNvSpPr/>
+          <p:nvPr/>
+        </p:nvSpPr>
+        <p:spPr>
+          <a:xfrm>
+            <a:off x="1175372" y="-6979"/>
+            <a:ext cx="4584078" cy="2516715"/>
+          </a:xfrm>
+          <a:prstGeom prst="roundRect">
+            <a:avLst>
+              <a:gd name="adj" fmla="val 0"/>
+            </a:avLst>
+          </a:prstGeom>
+          <a:solidFill>
+            <a:srgbClr val="FEC601"/>
+          </a:solidFill>
+          <a:ln w="101600">
+            <a:noFill/>
+          </a:ln>
+        </p:spPr>
+        <p:style>
+          <a:lnRef idx="2">
+            <a:schemeClr val="accent1">
+              <a:shade val="50000"/>
+            </a:schemeClr>
+          </a:lnRef>
+          <a:fillRef idx="1">
+            <a:schemeClr val="accent1"/>
+          </a:fillRef>
+          <a:effectRef idx="0">
+            <a:schemeClr val="accent1"/>
+          </a:effectRef>
+          <a:fontRef idx="minor">
+            <a:schemeClr val="lt1"/>
+          </a:fontRef>
+        </p:style>
+        <p:txBody>
+          <a:bodyPr rtlCol="0" anchor="ctr"/>
+          <a:lstStyle/>
+          <a:p>
+            <a:pPr algn="ctr"/>
+            <a:endParaRPr lang="en-GB" sz="1808">
+              <a:solidFill>
+                <a:srgbClr val="95BFE5"/>
+              </a:solidFill>
+            </a:endParaRPr>
+          </a:p>
+        </p:txBody>
+      </p:sp>
+      <p:sp>
+        <p:nvSpPr>
+          <p:cNvPr id="5" name="Rectangle: Rounded Corners 4">
+            <a:extLst>
+              <a:ext uri="{FF2B5EF4-FFF2-40B4-BE49-F238E27FC236}">
+                <a16:creationId xmlns:a16="http://schemas.microsoft.com/office/drawing/2014/main" id="{4035679B-9375-4A3B-9740-2D1E7E3D6445}"/>
+              </a:ext>
+            </a:extLst>
+          </p:cNvPr>
+          <p:cNvSpPr/>
+          <p:nvPr/>
+        </p:nvSpPr>
+        <p:spPr>
+          <a:xfrm>
+            <a:off x="0" y="2544866"/>
+            <a:ext cx="1138136" cy="1750564"/>
+          </a:xfrm>
+          <a:prstGeom prst="roundRect">
+            <a:avLst>
+              <a:gd name="adj" fmla="val 0"/>
+            </a:avLst>
+          </a:prstGeom>
+          <a:solidFill>
+            <a:srgbClr val="2364AA"/>
+          </a:solidFill>
+          <a:ln w="101600">
+            <a:noFill/>
+          </a:ln>
+        </p:spPr>
+        <p:style>
+          <a:lnRef idx="2">
+            <a:schemeClr val="accent1">
+              <a:shade val="50000"/>
+            </a:schemeClr>
+          </a:lnRef>
+          <a:fillRef idx="1">
+            <a:schemeClr val="accent1"/>
+          </a:fillRef>
+          <a:effectRef idx="0">
+            <a:schemeClr val="accent1"/>
+          </a:effectRef>
+          <a:fontRef idx="minor">
+            <a:schemeClr val="lt1"/>
+          </a:fontRef>
+        </p:style>
+        <p:txBody>
+          <a:bodyPr rtlCol="0" anchor="ctr"/>
+          <a:lstStyle/>
+          <a:p>
+            <a:pPr algn="ctr"/>
+            <a:endParaRPr lang="en-GB" sz="1808">
+              <a:solidFill>
+                <a:srgbClr val="95BFE5"/>
+              </a:solidFill>
+            </a:endParaRPr>
+          </a:p>
+        </p:txBody>
+      </p:sp>
+      <p:sp>
+        <p:nvSpPr>
+          <p:cNvPr id="3" name="TextBox 2">
+            <a:extLst>
+              <a:ext uri="{FF2B5EF4-FFF2-40B4-BE49-F238E27FC236}">
+                <a16:creationId xmlns:a16="http://schemas.microsoft.com/office/drawing/2014/main" id="{56BA9D04-7576-0017-8F07-92AFBC13D6A6}"/>
+              </a:ext>
+            </a:extLst>
+          </p:cNvPr>
+          <p:cNvSpPr txBox="1"/>
+          <p:nvPr/>
+        </p:nvSpPr>
+        <p:spPr>
+          <a:xfrm>
+            <a:off x="1155920" y="2351235"/>
+            <a:ext cx="4584078" cy="1200329"/>
+          </a:xfrm>
+          <a:prstGeom prst="rect">
+            <a:avLst/>
+          </a:prstGeom>
+          <a:noFill/>
+        </p:spPr>
+        <p:txBody>
+          <a:bodyPr wrap="square" rtlCol="0">
+            <a:spAutoFit/>
+          </a:bodyPr>
+          <a:lstStyle/>
+          <a:p>
+            <a:r>
+              <a:rPr lang="en-GB" sz="7200" b="1">
+                <a:solidFill>
+                  <a:schemeClr val="bg1"/>
+                </a:solidFill>
+                <a:latin typeface="Android Insomnia" pitchFamily="2" charset="-128"/>
+                <a:ea typeface="Android Insomnia" pitchFamily="2" charset="-128"/>
+                <a:cs typeface="Android Insomnia" pitchFamily="2" charset="-128"/>
+              </a:rPr>
+              <a:t>causeway</a:t>
+            </a:r>
+          </a:p>
+        </p:txBody>
+      </p:sp>
+      <p:sp>
+        <p:nvSpPr>
+          <p:cNvPr id="10" name="TextBox 9">
+            <a:extLst>
+              <a:ext uri="{FF2B5EF4-FFF2-40B4-BE49-F238E27FC236}">
+                <a16:creationId xmlns:a16="http://schemas.microsoft.com/office/drawing/2014/main" id="{C64F2FFB-CDB5-6BCD-6256-EE2A05FDCE17}"/>
+              </a:ext>
+            </a:extLst>
+          </p:cNvPr>
+          <p:cNvSpPr txBox="1"/>
+          <p:nvPr/>
+        </p:nvSpPr>
+        <p:spPr>
+          <a:xfrm>
+            <a:off x="-75188" y="1760070"/>
+            <a:ext cx="1336806" cy="830997"/>
+          </a:xfrm>
+          <a:prstGeom prst="rect">
+            <a:avLst/>
+          </a:prstGeom>
+          <a:noFill/>
+        </p:spPr>
+        <p:txBody>
+          <a:bodyPr wrap="square" rtlCol="0">
+            <a:spAutoFit/>
+          </a:bodyPr>
+          <a:lstStyle/>
+          <a:p>
+            <a:r>
+              <a:rPr lang="en-US" sz="4800" b="1">
+                <a:solidFill>
+                  <a:schemeClr val="bg1"/>
+                </a:solidFill>
+                <a:latin typeface="Android Insomnia" pitchFamily="2" charset="-128"/>
+                <a:ea typeface="Android Insomnia" pitchFamily="2" charset="-128"/>
+                <a:cs typeface="Android Insomnia" pitchFamily="2" charset="-128"/>
+              </a:rPr>
+              <a:t>asf</a:t>
+            </a:r>
+            <a:endParaRPr lang="en-GB" sz="4800" b="1">
+              <a:solidFill>
+                <a:schemeClr val="bg1"/>
+              </a:solidFill>
+              <a:latin typeface="Android Insomnia" pitchFamily="2" charset="-128"/>
+              <a:ea typeface="Android Insomnia" pitchFamily="2" charset="-128"/>
+              <a:cs typeface="Android Insomnia" pitchFamily="2" charset="-128"/>
+            </a:endParaRPr>
+          </a:p>
+        </p:txBody>
+      </p:sp>
+    </p:spTree>
+    <p:extLst>
+      <p:ext uri="{BB962C8B-B14F-4D97-AF65-F5344CB8AC3E}">
+        <p14:creationId xmlns:p14="http://schemas.microsoft.com/office/powerpoint/2010/main" val="2424248051"/>
+      </p:ext>
+    </p:extLst>
+  </p:cSld>
+  <p:clrMapOvr>
+    <a:masterClrMapping/>
+  </p:clrMapOvr>
+</p:sld>
+</file>
+
+<file path=ppt/slides/slide6.xml><?xml version="1.0" encoding="utf-8"?>
+<p:sld xmlns:a="http://schemas.openxmlformats.org/drawingml/2006/main" xmlns:r="http://schemas.openxmlformats.org/officeDocument/2006/relationships" xmlns:p="http://schemas.openxmlformats.org/presentationml/2006/main">
+  <p:cSld>
+    <p:spTree>
+      <p:nvGrpSpPr>
+        <p:cNvPr id="1" name=""/>
+        <p:cNvGrpSpPr/>
+        <p:nvPr/>
+      </p:nvGrpSpPr>
+      <p:grpSpPr>
+        <a:xfrm>
+          <a:off x="0" y="0"/>
+          <a:ext cx="0" cy="0"/>
+          <a:chOff x="0" y="0"/>
+          <a:chExt cx="0" cy="0"/>
+        </a:xfrm>
+      </p:grpSpPr>
+      <p:sp>
+        <p:nvSpPr>
+          <p:cNvPr id="12" name="Rectangle: Rounded Corners 11">
+            <a:extLst>
+              <a:ext uri="{FF2B5EF4-FFF2-40B4-BE49-F238E27FC236}">
+                <a16:creationId xmlns:a16="http://schemas.microsoft.com/office/drawing/2014/main" id="{A31F33E6-48C6-2F14-D301-2E0B7985B91A}"/>
+              </a:ext>
+            </a:extLst>
+          </p:cNvPr>
+          <p:cNvSpPr/>
+          <p:nvPr/>
+        </p:nvSpPr>
+        <p:spPr>
+          <a:xfrm>
+            <a:off x="0" y="0"/>
+            <a:ext cx="1138136" cy="2509736"/>
+          </a:xfrm>
+          <a:prstGeom prst="roundRect">
+            <a:avLst>
+              <a:gd name="adj" fmla="val 0"/>
+            </a:avLst>
+          </a:prstGeom>
+          <a:solidFill>
+            <a:srgbClr val="5AB1BB"/>
+          </a:solidFill>
+          <a:ln w="101600">
+            <a:noFill/>
+          </a:ln>
+        </p:spPr>
+        <p:style>
+          <a:lnRef idx="2">
+            <a:schemeClr val="accent1">
+              <a:shade val="50000"/>
+            </a:schemeClr>
+          </a:lnRef>
+          <a:fillRef idx="1">
+            <a:schemeClr val="accent1"/>
+          </a:fillRef>
+          <a:effectRef idx="0">
+            <a:schemeClr val="accent1"/>
+          </a:effectRef>
+          <a:fontRef idx="minor">
+            <a:schemeClr val="lt1"/>
+          </a:fontRef>
+        </p:style>
+        <p:txBody>
+          <a:bodyPr rtlCol="0" anchor="ctr"/>
+          <a:lstStyle/>
+          <a:p>
+            <a:pPr algn="ctr"/>
+            <a:endParaRPr lang="en-GB" sz="1808">
+              <a:solidFill>
+                <a:srgbClr val="95BFE5"/>
+              </a:solidFill>
+            </a:endParaRPr>
+          </a:p>
+        </p:txBody>
+      </p:sp>
+      <p:sp>
+        <p:nvSpPr>
+          <p:cNvPr id="6" name="Rectangle: Rounded Corners 5">
+            <a:extLst>
+              <a:ext uri="{FF2B5EF4-FFF2-40B4-BE49-F238E27FC236}">
+                <a16:creationId xmlns:a16="http://schemas.microsoft.com/office/drawing/2014/main" id="{FEC4D2F5-1B5F-8B94-75B0-128AD20C2F6A}"/>
+              </a:ext>
+            </a:extLst>
+          </p:cNvPr>
+          <p:cNvSpPr/>
+          <p:nvPr/>
+        </p:nvSpPr>
+        <p:spPr>
+          <a:xfrm>
+            <a:off x="1175372" y="2544866"/>
+            <a:ext cx="4584078" cy="1750564"/>
+          </a:xfrm>
+          <a:prstGeom prst="roundRect">
+            <a:avLst>
+              <a:gd name="adj" fmla="val 0"/>
+            </a:avLst>
+          </a:prstGeom>
+          <a:solidFill>
+            <a:srgbClr val="7A263A"/>
+          </a:solidFill>
+          <a:ln w="101600">
+            <a:noFill/>
+          </a:ln>
+        </p:spPr>
+        <p:style>
+          <a:lnRef idx="2">
+            <a:schemeClr val="accent1">
+              <a:shade val="50000"/>
+            </a:schemeClr>
+          </a:lnRef>
+          <a:fillRef idx="1">
+            <a:schemeClr val="accent1"/>
+          </a:fillRef>
+          <a:effectRef idx="0">
+            <a:schemeClr val="accent1"/>
+          </a:effectRef>
+          <a:fontRef idx="minor">
+            <a:schemeClr val="lt1"/>
+          </a:fontRef>
+        </p:style>
+        <p:txBody>
+          <a:bodyPr rtlCol="0" anchor="ctr"/>
+          <a:lstStyle/>
+          <a:p>
+            <a:pPr algn="ctr"/>
+            <a:endParaRPr lang="en-GB" sz="1808">
+              <a:solidFill>
+                <a:srgbClr val="95BFE5"/>
+              </a:solidFill>
+            </a:endParaRPr>
+          </a:p>
+        </p:txBody>
+      </p:sp>
+      <p:sp>
+        <p:nvSpPr>
+          <p:cNvPr id="4" name="Rectangle: Rounded Corners 3">
+            <a:extLst>
+              <a:ext uri="{FF2B5EF4-FFF2-40B4-BE49-F238E27FC236}">
+                <a16:creationId xmlns:a16="http://schemas.microsoft.com/office/drawing/2014/main" id="{CAC95C35-1B48-AA1E-545D-C3E97BCC7321}"/>
+              </a:ext>
+            </a:extLst>
+          </p:cNvPr>
+          <p:cNvSpPr/>
+          <p:nvPr/>
+        </p:nvSpPr>
+        <p:spPr>
+          <a:xfrm>
+            <a:off x="1175372" y="-6979"/>
+            <a:ext cx="4584078" cy="2516715"/>
+          </a:xfrm>
+          <a:prstGeom prst="roundRect">
+            <a:avLst>
+              <a:gd name="adj" fmla="val 0"/>
+            </a:avLst>
+          </a:prstGeom>
+          <a:solidFill>
+            <a:srgbClr val="FEC601"/>
+          </a:solidFill>
+          <a:ln w="101600">
+            <a:noFill/>
+          </a:ln>
+        </p:spPr>
+        <p:style>
+          <a:lnRef idx="2">
+            <a:schemeClr val="accent1">
+              <a:shade val="50000"/>
+            </a:schemeClr>
+          </a:lnRef>
+          <a:fillRef idx="1">
+            <a:schemeClr val="accent1"/>
+          </a:fillRef>
+          <a:effectRef idx="0">
+            <a:schemeClr val="accent1"/>
+          </a:effectRef>
+          <a:fontRef idx="minor">
+            <a:schemeClr val="lt1"/>
+          </a:fontRef>
+        </p:style>
+        <p:txBody>
+          <a:bodyPr rtlCol="0" anchor="ctr"/>
+          <a:lstStyle/>
+          <a:p>
+            <a:pPr algn="ctr"/>
+            <a:endParaRPr lang="en-GB" sz="1808">
+              <a:solidFill>
+                <a:srgbClr val="95BFE5"/>
+              </a:solidFill>
+            </a:endParaRPr>
+          </a:p>
+        </p:txBody>
+      </p:sp>
+      <p:sp>
+        <p:nvSpPr>
+          <p:cNvPr id="5" name="Rectangle: Rounded Corners 4">
+            <a:extLst>
+              <a:ext uri="{FF2B5EF4-FFF2-40B4-BE49-F238E27FC236}">
+                <a16:creationId xmlns:a16="http://schemas.microsoft.com/office/drawing/2014/main" id="{4035679B-9375-4A3B-9740-2D1E7E3D6445}"/>
+              </a:ext>
+            </a:extLst>
+          </p:cNvPr>
+          <p:cNvSpPr/>
+          <p:nvPr/>
+        </p:nvSpPr>
+        <p:spPr>
+          <a:xfrm>
+            <a:off x="0" y="2544866"/>
+            <a:ext cx="1138136" cy="1750564"/>
+          </a:xfrm>
+          <a:prstGeom prst="roundRect">
+            <a:avLst>
+              <a:gd name="adj" fmla="val 0"/>
+            </a:avLst>
+          </a:prstGeom>
+          <a:solidFill>
+            <a:srgbClr val="2364AA"/>
+          </a:solidFill>
+          <a:ln w="101600">
+            <a:noFill/>
+          </a:ln>
+        </p:spPr>
+        <p:style>
+          <a:lnRef idx="2">
+            <a:schemeClr val="accent1">
+              <a:shade val="50000"/>
+            </a:schemeClr>
+          </a:lnRef>
+          <a:fillRef idx="1">
+            <a:schemeClr val="accent1"/>
+          </a:fillRef>
+          <a:effectRef idx="0">
+            <a:schemeClr val="accent1"/>
+          </a:effectRef>
+          <a:fontRef idx="minor">
+            <a:schemeClr val="lt1"/>
+          </a:fontRef>
+        </p:style>
+        <p:txBody>
+          <a:bodyPr rtlCol="0" anchor="ctr"/>
+          <a:lstStyle/>
+          <a:p>
+            <a:pPr algn="ctr"/>
+            <a:endParaRPr lang="en-GB" sz="1808">
+              <a:solidFill>
+                <a:srgbClr val="95BFE5"/>
+              </a:solidFill>
+            </a:endParaRPr>
+          </a:p>
+        </p:txBody>
+      </p:sp>
+      <p:sp>
+        <p:nvSpPr>
+          <p:cNvPr id="3" name="TextBox 2">
+            <a:extLst>
+              <a:ext uri="{FF2B5EF4-FFF2-40B4-BE49-F238E27FC236}">
+                <a16:creationId xmlns:a16="http://schemas.microsoft.com/office/drawing/2014/main" id="{56BA9D04-7576-0017-8F07-92AFBC13D6A6}"/>
+              </a:ext>
+            </a:extLst>
+          </p:cNvPr>
+          <p:cNvSpPr txBox="1"/>
+          <p:nvPr/>
+        </p:nvSpPr>
+        <p:spPr>
+          <a:xfrm>
+            <a:off x="1155920" y="2351235"/>
+            <a:ext cx="4584078" cy="1200329"/>
+          </a:xfrm>
+          <a:prstGeom prst="rect">
+            <a:avLst/>
+          </a:prstGeom>
+          <a:noFill/>
+        </p:spPr>
+        <p:txBody>
+          <a:bodyPr wrap="square" rtlCol="0">
+            <a:spAutoFit/>
+          </a:bodyPr>
+          <a:lstStyle/>
+          <a:p>
+            <a:r>
+              <a:rPr lang="en-GB" sz="7200" b="1">
+                <a:solidFill>
+                  <a:schemeClr val="bg1"/>
+                </a:solidFill>
+                <a:latin typeface="Android Insomnia" pitchFamily="2" charset="-128"/>
+                <a:ea typeface="Android Insomnia" pitchFamily="2" charset="-128"/>
+                <a:cs typeface="Android Insomnia" pitchFamily="2" charset="-128"/>
+              </a:rPr>
+              <a:t>causeway</a:t>
+            </a:r>
+          </a:p>
+        </p:txBody>
+      </p:sp>
+      <p:sp>
+        <p:nvSpPr>
+          <p:cNvPr id="10" name="TextBox 9">
+            <a:extLst>
+              <a:ext uri="{FF2B5EF4-FFF2-40B4-BE49-F238E27FC236}">
+                <a16:creationId xmlns:a16="http://schemas.microsoft.com/office/drawing/2014/main" id="{C64F2FFB-CDB5-6BCD-6256-EE2A05FDCE17}"/>
+              </a:ext>
+            </a:extLst>
+          </p:cNvPr>
+          <p:cNvSpPr txBox="1"/>
+          <p:nvPr/>
+        </p:nvSpPr>
+        <p:spPr>
+          <a:xfrm>
+            <a:off x="-75188" y="1760070"/>
+            <a:ext cx="1336806" cy="830997"/>
+          </a:xfrm>
+          <a:prstGeom prst="rect">
+            <a:avLst/>
+          </a:prstGeom>
+          <a:noFill/>
+        </p:spPr>
+        <p:txBody>
+          <a:bodyPr wrap="square" rtlCol="0">
+            <a:spAutoFit/>
+          </a:bodyPr>
+          <a:lstStyle/>
+          <a:p>
+            <a:r>
+              <a:rPr lang="en-US" sz="4800" b="1">
+                <a:solidFill>
+                  <a:schemeClr val="bg1"/>
+                </a:solidFill>
+                <a:latin typeface="Android Insomnia" pitchFamily="2" charset="-128"/>
+                <a:ea typeface="Android Insomnia" pitchFamily="2" charset="-128"/>
+                <a:cs typeface="Android Insomnia" pitchFamily="2" charset="-128"/>
+              </a:rPr>
+              <a:t>asf</a:t>
+            </a:r>
+            <a:endParaRPr lang="en-GB" sz="4800" b="1">
+              <a:solidFill>
+                <a:schemeClr val="bg1"/>
+              </a:solidFill>
+              <a:latin typeface="Android Insomnia" pitchFamily="2" charset="-128"/>
+              <a:ea typeface="Android Insomnia" pitchFamily="2" charset="-128"/>
+              <a:cs typeface="Android Insomnia" pitchFamily="2" charset="-128"/>
+            </a:endParaRPr>
+          </a:p>
+        </p:txBody>
+      </p:sp>
+    </p:spTree>
+    <p:extLst>
+      <p:ext uri="{BB962C8B-B14F-4D97-AF65-F5344CB8AC3E}">
+        <p14:creationId xmlns:p14="http://schemas.microsoft.com/office/powerpoint/2010/main" val="1760134204"/>
+      </p:ext>
+    </p:extLst>
+  </p:cSld>
+  <p:clrMapOvr>
+    <a:masterClrMapping/>
+  </p:clrMapOvr>
+</p:sld>
+</file>
+
+<file path=ppt/slides/slide7.xml><?xml version="1.0" encoding="utf-8"?>
+<p:sld xmlns:a="http://schemas.openxmlformats.org/drawingml/2006/main" xmlns:r="http://schemas.openxmlformats.org/officeDocument/2006/relationships" xmlns:p="http://schemas.openxmlformats.org/presentationml/2006/main">
+  <p:cSld>
+    <p:spTree>
+      <p:nvGrpSpPr>
+        <p:cNvPr id="1" name=""/>
+        <p:cNvGrpSpPr/>
+        <p:nvPr/>
+      </p:nvGrpSpPr>
+      <p:grpSpPr>
+        <a:xfrm>
+          <a:off x="0" y="0"/>
+          <a:ext cx="0" cy="0"/>
+          <a:chOff x="0" y="0"/>
+          <a:chExt cx="0" cy="0"/>
+        </a:xfrm>
+      </p:grpSpPr>
+      <p:sp>
+        <p:nvSpPr>
+          <p:cNvPr id="12" name="Rectangle: Rounded Corners 11">
+            <a:extLst>
+              <a:ext uri="{FF2B5EF4-FFF2-40B4-BE49-F238E27FC236}">
+                <a16:creationId xmlns:a16="http://schemas.microsoft.com/office/drawing/2014/main" id="{A31F33E6-48C6-2F14-D301-2E0B7985B91A}"/>
+              </a:ext>
+            </a:extLst>
+          </p:cNvPr>
+          <p:cNvSpPr/>
+          <p:nvPr/>
+        </p:nvSpPr>
+        <p:spPr>
+          <a:xfrm>
+            <a:off x="0" y="0"/>
+            <a:ext cx="695529" cy="2006503"/>
+          </a:xfrm>
+          <a:prstGeom prst="roundRect">
+            <a:avLst>
+              <a:gd name="adj" fmla="val 10358"/>
+            </a:avLst>
+          </a:prstGeom>
+          <a:solidFill>
+            <a:srgbClr val="5AB1BB"/>
+          </a:solidFill>
+          <a:ln w="101600">
+            <a:noFill/>
+          </a:ln>
+        </p:spPr>
+        <p:style>
+          <a:lnRef idx="2">
+            <a:schemeClr val="accent1">
+              <a:shade val="50000"/>
+            </a:schemeClr>
+          </a:lnRef>
+          <a:fillRef idx="1">
+            <a:schemeClr val="accent1"/>
+          </a:fillRef>
+          <a:effectRef idx="0">
+            <a:schemeClr val="accent1"/>
+          </a:effectRef>
+          <a:fontRef idx="minor">
+            <a:schemeClr val="lt1"/>
+          </a:fontRef>
+        </p:style>
+        <p:txBody>
+          <a:bodyPr rtlCol="0" anchor="ctr"/>
+          <a:lstStyle/>
+          <a:p>
+            <a:pPr algn="ctr"/>
+            <a:endParaRPr lang="en-GB" sz="1808">
+              <a:solidFill>
+                <a:srgbClr val="95BFE5"/>
+              </a:solidFill>
+            </a:endParaRPr>
+          </a:p>
+        </p:txBody>
+      </p:sp>
+      <p:sp>
+        <p:nvSpPr>
+          <p:cNvPr id="6" name="Rectangle: Rounded Corners 5">
+            <a:extLst>
+              <a:ext uri="{FF2B5EF4-FFF2-40B4-BE49-F238E27FC236}">
+                <a16:creationId xmlns:a16="http://schemas.microsoft.com/office/drawing/2014/main" id="{FEC4D2F5-1B5F-8B94-75B0-128AD20C2F6A}"/>
+              </a:ext>
+            </a:extLst>
+          </p:cNvPr>
+          <p:cNvSpPr/>
+          <p:nvPr/>
+        </p:nvSpPr>
+        <p:spPr>
+          <a:xfrm>
+            <a:off x="1383957" y="2967174"/>
+            <a:ext cx="4375493" cy="1328256"/>
+          </a:xfrm>
+          <a:prstGeom prst="roundRect">
+            <a:avLst>
+              <a:gd name="adj" fmla="val 6160"/>
+            </a:avLst>
+          </a:prstGeom>
+          <a:solidFill>
+            <a:srgbClr val="EEB4B3"/>
+          </a:solidFill>
+          <a:ln w="101600">
+            <a:noFill/>
+          </a:ln>
+        </p:spPr>
+        <p:style>
+          <a:lnRef idx="2">
+            <a:schemeClr val="accent1">
+              <a:shade val="50000"/>
+            </a:schemeClr>
+          </a:lnRef>
+          <a:fillRef idx="1">
+            <a:schemeClr val="accent1"/>
+          </a:fillRef>
+          <a:effectRef idx="0">
+            <a:schemeClr val="accent1"/>
+          </a:effectRef>
+          <a:fontRef idx="minor">
+            <a:schemeClr val="lt1"/>
+          </a:fontRef>
+        </p:style>
+        <p:txBody>
+          <a:bodyPr rtlCol="0" anchor="ctr"/>
+          <a:lstStyle/>
+          <a:p>
+            <a:pPr algn="ctr"/>
+            <a:endParaRPr lang="en-GB" sz="1808">
+              <a:solidFill>
+                <a:srgbClr val="95BFE5"/>
+              </a:solidFill>
+            </a:endParaRPr>
+          </a:p>
+        </p:txBody>
+      </p:sp>
+      <p:sp>
+        <p:nvSpPr>
+          <p:cNvPr id="4" name="Rectangle: Rounded Corners 3">
+            <a:extLst>
+              <a:ext uri="{FF2B5EF4-FFF2-40B4-BE49-F238E27FC236}">
+                <a16:creationId xmlns:a16="http://schemas.microsoft.com/office/drawing/2014/main" id="{CAC95C35-1B48-AA1E-545D-C3E97BCC7321}"/>
+              </a:ext>
+            </a:extLst>
+          </p:cNvPr>
+          <p:cNvSpPr/>
+          <p:nvPr/>
+        </p:nvSpPr>
+        <p:spPr>
+          <a:xfrm>
+            <a:off x="1386190" y="-6979"/>
+            <a:ext cx="4375493" cy="2015741"/>
+          </a:xfrm>
+          <a:prstGeom prst="roundRect">
+            <a:avLst>
+              <a:gd name="adj" fmla="val 3933"/>
+            </a:avLst>
+          </a:prstGeom>
+          <a:solidFill>
+            <a:srgbClr val="FEC601"/>
+          </a:solidFill>
+          <a:ln w="101600">
+            <a:noFill/>
+          </a:ln>
+        </p:spPr>
+        <p:style>
+          <a:lnRef idx="2">
+            <a:schemeClr val="accent1">
+              <a:shade val="50000"/>
+            </a:schemeClr>
+          </a:lnRef>
+          <a:fillRef idx="1">
+            <a:schemeClr val="accent1"/>
+          </a:fillRef>
+          <a:effectRef idx="0">
+            <a:schemeClr val="accent1"/>
+          </a:effectRef>
+          <a:fontRef idx="minor">
+            <a:schemeClr val="lt1"/>
+          </a:fontRef>
+        </p:style>
+        <p:txBody>
+          <a:bodyPr rtlCol="0" anchor="ctr"/>
+          <a:lstStyle/>
+          <a:p>
+            <a:pPr algn="ctr"/>
+            <a:endParaRPr lang="en-GB" sz="1808">
+              <a:solidFill>
+                <a:srgbClr val="95BFE5"/>
+              </a:solidFill>
+            </a:endParaRPr>
+          </a:p>
+        </p:txBody>
+      </p:sp>
+      <p:sp>
+        <p:nvSpPr>
+          <p:cNvPr id="5" name="Rectangle: Rounded Corners 4">
+            <a:extLst>
+              <a:ext uri="{FF2B5EF4-FFF2-40B4-BE49-F238E27FC236}">
+                <a16:creationId xmlns:a16="http://schemas.microsoft.com/office/drawing/2014/main" id="{4035679B-9375-4A3B-9740-2D1E7E3D6445}"/>
+              </a:ext>
+            </a:extLst>
+          </p:cNvPr>
+          <p:cNvSpPr/>
+          <p:nvPr/>
+        </p:nvSpPr>
+        <p:spPr>
+          <a:xfrm>
+            <a:off x="-3561" y="2958624"/>
+            <a:ext cx="699090" cy="1336806"/>
+          </a:xfrm>
+          <a:prstGeom prst="roundRect">
+            <a:avLst>
+              <a:gd name="adj" fmla="val 10224"/>
+            </a:avLst>
+          </a:prstGeom>
+          <a:solidFill>
+            <a:srgbClr val="2364AA"/>
+          </a:solidFill>
+          <a:ln w="101600">
+            <a:noFill/>
+          </a:ln>
+        </p:spPr>
+        <p:style>
+          <a:lnRef idx="2">
+            <a:schemeClr val="accent1">
+              <a:shade val="50000"/>
+            </a:schemeClr>
+          </a:lnRef>
+          <a:fillRef idx="1">
+            <a:schemeClr val="accent1"/>
+          </a:fillRef>
+          <a:effectRef idx="0">
+            <a:schemeClr val="accent1"/>
+          </a:effectRef>
+          <a:fontRef idx="minor">
+            <a:schemeClr val="lt1"/>
+          </a:fontRef>
+        </p:style>
+        <p:txBody>
+          <a:bodyPr rtlCol="0" anchor="ctr"/>
+          <a:lstStyle/>
+          <a:p>
+            <a:pPr algn="ctr"/>
+            <a:endParaRPr lang="en-GB" sz="1808">
+              <a:solidFill>
+                <a:srgbClr val="95BFE5"/>
+              </a:solidFill>
+            </a:endParaRPr>
+          </a:p>
+        </p:txBody>
+      </p:sp>
+      <p:sp>
+        <p:nvSpPr>
+          <p:cNvPr id="8" name="Rectangle 10">
+            <a:extLst>
+              <a:ext uri="{FF2B5EF4-FFF2-40B4-BE49-F238E27FC236}">
+                <a16:creationId xmlns:a16="http://schemas.microsoft.com/office/drawing/2014/main" id="{9DF4A75E-FDF7-67AB-AE8C-81BE4D542A18}"/>
+              </a:ext>
+            </a:extLst>
+          </p:cNvPr>
+          <p:cNvSpPr/>
+          <p:nvPr/>
+        </p:nvSpPr>
+        <p:spPr>
+          <a:xfrm rot="5400000">
+            <a:off x="5532294" y="2946357"/>
+            <a:ext cx="318232" cy="180684"/>
+          </a:xfrm>
+          <a:custGeom>
+            <a:avLst/>
+            <a:gdLst>
+              <a:gd name="connsiteX0" fmla="*/ 0 w 471699"/>
+              <a:gd name="connsiteY0" fmla="*/ 0 h 238462"/>
+              <a:gd name="connsiteX1" fmla="*/ 471699 w 471699"/>
+              <a:gd name="connsiteY1" fmla="*/ 0 h 238462"/>
+              <a:gd name="connsiteX2" fmla="*/ 471699 w 471699"/>
+              <a:gd name="connsiteY2" fmla="*/ 238462 h 238462"/>
+              <a:gd name="connsiteX3" fmla="*/ 0 w 471699"/>
+              <a:gd name="connsiteY3" fmla="*/ 238462 h 238462"/>
+              <a:gd name="connsiteX4" fmla="*/ 0 w 471699"/>
+              <a:gd name="connsiteY4" fmla="*/ 0 h 238462"/>
+              <a:gd name="connsiteX0" fmla="*/ 0 w 471699"/>
+              <a:gd name="connsiteY0" fmla="*/ 0 h 238462"/>
+              <a:gd name="connsiteX1" fmla="*/ 268881 w 471699"/>
+              <a:gd name="connsiteY1" fmla="*/ 3437 h 238462"/>
+              <a:gd name="connsiteX2" fmla="*/ 471699 w 471699"/>
+              <a:gd name="connsiteY2" fmla="*/ 238462 h 238462"/>
+              <a:gd name="connsiteX3" fmla="*/ 0 w 471699"/>
+              <a:gd name="connsiteY3" fmla="*/ 238462 h 238462"/>
+              <a:gd name="connsiteX4" fmla="*/ 0 w 471699"/>
+              <a:gd name="connsiteY4" fmla="*/ 0 h 238462"/>
+              <a:gd name="connsiteX0" fmla="*/ 0 w 471699"/>
+              <a:gd name="connsiteY0" fmla="*/ 0 h 238462"/>
+              <a:gd name="connsiteX1" fmla="*/ 263208 w 471699"/>
+              <a:gd name="connsiteY1" fmla="*/ 3437 h 238462"/>
+              <a:gd name="connsiteX2" fmla="*/ 471699 w 471699"/>
+              <a:gd name="connsiteY2" fmla="*/ 238462 h 238462"/>
+              <a:gd name="connsiteX3" fmla="*/ 0 w 471699"/>
+              <a:gd name="connsiteY3" fmla="*/ 238462 h 238462"/>
+              <a:gd name="connsiteX4" fmla="*/ 0 w 471699"/>
+              <a:gd name="connsiteY4" fmla="*/ 0 h 238462"/>
+            </a:gdLst>
+            <a:ahLst/>
+            <a:cxnLst>
+              <a:cxn ang="0">
+                <a:pos x="connsiteX0" y="connsiteY0"/>
+              </a:cxn>
+              <a:cxn ang="0">
+                <a:pos x="connsiteX1" y="connsiteY1"/>
+              </a:cxn>
+              <a:cxn ang="0">
+                <a:pos x="connsiteX2" y="connsiteY2"/>
+              </a:cxn>
+              <a:cxn ang="0">
+                <a:pos x="connsiteX3" y="connsiteY3"/>
+              </a:cxn>
+              <a:cxn ang="0">
+                <a:pos x="connsiteX4" y="connsiteY4"/>
+              </a:cxn>
+            </a:cxnLst>
+            <a:rect l="l" t="t" r="r" b="b"/>
+            <a:pathLst>
+              <a:path w="471699" h="238462">
+                <a:moveTo>
+                  <a:pt x="0" y="0"/>
+                </a:moveTo>
+                <a:lnTo>
+                  <a:pt x="263208" y="3437"/>
+                </a:lnTo>
+                <a:lnTo>
+                  <a:pt x="471699" y="238462"/>
+                </a:lnTo>
+                <a:lnTo>
+                  <a:pt x="0" y="238462"/>
+                </a:lnTo>
+                <a:lnTo>
+                  <a:pt x="0" y="0"/>
+                </a:lnTo>
+                <a:close/>
+              </a:path>
+            </a:pathLst>
+          </a:custGeom>
+          <a:solidFill>
+            <a:schemeClr val="bg1"/>
+          </a:solidFill>
+          <a:ln>
+            <a:noFill/>
+          </a:ln>
+        </p:spPr>
+        <p:style>
+          <a:lnRef idx="2">
+            <a:schemeClr val="accent1">
+              <a:shade val="50000"/>
+            </a:schemeClr>
+          </a:lnRef>
+          <a:fillRef idx="1">
+            <a:schemeClr val="accent1"/>
+          </a:fillRef>
+          <a:effectRef idx="0">
+            <a:schemeClr val="accent1"/>
+          </a:effectRef>
+          <a:fontRef idx="minor">
+            <a:schemeClr val="lt1"/>
+          </a:fontRef>
+        </p:style>
+        <p:txBody>
+          <a:bodyPr rtlCol="0" anchor="ctr"/>
+          <a:lstStyle/>
+          <a:p>
+            <a:pPr algn="ctr"/>
+            <a:endParaRPr lang="en-GB" sz="1808"/>
+          </a:p>
+        </p:txBody>
+      </p:sp>
+      <p:sp>
+        <p:nvSpPr>
+          <p:cNvPr id="3" name="TextBox 2">
+            <a:extLst>
+              <a:ext uri="{FF2B5EF4-FFF2-40B4-BE49-F238E27FC236}">
+                <a16:creationId xmlns:a16="http://schemas.microsoft.com/office/drawing/2014/main" id="{56BA9D04-7576-0017-8F07-92AFBC13D6A6}"/>
+              </a:ext>
+            </a:extLst>
+          </p:cNvPr>
+          <p:cNvSpPr txBox="1"/>
+          <p:nvPr/>
+        </p:nvSpPr>
+        <p:spPr>
+          <a:xfrm>
+            <a:off x="-168587" y="1650843"/>
+            <a:ext cx="7397574" cy="1576625"/>
+          </a:xfrm>
+          <a:prstGeom prst="rect">
+            <a:avLst/>
+          </a:prstGeom>
+          <a:noFill/>
+        </p:spPr>
+        <p:txBody>
+          <a:bodyPr wrap="square" rtlCol="0">
+            <a:spAutoFit/>
+          </a:bodyPr>
+          <a:lstStyle/>
+          <a:p>
+            <a:r>
+              <a:rPr lang="en-GB" sz="9644" b="1">
+                <a:solidFill>
+                  <a:srgbClr val="7A263A"/>
+                </a:solidFill>
+                <a:latin typeface="Android Insomnia" pitchFamily="2" charset="-128"/>
+                <a:ea typeface="Android Insomnia" pitchFamily="2" charset="-128"/>
+                <a:cs typeface="Android Insomnia" pitchFamily="2" charset="-128"/>
+              </a:rPr>
+              <a:t>causeway</a:t>
+            </a:r>
+          </a:p>
+        </p:txBody>
+      </p:sp>
+      <p:sp>
+        <p:nvSpPr>
+          <p:cNvPr id="10" name="TextBox 9">
+            <a:extLst>
+              <a:ext uri="{FF2B5EF4-FFF2-40B4-BE49-F238E27FC236}">
+                <a16:creationId xmlns:a16="http://schemas.microsoft.com/office/drawing/2014/main" id="{C64F2FFB-CDB5-6BCD-6256-EE2A05FDCE17}"/>
+              </a:ext>
+            </a:extLst>
+          </p:cNvPr>
+          <p:cNvSpPr txBox="1"/>
+          <p:nvPr/>
+        </p:nvSpPr>
+        <p:spPr>
+          <a:xfrm rot="16200000">
+            <a:off x="-289194" y="904038"/>
+            <a:ext cx="1336806" cy="830997"/>
+          </a:xfrm>
+          <a:prstGeom prst="rect">
+            <a:avLst/>
+          </a:prstGeom>
+          <a:noFill/>
+        </p:spPr>
+        <p:txBody>
+          <a:bodyPr wrap="square" rtlCol="0">
+            <a:spAutoFit/>
+          </a:bodyPr>
+          <a:lstStyle/>
+          <a:p>
+            <a:r>
+              <a:rPr lang="en-US" sz="4800" b="1">
+                <a:solidFill>
+                  <a:schemeClr val="bg1"/>
+                </a:solidFill>
+                <a:latin typeface="Android Insomnia" pitchFamily="2" charset="-128"/>
+                <a:ea typeface="Android Insomnia" pitchFamily="2" charset="-128"/>
+                <a:cs typeface="Android Insomnia" pitchFamily="2" charset="-128"/>
+              </a:rPr>
+              <a:t>A</a:t>
+            </a:r>
+            <a:r>
+              <a:rPr lang="en-GB" sz="4800" b="1">
+                <a:solidFill>
+                  <a:schemeClr val="bg1"/>
+                </a:solidFill>
+                <a:latin typeface="Android Insomnia" pitchFamily="2" charset="-128"/>
+                <a:ea typeface="Android Insomnia" pitchFamily="2" charset="-128"/>
+                <a:cs typeface="Android Insomnia" pitchFamily="2" charset="-128"/>
+              </a:rPr>
+              <a:t>SF</a:t>
+            </a:r>
+          </a:p>
+        </p:txBody>
+      </p:sp>
+    </p:spTree>
+    <p:extLst>
+      <p:ext uri="{BB962C8B-B14F-4D97-AF65-F5344CB8AC3E}">
+        <p14:creationId xmlns:p14="http://schemas.microsoft.com/office/powerpoint/2010/main" val="4158817270"/>
+      </p:ext>
+    </p:extLst>
+  </p:cSld>
+  <p:clrMapOvr>
+    <a:masterClrMapping/>
+  </p:clrMapOvr>
+</p:sld>
+</file>
+
+<file path=ppt/slides/slide8.xml><?xml version="1.0" encoding="utf-8"?>
+<p:sld xmlns:a="http://schemas.openxmlformats.org/drawingml/2006/main" xmlns:r="http://schemas.openxmlformats.org/officeDocument/2006/relationships" xmlns:p="http://schemas.openxmlformats.org/presentationml/2006/main">
+  <p:cSld>
+    <p:spTree>
+      <p:nvGrpSpPr>
+        <p:cNvPr id="1" name=""/>
+        <p:cNvGrpSpPr/>
+        <p:nvPr/>
+      </p:nvGrpSpPr>
+      <p:grpSpPr>
+        <a:xfrm>
+          <a:off x="0" y="0"/>
+          <a:ext cx="0" cy="0"/>
+          <a:chOff x="0" y="0"/>
+          <a:chExt cx="0" cy="0"/>
+        </a:xfrm>
+      </p:grpSpPr>
+      <p:sp>
+        <p:nvSpPr>
+          <p:cNvPr id="12" name="Rectangle: Rounded Corners 11">
+            <a:extLst>
+              <a:ext uri="{FF2B5EF4-FFF2-40B4-BE49-F238E27FC236}">
+                <a16:creationId xmlns:a16="http://schemas.microsoft.com/office/drawing/2014/main" id="{A31F33E6-48C6-2F14-D301-2E0B7985B91A}"/>
+              </a:ext>
+            </a:extLst>
+          </p:cNvPr>
+          <p:cNvSpPr/>
+          <p:nvPr/>
+        </p:nvSpPr>
+        <p:spPr>
+          <a:xfrm>
+            <a:off x="0" y="0"/>
+            <a:ext cx="746069" cy="2006503"/>
+          </a:xfrm>
+          <a:prstGeom prst="roundRect">
+            <a:avLst>
+              <a:gd name="adj" fmla="val 10358"/>
+            </a:avLst>
+          </a:prstGeom>
+          <a:solidFill>
+            <a:srgbClr val="5AB1BB"/>
+          </a:solidFill>
+          <a:ln w="101600">
+            <a:noFill/>
+          </a:ln>
+        </p:spPr>
+        <p:style>
+          <a:lnRef idx="2">
+            <a:schemeClr val="accent1">
+              <a:shade val="50000"/>
+            </a:schemeClr>
+          </a:lnRef>
+          <a:fillRef idx="1">
+            <a:schemeClr val="accent1"/>
+          </a:fillRef>
+          <a:effectRef idx="0">
+            <a:schemeClr val="accent1"/>
+          </a:effectRef>
+          <a:fontRef idx="minor">
+            <a:schemeClr val="lt1"/>
+          </a:fontRef>
+        </p:style>
+        <p:txBody>
+          <a:bodyPr rtlCol="0" anchor="ctr"/>
+          <a:lstStyle/>
+          <a:p>
+            <a:pPr algn="ctr"/>
+            <a:endParaRPr lang="en-GB" sz="1808">
+              <a:solidFill>
+                <a:srgbClr val="95BFE5"/>
+              </a:solidFill>
+            </a:endParaRPr>
+          </a:p>
+        </p:txBody>
+      </p:sp>
+      <p:sp>
+        <p:nvSpPr>
+          <p:cNvPr id="6" name="Rectangle: Rounded Corners 5">
+            <a:extLst>
+              <a:ext uri="{FF2B5EF4-FFF2-40B4-BE49-F238E27FC236}">
+                <a16:creationId xmlns:a16="http://schemas.microsoft.com/office/drawing/2014/main" id="{FEC4D2F5-1B5F-8B94-75B0-128AD20C2F6A}"/>
+              </a:ext>
+            </a:extLst>
+          </p:cNvPr>
+          <p:cNvSpPr/>
+          <p:nvPr/>
+        </p:nvSpPr>
+        <p:spPr>
+          <a:xfrm>
+            <a:off x="1332689" y="2965606"/>
+            <a:ext cx="4429005" cy="1328256"/>
+          </a:xfrm>
+          <a:prstGeom prst="roundRect">
+            <a:avLst>
+              <a:gd name="adj" fmla="val 6160"/>
+            </a:avLst>
+          </a:prstGeom>
+          <a:solidFill>
+            <a:srgbClr val="EEB4B3"/>
+          </a:solidFill>
+          <a:ln w="101600">
+            <a:noFill/>
+          </a:ln>
+        </p:spPr>
+        <p:style>
+          <a:lnRef idx="2">
+            <a:schemeClr val="accent1">
+              <a:shade val="50000"/>
+            </a:schemeClr>
+          </a:lnRef>
+          <a:fillRef idx="1">
+            <a:schemeClr val="accent1"/>
+          </a:fillRef>
+          <a:effectRef idx="0">
+            <a:schemeClr val="accent1"/>
+          </a:effectRef>
+          <a:fontRef idx="minor">
+            <a:schemeClr val="lt1"/>
+          </a:fontRef>
+        </p:style>
+        <p:txBody>
+          <a:bodyPr rtlCol="0" anchor="ctr"/>
+          <a:lstStyle/>
+          <a:p>
+            <a:pPr algn="ctr"/>
+            <a:endParaRPr lang="en-GB" sz="1808">
+              <a:solidFill>
+                <a:srgbClr val="95BFE5"/>
+              </a:solidFill>
+            </a:endParaRPr>
+          </a:p>
+        </p:txBody>
+      </p:sp>
+      <p:sp>
+        <p:nvSpPr>
+          <p:cNvPr id="4" name="Rectangle: Rounded Corners 3">
+            <a:extLst>
+              <a:ext uri="{FF2B5EF4-FFF2-40B4-BE49-F238E27FC236}">
+                <a16:creationId xmlns:a16="http://schemas.microsoft.com/office/drawing/2014/main" id="{CAC95C35-1B48-AA1E-545D-C3E97BCC7321}"/>
+              </a:ext>
+            </a:extLst>
+          </p:cNvPr>
+          <p:cNvSpPr/>
+          <p:nvPr/>
+        </p:nvSpPr>
+        <p:spPr>
+          <a:xfrm>
+            <a:off x="1332680" y="-6979"/>
+            <a:ext cx="4429004" cy="2015741"/>
+          </a:xfrm>
+          <a:prstGeom prst="roundRect">
+            <a:avLst>
+              <a:gd name="adj" fmla="val 3933"/>
+            </a:avLst>
+          </a:prstGeom>
+          <a:solidFill>
+            <a:srgbClr val="FEC601"/>
+          </a:solidFill>
+          <a:ln w="101600">
+            <a:noFill/>
+          </a:ln>
+        </p:spPr>
+        <p:style>
+          <a:lnRef idx="2">
+            <a:schemeClr val="accent1">
+              <a:shade val="50000"/>
+            </a:schemeClr>
+          </a:lnRef>
+          <a:fillRef idx="1">
+            <a:schemeClr val="accent1"/>
+          </a:fillRef>
+          <a:effectRef idx="0">
+            <a:schemeClr val="accent1"/>
+          </a:effectRef>
+          <a:fontRef idx="minor">
+            <a:schemeClr val="lt1"/>
+          </a:fontRef>
+        </p:style>
+        <p:txBody>
+          <a:bodyPr rtlCol="0" anchor="ctr"/>
+          <a:lstStyle/>
+          <a:p>
+            <a:pPr algn="ctr"/>
+            <a:endParaRPr lang="en-GB" sz="1808">
+              <a:solidFill>
+                <a:srgbClr val="95BFE5"/>
+              </a:solidFill>
+            </a:endParaRPr>
+          </a:p>
+        </p:txBody>
+      </p:sp>
+      <p:sp>
+        <p:nvSpPr>
+          <p:cNvPr id="5" name="Rectangle: Rounded Corners 4">
+            <a:extLst>
+              <a:ext uri="{FF2B5EF4-FFF2-40B4-BE49-F238E27FC236}">
+                <a16:creationId xmlns:a16="http://schemas.microsoft.com/office/drawing/2014/main" id="{4035679B-9375-4A3B-9740-2D1E7E3D6445}"/>
+              </a:ext>
+            </a:extLst>
+          </p:cNvPr>
+          <p:cNvSpPr/>
+          <p:nvPr/>
+        </p:nvSpPr>
+        <p:spPr>
+          <a:xfrm>
+            <a:off x="-3562" y="2958624"/>
+            <a:ext cx="746069" cy="1336806"/>
+          </a:xfrm>
+          <a:prstGeom prst="roundRect">
+            <a:avLst>
+              <a:gd name="adj" fmla="val 10224"/>
+            </a:avLst>
+          </a:prstGeom>
+          <a:solidFill>
+            <a:srgbClr val="2364AA"/>
+          </a:solidFill>
+          <a:ln w="101600">
+            <a:noFill/>
+          </a:ln>
+        </p:spPr>
+        <p:style>
+          <a:lnRef idx="2">
+            <a:schemeClr val="accent1">
+              <a:shade val="50000"/>
+            </a:schemeClr>
+          </a:lnRef>
+          <a:fillRef idx="1">
+            <a:schemeClr val="accent1"/>
+          </a:fillRef>
+          <a:effectRef idx="0">
+            <a:schemeClr val="accent1"/>
+          </a:effectRef>
+          <a:fontRef idx="minor">
+            <a:schemeClr val="lt1"/>
+          </a:fontRef>
+        </p:style>
+        <p:txBody>
+          <a:bodyPr rtlCol="0" anchor="ctr"/>
+          <a:lstStyle/>
+          <a:p>
+            <a:pPr algn="ctr"/>
+            <a:endParaRPr lang="en-GB" sz="1808">
+              <a:solidFill>
+                <a:srgbClr val="95BFE5"/>
+              </a:solidFill>
+            </a:endParaRPr>
+          </a:p>
+        </p:txBody>
+      </p:sp>
+      <p:sp>
+        <p:nvSpPr>
+          <p:cNvPr id="8" name="Rectangle 10">
+            <a:extLst>
+              <a:ext uri="{FF2B5EF4-FFF2-40B4-BE49-F238E27FC236}">
+                <a16:creationId xmlns:a16="http://schemas.microsoft.com/office/drawing/2014/main" id="{9DF4A75E-FDF7-67AB-AE8C-81BE4D542A18}"/>
+              </a:ext>
+            </a:extLst>
+          </p:cNvPr>
+          <p:cNvSpPr/>
+          <p:nvPr/>
+        </p:nvSpPr>
+        <p:spPr>
+          <a:xfrm rot="5400000">
+            <a:off x="5532294" y="2946357"/>
+            <a:ext cx="318232" cy="180684"/>
+          </a:xfrm>
+          <a:custGeom>
+            <a:avLst/>
+            <a:gdLst>
+              <a:gd name="connsiteX0" fmla="*/ 0 w 471699"/>
+              <a:gd name="connsiteY0" fmla="*/ 0 h 238462"/>
+              <a:gd name="connsiteX1" fmla="*/ 471699 w 471699"/>
+              <a:gd name="connsiteY1" fmla="*/ 0 h 238462"/>
+              <a:gd name="connsiteX2" fmla="*/ 471699 w 471699"/>
+              <a:gd name="connsiteY2" fmla="*/ 238462 h 238462"/>
+              <a:gd name="connsiteX3" fmla="*/ 0 w 471699"/>
+              <a:gd name="connsiteY3" fmla="*/ 238462 h 238462"/>
+              <a:gd name="connsiteX4" fmla="*/ 0 w 471699"/>
+              <a:gd name="connsiteY4" fmla="*/ 0 h 238462"/>
+              <a:gd name="connsiteX0" fmla="*/ 0 w 471699"/>
+              <a:gd name="connsiteY0" fmla="*/ 0 h 238462"/>
+              <a:gd name="connsiteX1" fmla="*/ 268881 w 471699"/>
+              <a:gd name="connsiteY1" fmla="*/ 3437 h 238462"/>
+              <a:gd name="connsiteX2" fmla="*/ 471699 w 471699"/>
+              <a:gd name="connsiteY2" fmla="*/ 238462 h 238462"/>
+              <a:gd name="connsiteX3" fmla="*/ 0 w 471699"/>
+              <a:gd name="connsiteY3" fmla="*/ 238462 h 238462"/>
+              <a:gd name="connsiteX4" fmla="*/ 0 w 471699"/>
+              <a:gd name="connsiteY4" fmla="*/ 0 h 238462"/>
+              <a:gd name="connsiteX0" fmla="*/ 0 w 471699"/>
+              <a:gd name="connsiteY0" fmla="*/ 0 h 238462"/>
+              <a:gd name="connsiteX1" fmla="*/ 263208 w 471699"/>
+              <a:gd name="connsiteY1" fmla="*/ 3437 h 238462"/>
+              <a:gd name="connsiteX2" fmla="*/ 471699 w 471699"/>
+              <a:gd name="connsiteY2" fmla="*/ 238462 h 238462"/>
+              <a:gd name="connsiteX3" fmla="*/ 0 w 471699"/>
+              <a:gd name="connsiteY3" fmla="*/ 238462 h 238462"/>
+              <a:gd name="connsiteX4" fmla="*/ 0 w 471699"/>
+              <a:gd name="connsiteY4" fmla="*/ 0 h 238462"/>
+            </a:gdLst>
+            <a:ahLst/>
+            <a:cxnLst>
+              <a:cxn ang="0">
+                <a:pos x="connsiteX0" y="connsiteY0"/>
+              </a:cxn>
+              <a:cxn ang="0">
+                <a:pos x="connsiteX1" y="connsiteY1"/>
+              </a:cxn>
+              <a:cxn ang="0">
+                <a:pos x="connsiteX2" y="connsiteY2"/>
+              </a:cxn>
+              <a:cxn ang="0">
+                <a:pos x="connsiteX3" y="connsiteY3"/>
+              </a:cxn>
+              <a:cxn ang="0">
+                <a:pos x="connsiteX4" y="connsiteY4"/>
+              </a:cxn>
+            </a:cxnLst>
+            <a:rect l="l" t="t" r="r" b="b"/>
+            <a:pathLst>
+              <a:path w="471699" h="238462">
+                <a:moveTo>
+                  <a:pt x="0" y="0"/>
+                </a:moveTo>
+                <a:lnTo>
+                  <a:pt x="263208" y="3437"/>
+                </a:lnTo>
+                <a:lnTo>
+                  <a:pt x="471699" y="238462"/>
+                </a:lnTo>
+                <a:lnTo>
+                  <a:pt x="0" y="238462"/>
+                </a:lnTo>
+                <a:lnTo>
+                  <a:pt x="0" y="0"/>
+                </a:lnTo>
+                <a:close/>
+              </a:path>
+            </a:pathLst>
+          </a:custGeom>
+          <a:solidFill>
+            <a:schemeClr val="bg1"/>
+          </a:solidFill>
+          <a:ln>
+            <a:noFill/>
+          </a:ln>
+        </p:spPr>
+        <p:style>
+          <a:lnRef idx="2">
+            <a:schemeClr val="accent1">
+              <a:shade val="50000"/>
+            </a:schemeClr>
+          </a:lnRef>
+          <a:fillRef idx="1">
+            <a:schemeClr val="accent1"/>
+          </a:fillRef>
+          <a:effectRef idx="0">
+            <a:schemeClr val="accent1"/>
+          </a:effectRef>
+          <a:fontRef idx="minor">
+            <a:schemeClr val="lt1"/>
+          </a:fontRef>
+        </p:style>
+        <p:txBody>
+          <a:bodyPr rtlCol="0" anchor="ctr"/>
+          <a:lstStyle/>
+          <a:p>
+            <a:pPr algn="ctr"/>
+            <a:endParaRPr lang="en-GB" sz="1808"/>
+          </a:p>
+        </p:txBody>
+      </p:sp>
+      <p:sp>
+        <p:nvSpPr>
+          <p:cNvPr id="3" name="TextBox 2">
+            <a:extLst>
+              <a:ext uri="{FF2B5EF4-FFF2-40B4-BE49-F238E27FC236}">
+                <a16:creationId xmlns:a16="http://schemas.microsoft.com/office/drawing/2014/main" id="{56BA9D04-7576-0017-8F07-92AFBC13D6A6}"/>
+              </a:ext>
+            </a:extLst>
+          </p:cNvPr>
+          <p:cNvSpPr txBox="1"/>
+          <p:nvPr/>
+        </p:nvSpPr>
+        <p:spPr>
+          <a:xfrm>
+            <a:off x="-168587" y="1650843"/>
+            <a:ext cx="7397574" cy="1576625"/>
+          </a:xfrm>
+          <a:prstGeom prst="rect">
+            <a:avLst/>
+          </a:prstGeom>
+          <a:noFill/>
+        </p:spPr>
+        <p:txBody>
+          <a:bodyPr wrap="square" rtlCol="0">
+            <a:spAutoFit/>
+          </a:bodyPr>
+          <a:lstStyle/>
+          <a:p>
+            <a:r>
+              <a:rPr lang="en-GB" sz="9644" b="1">
+                <a:solidFill>
+                  <a:srgbClr val="7A263A"/>
+                </a:solidFill>
+                <a:latin typeface="Android Insomnia" pitchFamily="2" charset="-128"/>
+                <a:ea typeface="Android Insomnia" pitchFamily="2" charset="-128"/>
+                <a:cs typeface="Android Insomnia" pitchFamily="2" charset="-128"/>
+              </a:rPr>
+              <a:t>causeway</a:t>
+            </a:r>
+          </a:p>
+        </p:txBody>
+      </p:sp>
+      <p:sp>
+        <p:nvSpPr>
+          <p:cNvPr id="10" name="TextBox 9">
+            <a:extLst>
+              <a:ext uri="{FF2B5EF4-FFF2-40B4-BE49-F238E27FC236}">
+                <a16:creationId xmlns:a16="http://schemas.microsoft.com/office/drawing/2014/main" id="{C64F2FFB-CDB5-6BCD-6256-EE2A05FDCE17}"/>
+              </a:ext>
+            </a:extLst>
+          </p:cNvPr>
+          <p:cNvSpPr txBox="1"/>
+          <p:nvPr/>
+        </p:nvSpPr>
+        <p:spPr>
+          <a:xfrm>
+            <a:off x="-46002" y="1519904"/>
+            <a:ext cx="1336806" cy="523220"/>
+          </a:xfrm>
+          <a:prstGeom prst="rect">
+            <a:avLst/>
+          </a:prstGeom>
+          <a:noFill/>
+        </p:spPr>
+        <p:txBody>
+          <a:bodyPr wrap="square" rtlCol="0">
+            <a:spAutoFit/>
+          </a:bodyPr>
+          <a:lstStyle/>
+          <a:p>
+            <a:r>
+              <a:rPr lang="en-GB" sz="2800" b="1">
+                <a:solidFill>
+                  <a:schemeClr val="bg1"/>
+                </a:solidFill>
+                <a:latin typeface="Android Insomnia" pitchFamily="2" charset="-128"/>
+                <a:ea typeface="Android Insomnia" pitchFamily="2" charset="-128"/>
+                <a:cs typeface="Android Insomnia" pitchFamily="2" charset="-128"/>
+              </a:rPr>
+              <a:t>ASF</a:t>
+            </a:r>
+          </a:p>
+        </p:txBody>
+      </p:sp>
+    </p:spTree>
+    <p:extLst>
+      <p:ext uri="{BB962C8B-B14F-4D97-AF65-F5344CB8AC3E}">
+        <p14:creationId xmlns:p14="http://schemas.microsoft.com/office/powerpoint/2010/main" val="3556914970"/>
+      </p:ext>
+    </p:extLst>
+  </p:cSld>
+  <p:clrMapOvr>
+    <a:masterClrMapping/>
+  </p:clrMapOvr>
+</p:sld>
+</file>
+
+<file path=ppt/slides/slide9.xml><?xml version="1.0" encoding="utf-8"?>
+<p:sld xmlns:a="http://schemas.openxmlformats.org/drawingml/2006/main" xmlns:r="http://schemas.openxmlformats.org/officeDocument/2006/relationships" xmlns:p="http://schemas.openxmlformats.org/presentationml/2006/main">
+  <p:cSld>
+    <p:spTree>
+      <p:nvGrpSpPr>
+        <p:cNvPr id="1" name=""/>
+        <p:cNvGrpSpPr/>
+        <p:nvPr/>
+      </p:nvGrpSpPr>
+      <p:grpSpPr>
+        <a:xfrm>
+          <a:off x="0" y="0"/>
+          <a:ext cx="0" cy="0"/>
+          <a:chOff x="0" y="0"/>
+          <a:chExt cx="0" cy="0"/>
+        </a:xfrm>
+      </p:grpSpPr>
+      <p:sp>
+        <p:nvSpPr>
+          <p:cNvPr id="12" name="Rectangle: Rounded Corners 11">
+            <a:extLst>
+              <a:ext uri="{FF2B5EF4-FFF2-40B4-BE49-F238E27FC236}">
+                <a16:creationId xmlns:a16="http://schemas.microsoft.com/office/drawing/2014/main" id="{A31F33E6-48C6-2F14-D301-2E0B7985B91A}"/>
+              </a:ext>
+            </a:extLst>
+          </p:cNvPr>
+          <p:cNvSpPr/>
+          <p:nvPr/>
+        </p:nvSpPr>
+        <p:spPr>
+          <a:xfrm>
+            <a:off x="-1" y="-9238"/>
+            <a:ext cx="1392541" cy="2015741"/>
+          </a:xfrm>
+          <a:prstGeom prst="roundRect">
+            <a:avLst>
+              <a:gd name="adj" fmla="val 7098"/>
+            </a:avLst>
+          </a:prstGeom>
+          <a:solidFill>
+            <a:srgbClr val="5AB1BB"/>
+          </a:solidFill>
+          <a:ln w="101600">
+            <a:noFill/>
+          </a:ln>
+        </p:spPr>
+        <p:style>
+          <a:lnRef idx="2">
+            <a:schemeClr val="accent1">
+              <a:shade val="50000"/>
+            </a:schemeClr>
+          </a:lnRef>
+          <a:fillRef idx="1">
+            <a:schemeClr val="accent1"/>
+          </a:fillRef>
+          <a:effectRef idx="0">
+            <a:schemeClr val="accent1"/>
+          </a:effectRef>
+          <a:fontRef idx="minor">
+            <a:schemeClr val="lt1"/>
+          </a:fontRef>
+        </p:style>
+        <p:txBody>
+          <a:bodyPr rtlCol="0" anchor="ctr"/>
+          <a:lstStyle/>
+          <a:p>
+            <a:pPr algn="ctr"/>
+            <a:endParaRPr lang="en-GB" sz="1808">
+              <a:solidFill>
+                <a:srgbClr val="95BFE5"/>
+              </a:solidFill>
+            </a:endParaRPr>
+          </a:p>
+        </p:txBody>
+      </p:sp>
+      <p:sp>
+        <p:nvSpPr>
+          <p:cNvPr id="6" name="Rectangle: Rounded Corners 5">
+            <a:extLst>
+              <a:ext uri="{FF2B5EF4-FFF2-40B4-BE49-F238E27FC236}">
+                <a16:creationId xmlns:a16="http://schemas.microsoft.com/office/drawing/2014/main" id="{FEC4D2F5-1B5F-8B94-75B0-128AD20C2F6A}"/>
+              </a:ext>
+            </a:extLst>
+          </p:cNvPr>
+          <p:cNvSpPr/>
+          <p:nvPr/>
+        </p:nvSpPr>
+        <p:spPr>
+          <a:xfrm>
+            <a:off x="2132435" y="2965606"/>
+            <a:ext cx="3629259" cy="1328256"/>
+          </a:xfrm>
+          <a:prstGeom prst="roundRect">
+            <a:avLst>
+              <a:gd name="adj" fmla="val 6160"/>
+            </a:avLst>
+          </a:prstGeom>
+          <a:solidFill>
+            <a:srgbClr val="EEB4B3"/>
+          </a:solidFill>
+          <a:ln w="101600">
+            <a:noFill/>
+          </a:ln>
+        </p:spPr>
+        <p:style>
+          <a:lnRef idx="2">
+            <a:schemeClr val="accent1">
+              <a:shade val="50000"/>
+            </a:schemeClr>
+          </a:lnRef>
+          <a:fillRef idx="1">
+            <a:schemeClr val="accent1"/>
+          </a:fillRef>
+          <a:effectRef idx="0">
+            <a:schemeClr val="accent1"/>
+          </a:effectRef>
+          <a:fontRef idx="minor">
+            <a:schemeClr val="lt1"/>
+          </a:fontRef>
+        </p:style>
+        <p:txBody>
+          <a:bodyPr rtlCol="0" anchor="ctr"/>
+          <a:lstStyle/>
+          <a:p>
+            <a:pPr algn="ctr"/>
+            <a:endParaRPr lang="en-GB" sz="1808">
+              <a:solidFill>
+                <a:srgbClr val="95BFE5"/>
+              </a:solidFill>
+            </a:endParaRPr>
+          </a:p>
+        </p:txBody>
+      </p:sp>
+      <p:sp>
+        <p:nvSpPr>
+          <p:cNvPr id="4" name="Rectangle: Rounded Corners 3">
+            <a:extLst>
+              <a:ext uri="{FF2B5EF4-FFF2-40B4-BE49-F238E27FC236}">
+                <a16:creationId xmlns:a16="http://schemas.microsoft.com/office/drawing/2014/main" id="{CAC95C35-1B48-AA1E-545D-C3E97BCC7321}"/>
+              </a:ext>
+            </a:extLst>
+          </p:cNvPr>
+          <p:cNvSpPr/>
+          <p:nvPr/>
+        </p:nvSpPr>
+        <p:spPr>
+          <a:xfrm>
+            <a:off x="2132436" y="-6979"/>
+            <a:ext cx="3629247" cy="2015741"/>
+          </a:xfrm>
+          <a:prstGeom prst="roundRect">
+            <a:avLst>
+              <a:gd name="adj" fmla="val 7552"/>
+            </a:avLst>
+          </a:prstGeom>
+          <a:solidFill>
+            <a:srgbClr val="FEC601"/>
+          </a:solidFill>
+          <a:ln w="101600">
+            <a:noFill/>
+          </a:ln>
+        </p:spPr>
+        <p:style>
+          <a:lnRef idx="2">
+            <a:schemeClr val="accent1">
+              <a:shade val="50000"/>
+            </a:schemeClr>
+          </a:lnRef>
+          <a:fillRef idx="1">
+            <a:schemeClr val="accent1"/>
+          </a:fillRef>
+          <a:effectRef idx="0">
+            <a:schemeClr val="accent1"/>
+          </a:effectRef>
+          <a:fontRef idx="minor">
+            <a:schemeClr val="lt1"/>
+          </a:fontRef>
+        </p:style>
+        <p:txBody>
+          <a:bodyPr rtlCol="0" anchor="ctr"/>
+          <a:lstStyle/>
+          <a:p>
+            <a:pPr algn="ctr"/>
+            <a:endParaRPr lang="en-GB" sz="1808">
+              <a:solidFill>
+                <a:srgbClr val="95BFE5"/>
+              </a:solidFill>
+            </a:endParaRPr>
+          </a:p>
+        </p:txBody>
+      </p:sp>
+      <p:sp>
+        <p:nvSpPr>
+          <p:cNvPr id="5" name="Rectangle: Rounded Corners 4">
+            <a:extLst>
+              <a:ext uri="{FF2B5EF4-FFF2-40B4-BE49-F238E27FC236}">
+                <a16:creationId xmlns:a16="http://schemas.microsoft.com/office/drawing/2014/main" id="{4035679B-9375-4A3B-9740-2D1E7E3D6445}"/>
+              </a:ext>
+            </a:extLst>
+          </p:cNvPr>
+          <p:cNvSpPr/>
+          <p:nvPr/>
+        </p:nvSpPr>
+        <p:spPr>
+          <a:xfrm>
+            <a:off x="-3562" y="2958625"/>
+            <a:ext cx="1396102" cy="1336806"/>
+          </a:xfrm>
+          <a:prstGeom prst="roundRect">
+            <a:avLst>
+              <a:gd name="adj" fmla="val 10224"/>
+            </a:avLst>
+          </a:prstGeom>
+          <a:solidFill>
+            <a:srgbClr val="2364AA"/>
+          </a:solidFill>
+          <a:ln w="101600">
+            <a:noFill/>
+          </a:ln>
+        </p:spPr>
+        <p:style>
+          <a:lnRef idx="2">
+            <a:schemeClr val="accent1">
+              <a:shade val="50000"/>
+            </a:schemeClr>
+          </a:lnRef>
+          <a:fillRef idx="1">
+            <a:schemeClr val="accent1"/>
+          </a:fillRef>
+          <a:effectRef idx="0">
+            <a:schemeClr val="accent1"/>
+          </a:effectRef>
+          <a:fontRef idx="minor">
+            <a:schemeClr val="lt1"/>
+          </a:fontRef>
+        </p:style>
+        <p:txBody>
+          <a:bodyPr rtlCol="0" anchor="ctr"/>
+          <a:lstStyle/>
+          <a:p>
+            <a:pPr algn="ctr"/>
+            <a:endParaRPr lang="en-GB" sz="1808">
+              <a:solidFill>
+                <a:srgbClr val="95BFE5"/>
+              </a:solidFill>
+            </a:endParaRPr>
+          </a:p>
+        </p:txBody>
+      </p:sp>
+      <p:sp>
+        <p:nvSpPr>
+          <p:cNvPr id="8" name="Rectangle 10">
+            <a:extLst>
+              <a:ext uri="{FF2B5EF4-FFF2-40B4-BE49-F238E27FC236}">
+                <a16:creationId xmlns:a16="http://schemas.microsoft.com/office/drawing/2014/main" id="{9DF4A75E-FDF7-67AB-AE8C-81BE4D542A18}"/>
+              </a:ext>
+            </a:extLst>
+          </p:cNvPr>
+          <p:cNvSpPr/>
+          <p:nvPr/>
+        </p:nvSpPr>
+        <p:spPr>
+          <a:xfrm rot="5400000">
+            <a:off x="5532294" y="2946357"/>
+            <a:ext cx="318232" cy="180684"/>
+          </a:xfrm>
+          <a:custGeom>
+            <a:avLst/>
+            <a:gdLst>
+              <a:gd name="connsiteX0" fmla="*/ 0 w 471699"/>
+              <a:gd name="connsiteY0" fmla="*/ 0 h 238462"/>
+              <a:gd name="connsiteX1" fmla="*/ 471699 w 471699"/>
+              <a:gd name="connsiteY1" fmla="*/ 0 h 238462"/>
+              <a:gd name="connsiteX2" fmla="*/ 471699 w 471699"/>
+              <a:gd name="connsiteY2" fmla="*/ 238462 h 238462"/>
+              <a:gd name="connsiteX3" fmla="*/ 0 w 471699"/>
+              <a:gd name="connsiteY3" fmla="*/ 238462 h 238462"/>
+              <a:gd name="connsiteX4" fmla="*/ 0 w 471699"/>
+              <a:gd name="connsiteY4" fmla="*/ 0 h 238462"/>
+              <a:gd name="connsiteX0" fmla="*/ 0 w 471699"/>
+              <a:gd name="connsiteY0" fmla="*/ 0 h 238462"/>
+              <a:gd name="connsiteX1" fmla="*/ 268881 w 471699"/>
+              <a:gd name="connsiteY1" fmla="*/ 3437 h 238462"/>
+              <a:gd name="connsiteX2" fmla="*/ 471699 w 471699"/>
+              <a:gd name="connsiteY2" fmla="*/ 238462 h 238462"/>
+              <a:gd name="connsiteX3" fmla="*/ 0 w 471699"/>
+              <a:gd name="connsiteY3" fmla="*/ 238462 h 238462"/>
+              <a:gd name="connsiteX4" fmla="*/ 0 w 471699"/>
+              <a:gd name="connsiteY4" fmla="*/ 0 h 238462"/>
+              <a:gd name="connsiteX0" fmla="*/ 0 w 471699"/>
+              <a:gd name="connsiteY0" fmla="*/ 0 h 238462"/>
+              <a:gd name="connsiteX1" fmla="*/ 263208 w 471699"/>
+              <a:gd name="connsiteY1" fmla="*/ 3437 h 238462"/>
+              <a:gd name="connsiteX2" fmla="*/ 471699 w 471699"/>
+              <a:gd name="connsiteY2" fmla="*/ 238462 h 238462"/>
+              <a:gd name="connsiteX3" fmla="*/ 0 w 471699"/>
+              <a:gd name="connsiteY3" fmla="*/ 238462 h 238462"/>
+              <a:gd name="connsiteX4" fmla="*/ 0 w 471699"/>
+              <a:gd name="connsiteY4" fmla="*/ 0 h 238462"/>
+            </a:gdLst>
+            <a:ahLst/>
+            <a:cxnLst>
+              <a:cxn ang="0">
+                <a:pos x="connsiteX0" y="connsiteY0"/>
+              </a:cxn>
+              <a:cxn ang="0">
+                <a:pos x="connsiteX1" y="connsiteY1"/>
+              </a:cxn>
+              <a:cxn ang="0">
+                <a:pos x="connsiteX2" y="connsiteY2"/>
+              </a:cxn>
+              <a:cxn ang="0">
+                <a:pos x="connsiteX3" y="connsiteY3"/>
+              </a:cxn>
+              <a:cxn ang="0">
+                <a:pos x="connsiteX4" y="connsiteY4"/>
+              </a:cxn>
+            </a:cxnLst>
+            <a:rect l="l" t="t" r="r" b="b"/>
+            <a:pathLst>
+              <a:path w="471699" h="238462">
+                <a:moveTo>
+                  <a:pt x="0" y="0"/>
+                </a:moveTo>
+                <a:lnTo>
+                  <a:pt x="263208" y="3437"/>
+                </a:lnTo>
+                <a:lnTo>
+                  <a:pt x="471699" y="238462"/>
+                </a:lnTo>
+                <a:lnTo>
+                  <a:pt x="0" y="238462"/>
+                </a:lnTo>
+                <a:lnTo>
+                  <a:pt x="0" y="0"/>
+                </a:lnTo>
+                <a:close/>
+              </a:path>
+            </a:pathLst>
+          </a:custGeom>
+          <a:solidFill>
+            <a:schemeClr val="bg1"/>
+          </a:solidFill>
+          <a:ln>
+            <a:noFill/>
+          </a:ln>
+        </p:spPr>
+        <p:style>
+          <a:lnRef idx="2">
+            <a:schemeClr val="accent1">
+              <a:shade val="50000"/>
+            </a:schemeClr>
+          </a:lnRef>
+          <a:fillRef idx="1">
+            <a:schemeClr val="accent1"/>
+          </a:fillRef>
+          <a:effectRef idx="0">
+            <a:schemeClr val="accent1"/>
+          </a:effectRef>
+          <a:fontRef idx="minor">
+            <a:schemeClr val="lt1"/>
+          </a:fontRef>
+        </p:style>
+        <p:txBody>
+          <a:bodyPr rtlCol="0" anchor="ctr"/>
+          <a:lstStyle/>
+          <a:p>
+            <a:pPr algn="ctr"/>
+            <a:endParaRPr lang="en-GB" sz="1808"/>
+          </a:p>
+        </p:txBody>
+      </p:sp>
+      <p:sp>
+        <p:nvSpPr>
+          <p:cNvPr id="3" name="TextBox 2">
+            <a:extLst>
+              <a:ext uri="{FF2B5EF4-FFF2-40B4-BE49-F238E27FC236}">
+                <a16:creationId xmlns:a16="http://schemas.microsoft.com/office/drawing/2014/main" id="{56BA9D04-7576-0017-8F07-92AFBC13D6A6}"/>
+              </a:ext>
+            </a:extLst>
+          </p:cNvPr>
+          <p:cNvSpPr txBox="1"/>
+          <p:nvPr/>
+        </p:nvSpPr>
+        <p:spPr>
+          <a:xfrm>
+            <a:off x="-168587" y="1650843"/>
+            <a:ext cx="7397574" cy="1576625"/>
+          </a:xfrm>
+          <a:prstGeom prst="rect">
+            <a:avLst/>
+          </a:prstGeom>
+          <a:noFill/>
+        </p:spPr>
+        <p:txBody>
+          <a:bodyPr wrap="square" rtlCol="0">
+            <a:spAutoFit/>
+          </a:bodyPr>
+          <a:lstStyle/>
+          <a:p>
+            <a:r>
+              <a:rPr lang="en-GB" sz="9644" b="1">
+                <a:solidFill>
+                  <a:srgbClr val="7A263A"/>
+                </a:solidFill>
+                <a:latin typeface="Android Insomnia" pitchFamily="2" charset="-128"/>
+                <a:ea typeface="Android Insomnia" pitchFamily="2" charset="-128"/>
+                <a:cs typeface="Android Insomnia" pitchFamily="2" charset="-128"/>
+              </a:rPr>
+              <a:t>causeway</a:t>
+            </a:r>
+          </a:p>
+        </p:txBody>
+      </p:sp>
+      <p:sp>
+        <p:nvSpPr>
+          <p:cNvPr id="10" name="TextBox 9">
+            <a:extLst>
+              <a:ext uri="{FF2B5EF4-FFF2-40B4-BE49-F238E27FC236}">
+                <a16:creationId xmlns:a16="http://schemas.microsoft.com/office/drawing/2014/main" id="{C64F2FFB-CDB5-6BCD-6256-EE2A05FDCE17}"/>
+              </a:ext>
+            </a:extLst>
+          </p:cNvPr>
+          <p:cNvSpPr txBox="1"/>
+          <p:nvPr/>
+        </p:nvSpPr>
+        <p:spPr>
+          <a:xfrm>
+            <a:off x="-3562" y="1189178"/>
+            <a:ext cx="1536070" cy="923330"/>
+          </a:xfrm>
+          <a:prstGeom prst="rect">
+            <a:avLst/>
+          </a:prstGeom>
+          <a:noFill/>
+        </p:spPr>
+        <p:txBody>
+          <a:bodyPr wrap="square" rtlCol="0">
+            <a:spAutoFit/>
+          </a:bodyPr>
+          <a:lstStyle/>
+          <a:p>
+            <a:r>
+              <a:rPr lang="en-GB" sz="5400" b="1">
+                <a:solidFill>
+                  <a:schemeClr val="bg1"/>
+                </a:solidFill>
+                <a:latin typeface="Android Insomnia" pitchFamily="2" charset="-128"/>
+                <a:ea typeface="Android Insomnia" pitchFamily="2" charset="-128"/>
+                <a:cs typeface="Android Insomnia" pitchFamily="2" charset="-128"/>
+              </a:rPr>
+              <a:t>ASF</a:t>
+            </a:r>
+          </a:p>
+        </p:txBody>
+      </p:sp>
+    </p:spTree>
+    <p:extLst>
+      <p:ext uri="{BB962C8B-B14F-4D97-AF65-F5344CB8AC3E}">
+        <p14:creationId xmlns:p14="http://schemas.microsoft.com/office/powerpoint/2010/main" val="1690582736"/>
       </p:ext>
     </p:extLst>
   </p:cSld>

</xml_diff>

<commit_message>
cleans up home page, make source download more prominent
</commit_message>
<xml_diff>
--- a/antora/supplemental-ui/img/home/causeway-logo.pptx
+++ b/antora/supplemental-ui/img/home/causeway-logo.pptx
@@ -5,22 +5,24 @@
     <p:sldMasterId id="2147483780" r:id="rId1"/>
   </p:sldMasterIdLst>
   <p:notesMasterIdLst>
-    <p:notesMasterId r:id="rId15"/>
+    <p:notesMasterId r:id="rId17"/>
   </p:notesMasterIdLst>
   <p:sldIdLst>
     <p:sldId id="284" r:id="rId2"/>
-    <p:sldId id="270" r:id="rId3"/>
-    <p:sldId id="285" r:id="rId4"/>
-    <p:sldId id="283" r:id="rId5"/>
-    <p:sldId id="282" r:id="rId6"/>
-    <p:sldId id="279" r:id="rId7"/>
-    <p:sldId id="281" r:id="rId8"/>
-    <p:sldId id="280" r:id="rId9"/>
-    <p:sldId id="277" r:id="rId10"/>
-    <p:sldId id="278" r:id="rId11"/>
-    <p:sldId id="275" r:id="rId12"/>
-    <p:sldId id="276" r:id="rId13"/>
-    <p:sldId id="274" r:id="rId14"/>
+    <p:sldId id="286" r:id="rId3"/>
+    <p:sldId id="287" r:id="rId4"/>
+    <p:sldId id="270" r:id="rId5"/>
+    <p:sldId id="285" r:id="rId6"/>
+    <p:sldId id="283" r:id="rId7"/>
+    <p:sldId id="282" r:id="rId8"/>
+    <p:sldId id="279" r:id="rId9"/>
+    <p:sldId id="281" r:id="rId10"/>
+    <p:sldId id="280" r:id="rId11"/>
+    <p:sldId id="277" r:id="rId12"/>
+    <p:sldId id="278" r:id="rId13"/>
+    <p:sldId id="275" r:id="rId14"/>
+    <p:sldId id="276" r:id="rId15"/>
+    <p:sldId id="274" r:id="rId16"/>
   </p:sldIdLst>
   <p:sldSz cx="5759450" cy="4279900"/>
   <p:notesSz cx="7077075" cy="9363075"/>
@@ -125,6 +127,8 @@
         <p14:section name="current" id="{CFFC32EE-D7EB-4357-9AC9-7EC9434B6436}">
           <p14:sldIdLst>
             <p14:sldId id="284"/>
+            <p14:sldId id="286"/>
+            <p14:sldId id="287"/>
           </p14:sldIdLst>
         </p14:section>
         <p14:section name="previous" id="{1A2DAAEF-A24D-4989-A740-AA401E0139D1}">
@@ -4069,7 +4073,7 @@
             </a:avLst>
           </a:prstGeom>
           <a:solidFill>
-            <a:srgbClr val="5AB1BB"/>
+            <a:srgbClr val="EEB4B3"/>
           </a:solidFill>
           <a:ln w="101600">
             <a:noFill/>
@@ -4119,7 +4123,7 @@
         <p:spPr>
           <a:xfrm>
             <a:off x="1175372" y="2544866"/>
-            <a:ext cx="4584078" cy="1750564"/>
+            <a:ext cx="4584078" cy="1735034"/>
           </a:xfrm>
           <a:prstGeom prst="roundRect">
             <a:avLst>
@@ -4176,7 +4180,7 @@
         </p:nvSpPr>
         <p:spPr>
           <a:xfrm>
-            <a:off x="1175372" y="-6979"/>
+            <a:off x="1175372" y="-13959"/>
             <a:ext cx="4584078" cy="2516715"/>
           </a:xfrm>
           <a:prstGeom prst="roundRect">
@@ -4235,7 +4239,7 @@
         <p:spPr>
           <a:xfrm>
             <a:off x="0" y="2544866"/>
-            <a:ext cx="1138136" cy="1750564"/>
+            <a:ext cx="1138136" cy="1735034"/>
           </a:xfrm>
           <a:prstGeom prst="roundRect">
             <a:avLst>
@@ -4243,7 +4247,7 @@
             </a:avLst>
           </a:prstGeom>
           <a:solidFill>
-            <a:srgbClr val="2364AA"/>
+            <a:srgbClr val="5AB1BB"/>
           </a:solidFill>
           <a:ln w="101600">
             <a:noFill/>
@@ -4373,6 +4377,714 @@
     </p:spTree>
     <p:extLst>
       <p:ext uri="{BB962C8B-B14F-4D97-AF65-F5344CB8AC3E}">
+        <p14:creationId xmlns:p14="http://schemas.microsoft.com/office/powerpoint/2010/main" val="494928356"/>
+      </p:ext>
+    </p:extLst>
+  </p:cSld>
+  <p:clrMapOvr>
+    <a:masterClrMapping/>
+  </p:clrMapOvr>
+</p:sld>
+</file>
+
+<file path=ppt/slides/slide11.xml><?xml version="1.0" encoding="utf-8"?>
+<p:sld xmlns:a="http://schemas.openxmlformats.org/drawingml/2006/main" xmlns:r="http://schemas.openxmlformats.org/officeDocument/2006/relationships" xmlns:p="http://schemas.openxmlformats.org/presentationml/2006/main">
+  <p:cSld>
+    <p:spTree>
+      <p:nvGrpSpPr>
+        <p:cNvPr id="1" name=""/>
+        <p:cNvGrpSpPr/>
+        <p:nvPr/>
+      </p:nvGrpSpPr>
+      <p:grpSpPr>
+        <a:xfrm>
+          <a:off x="0" y="0"/>
+          <a:ext cx="0" cy="0"/>
+          <a:chOff x="0" y="0"/>
+          <a:chExt cx="0" cy="0"/>
+        </a:xfrm>
+      </p:grpSpPr>
+      <p:sp>
+        <p:nvSpPr>
+          <p:cNvPr id="12" name="Rectangle: Rounded Corners 11">
+            <a:extLst>
+              <a:ext uri="{FF2B5EF4-FFF2-40B4-BE49-F238E27FC236}">
+                <a16:creationId xmlns:a16="http://schemas.microsoft.com/office/drawing/2014/main" id="{A31F33E6-48C6-2F14-D301-2E0B7985B91A}"/>
+              </a:ext>
+            </a:extLst>
+          </p:cNvPr>
+          <p:cNvSpPr/>
+          <p:nvPr/>
+        </p:nvSpPr>
+        <p:spPr>
+          <a:xfrm>
+            <a:off x="0" y="0"/>
+            <a:ext cx="1138136" cy="2509736"/>
+          </a:xfrm>
+          <a:prstGeom prst="roundRect">
+            <a:avLst>
+              <a:gd name="adj" fmla="val 0"/>
+            </a:avLst>
+          </a:prstGeom>
+          <a:solidFill>
+            <a:srgbClr val="EEB4B3"/>
+          </a:solidFill>
+          <a:ln w="101600">
+            <a:noFill/>
+          </a:ln>
+        </p:spPr>
+        <p:style>
+          <a:lnRef idx="2">
+            <a:schemeClr val="accent1">
+              <a:shade val="50000"/>
+            </a:schemeClr>
+          </a:lnRef>
+          <a:fillRef idx="1">
+            <a:schemeClr val="accent1"/>
+          </a:fillRef>
+          <a:effectRef idx="0">
+            <a:schemeClr val="accent1"/>
+          </a:effectRef>
+          <a:fontRef idx="minor">
+            <a:schemeClr val="lt1"/>
+          </a:fontRef>
+        </p:style>
+        <p:txBody>
+          <a:bodyPr rtlCol="0" anchor="ctr"/>
+          <a:lstStyle/>
+          <a:p>
+            <a:pPr algn="ctr"/>
+            <a:endParaRPr lang="en-GB" sz="1808">
+              <a:solidFill>
+                <a:srgbClr val="95BFE5"/>
+              </a:solidFill>
+            </a:endParaRPr>
+          </a:p>
+        </p:txBody>
+      </p:sp>
+      <p:sp>
+        <p:nvSpPr>
+          <p:cNvPr id="6" name="Rectangle: Rounded Corners 5">
+            <a:extLst>
+              <a:ext uri="{FF2B5EF4-FFF2-40B4-BE49-F238E27FC236}">
+                <a16:creationId xmlns:a16="http://schemas.microsoft.com/office/drawing/2014/main" id="{FEC4D2F5-1B5F-8B94-75B0-128AD20C2F6A}"/>
+              </a:ext>
+            </a:extLst>
+          </p:cNvPr>
+          <p:cNvSpPr/>
+          <p:nvPr/>
+        </p:nvSpPr>
+        <p:spPr>
+          <a:xfrm>
+            <a:off x="1175372" y="2544866"/>
+            <a:ext cx="4584078" cy="1750564"/>
+          </a:xfrm>
+          <a:prstGeom prst="roundRect">
+            <a:avLst>
+              <a:gd name="adj" fmla="val 0"/>
+            </a:avLst>
+          </a:prstGeom>
+          <a:solidFill>
+            <a:srgbClr val="7A263A"/>
+          </a:solidFill>
+          <a:ln w="101600">
+            <a:noFill/>
+          </a:ln>
+        </p:spPr>
+        <p:style>
+          <a:lnRef idx="2">
+            <a:schemeClr val="accent1">
+              <a:shade val="50000"/>
+            </a:schemeClr>
+          </a:lnRef>
+          <a:fillRef idx="1">
+            <a:schemeClr val="accent1"/>
+          </a:fillRef>
+          <a:effectRef idx="0">
+            <a:schemeClr val="accent1"/>
+          </a:effectRef>
+          <a:fontRef idx="minor">
+            <a:schemeClr val="lt1"/>
+          </a:fontRef>
+        </p:style>
+        <p:txBody>
+          <a:bodyPr rtlCol="0" anchor="ctr"/>
+          <a:lstStyle/>
+          <a:p>
+            <a:pPr algn="ctr"/>
+            <a:endParaRPr lang="en-GB" sz="1808">
+              <a:solidFill>
+                <a:srgbClr val="95BFE5"/>
+              </a:solidFill>
+            </a:endParaRPr>
+          </a:p>
+        </p:txBody>
+      </p:sp>
+      <p:sp>
+        <p:nvSpPr>
+          <p:cNvPr id="4" name="Rectangle: Rounded Corners 3">
+            <a:extLst>
+              <a:ext uri="{FF2B5EF4-FFF2-40B4-BE49-F238E27FC236}">
+                <a16:creationId xmlns:a16="http://schemas.microsoft.com/office/drawing/2014/main" id="{CAC95C35-1B48-AA1E-545D-C3E97BCC7321}"/>
+              </a:ext>
+            </a:extLst>
+          </p:cNvPr>
+          <p:cNvSpPr/>
+          <p:nvPr/>
+        </p:nvSpPr>
+        <p:spPr>
+          <a:xfrm>
+            <a:off x="1175372" y="-6979"/>
+            <a:ext cx="4584078" cy="2516715"/>
+          </a:xfrm>
+          <a:prstGeom prst="roundRect">
+            <a:avLst>
+              <a:gd name="adj" fmla="val 0"/>
+            </a:avLst>
+          </a:prstGeom>
+          <a:solidFill>
+            <a:srgbClr val="FEC601"/>
+          </a:solidFill>
+          <a:ln w="101600">
+            <a:noFill/>
+          </a:ln>
+        </p:spPr>
+        <p:style>
+          <a:lnRef idx="2">
+            <a:schemeClr val="accent1">
+              <a:shade val="50000"/>
+            </a:schemeClr>
+          </a:lnRef>
+          <a:fillRef idx="1">
+            <a:schemeClr val="accent1"/>
+          </a:fillRef>
+          <a:effectRef idx="0">
+            <a:schemeClr val="accent1"/>
+          </a:effectRef>
+          <a:fontRef idx="minor">
+            <a:schemeClr val="lt1"/>
+          </a:fontRef>
+        </p:style>
+        <p:txBody>
+          <a:bodyPr rtlCol="0" anchor="ctr"/>
+          <a:lstStyle/>
+          <a:p>
+            <a:pPr algn="ctr"/>
+            <a:endParaRPr lang="en-GB" sz="1808">
+              <a:solidFill>
+                <a:srgbClr val="95BFE5"/>
+              </a:solidFill>
+            </a:endParaRPr>
+          </a:p>
+        </p:txBody>
+      </p:sp>
+      <p:sp>
+        <p:nvSpPr>
+          <p:cNvPr id="5" name="Rectangle: Rounded Corners 4">
+            <a:extLst>
+              <a:ext uri="{FF2B5EF4-FFF2-40B4-BE49-F238E27FC236}">
+                <a16:creationId xmlns:a16="http://schemas.microsoft.com/office/drawing/2014/main" id="{4035679B-9375-4A3B-9740-2D1E7E3D6445}"/>
+              </a:ext>
+            </a:extLst>
+          </p:cNvPr>
+          <p:cNvSpPr/>
+          <p:nvPr/>
+        </p:nvSpPr>
+        <p:spPr>
+          <a:xfrm>
+            <a:off x="0" y="2544866"/>
+            <a:ext cx="1138136" cy="1750564"/>
+          </a:xfrm>
+          <a:prstGeom prst="roundRect">
+            <a:avLst>
+              <a:gd name="adj" fmla="val 0"/>
+            </a:avLst>
+          </a:prstGeom>
+          <a:solidFill>
+            <a:srgbClr val="2364AA"/>
+          </a:solidFill>
+          <a:ln w="101600">
+            <a:noFill/>
+          </a:ln>
+        </p:spPr>
+        <p:style>
+          <a:lnRef idx="2">
+            <a:schemeClr val="accent1">
+              <a:shade val="50000"/>
+            </a:schemeClr>
+          </a:lnRef>
+          <a:fillRef idx="1">
+            <a:schemeClr val="accent1"/>
+          </a:fillRef>
+          <a:effectRef idx="0">
+            <a:schemeClr val="accent1"/>
+          </a:effectRef>
+          <a:fontRef idx="minor">
+            <a:schemeClr val="lt1"/>
+          </a:fontRef>
+        </p:style>
+        <p:txBody>
+          <a:bodyPr rtlCol="0" anchor="ctr"/>
+          <a:lstStyle/>
+          <a:p>
+            <a:pPr algn="ctr"/>
+            <a:endParaRPr lang="en-GB" sz="1808">
+              <a:solidFill>
+                <a:srgbClr val="95BFE5"/>
+              </a:solidFill>
+            </a:endParaRPr>
+          </a:p>
+        </p:txBody>
+      </p:sp>
+      <p:sp>
+        <p:nvSpPr>
+          <p:cNvPr id="3" name="TextBox 2">
+            <a:extLst>
+              <a:ext uri="{FF2B5EF4-FFF2-40B4-BE49-F238E27FC236}">
+                <a16:creationId xmlns:a16="http://schemas.microsoft.com/office/drawing/2014/main" id="{56BA9D04-7576-0017-8F07-92AFBC13D6A6}"/>
+              </a:ext>
+            </a:extLst>
+          </p:cNvPr>
+          <p:cNvSpPr txBox="1"/>
+          <p:nvPr/>
+        </p:nvSpPr>
+        <p:spPr>
+          <a:xfrm>
+            <a:off x="1155920" y="2351235"/>
+            <a:ext cx="4584078" cy="1200329"/>
+          </a:xfrm>
+          <a:prstGeom prst="rect">
+            <a:avLst/>
+          </a:prstGeom>
+          <a:noFill/>
+        </p:spPr>
+        <p:txBody>
+          <a:bodyPr wrap="square" rtlCol="0">
+            <a:spAutoFit/>
+          </a:bodyPr>
+          <a:lstStyle/>
+          <a:p>
+            <a:r>
+              <a:rPr lang="en-GB" sz="7200" b="1">
+                <a:solidFill>
+                  <a:schemeClr val="bg1"/>
+                </a:solidFill>
+                <a:latin typeface="Android Insomnia" pitchFamily="2" charset="-128"/>
+                <a:ea typeface="Android Insomnia" pitchFamily="2" charset="-128"/>
+                <a:cs typeface="Android Insomnia" pitchFamily="2" charset="-128"/>
+              </a:rPr>
+              <a:t>causeway</a:t>
+            </a:r>
+          </a:p>
+        </p:txBody>
+      </p:sp>
+      <p:sp>
+        <p:nvSpPr>
+          <p:cNvPr id="10" name="TextBox 9">
+            <a:extLst>
+              <a:ext uri="{FF2B5EF4-FFF2-40B4-BE49-F238E27FC236}">
+                <a16:creationId xmlns:a16="http://schemas.microsoft.com/office/drawing/2014/main" id="{C64F2FFB-CDB5-6BCD-6256-EE2A05FDCE17}"/>
+              </a:ext>
+            </a:extLst>
+          </p:cNvPr>
+          <p:cNvSpPr txBox="1"/>
+          <p:nvPr/>
+        </p:nvSpPr>
+        <p:spPr>
+          <a:xfrm>
+            <a:off x="-75188" y="1760070"/>
+            <a:ext cx="1336806" cy="830997"/>
+          </a:xfrm>
+          <a:prstGeom prst="rect">
+            <a:avLst/>
+          </a:prstGeom>
+          <a:noFill/>
+        </p:spPr>
+        <p:txBody>
+          <a:bodyPr wrap="square" rtlCol="0">
+            <a:spAutoFit/>
+          </a:bodyPr>
+          <a:lstStyle/>
+          <a:p>
+            <a:r>
+              <a:rPr lang="en-US" sz="4800" b="1">
+                <a:solidFill>
+                  <a:schemeClr val="bg1"/>
+                </a:solidFill>
+                <a:latin typeface="Android Insomnia" pitchFamily="2" charset="-128"/>
+                <a:ea typeface="Android Insomnia" pitchFamily="2" charset="-128"/>
+                <a:cs typeface="Android Insomnia" pitchFamily="2" charset="-128"/>
+              </a:rPr>
+              <a:t>asf</a:t>
+            </a:r>
+            <a:endParaRPr lang="en-GB" sz="4800" b="1">
+              <a:solidFill>
+                <a:schemeClr val="bg1"/>
+              </a:solidFill>
+              <a:latin typeface="Android Insomnia" pitchFamily="2" charset="-128"/>
+              <a:ea typeface="Android Insomnia" pitchFamily="2" charset="-128"/>
+              <a:cs typeface="Android Insomnia" pitchFamily="2" charset="-128"/>
+            </a:endParaRPr>
+          </a:p>
+        </p:txBody>
+      </p:sp>
+    </p:spTree>
+    <p:extLst>
+      <p:ext uri="{BB962C8B-B14F-4D97-AF65-F5344CB8AC3E}">
+        <p14:creationId xmlns:p14="http://schemas.microsoft.com/office/powerpoint/2010/main" val="2424248051"/>
+      </p:ext>
+    </p:extLst>
+  </p:cSld>
+  <p:clrMapOvr>
+    <a:masterClrMapping/>
+  </p:clrMapOvr>
+</p:sld>
+</file>
+
+<file path=ppt/slides/slide12.xml><?xml version="1.0" encoding="utf-8"?>
+<p:sld xmlns:a="http://schemas.openxmlformats.org/drawingml/2006/main" xmlns:r="http://schemas.openxmlformats.org/officeDocument/2006/relationships" xmlns:p="http://schemas.openxmlformats.org/presentationml/2006/main">
+  <p:cSld>
+    <p:spTree>
+      <p:nvGrpSpPr>
+        <p:cNvPr id="1" name=""/>
+        <p:cNvGrpSpPr/>
+        <p:nvPr/>
+      </p:nvGrpSpPr>
+      <p:grpSpPr>
+        <a:xfrm>
+          <a:off x="0" y="0"/>
+          <a:ext cx="0" cy="0"/>
+          <a:chOff x="0" y="0"/>
+          <a:chExt cx="0" cy="0"/>
+        </a:xfrm>
+      </p:grpSpPr>
+      <p:sp>
+        <p:nvSpPr>
+          <p:cNvPr id="12" name="Rectangle: Rounded Corners 11">
+            <a:extLst>
+              <a:ext uri="{FF2B5EF4-FFF2-40B4-BE49-F238E27FC236}">
+                <a16:creationId xmlns:a16="http://schemas.microsoft.com/office/drawing/2014/main" id="{A31F33E6-48C6-2F14-D301-2E0B7985B91A}"/>
+              </a:ext>
+            </a:extLst>
+          </p:cNvPr>
+          <p:cNvSpPr/>
+          <p:nvPr/>
+        </p:nvSpPr>
+        <p:spPr>
+          <a:xfrm>
+            <a:off x="0" y="0"/>
+            <a:ext cx="1138136" cy="2509736"/>
+          </a:xfrm>
+          <a:prstGeom prst="roundRect">
+            <a:avLst>
+              <a:gd name="adj" fmla="val 0"/>
+            </a:avLst>
+          </a:prstGeom>
+          <a:solidFill>
+            <a:srgbClr val="5AB1BB"/>
+          </a:solidFill>
+          <a:ln w="101600">
+            <a:noFill/>
+          </a:ln>
+        </p:spPr>
+        <p:style>
+          <a:lnRef idx="2">
+            <a:schemeClr val="accent1">
+              <a:shade val="50000"/>
+            </a:schemeClr>
+          </a:lnRef>
+          <a:fillRef idx="1">
+            <a:schemeClr val="accent1"/>
+          </a:fillRef>
+          <a:effectRef idx="0">
+            <a:schemeClr val="accent1"/>
+          </a:effectRef>
+          <a:fontRef idx="minor">
+            <a:schemeClr val="lt1"/>
+          </a:fontRef>
+        </p:style>
+        <p:txBody>
+          <a:bodyPr rtlCol="0" anchor="ctr"/>
+          <a:lstStyle/>
+          <a:p>
+            <a:pPr algn="ctr"/>
+            <a:endParaRPr lang="en-GB" sz="1808">
+              <a:solidFill>
+                <a:srgbClr val="95BFE5"/>
+              </a:solidFill>
+            </a:endParaRPr>
+          </a:p>
+        </p:txBody>
+      </p:sp>
+      <p:sp>
+        <p:nvSpPr>
+          <p:cNvPr id="6" name="Rectangle: Rounded Corners 5">
+            <a:extLst>
+              <a:ext uri="{FF2B5EF4-FFF2-40B4-BE49-F238E27FC236}">
+                <a16:creationId xmlns:a16="http://schemas.microsoft.com/office/drawing/2014/main" id="{FEC4D2F5-1B5F-8B94-75B0-128AD20C2F6A}"/>
+              </a:ext>
+            </a:extLst>
+          </p:cNvPr>
+          <p:cNvSpPr/>
+          <p:nvPr/>
+        </p:nvSpPr>
+        <p:spPr>
+          <a:xfrm>
+            <a:off x="1175372" y="2544866"/>
+            <a:ext cx="4584078" cy="1750564"/>
+          </a:xfrm>
+          <a:prstGeom prst="roundRect">
+            <a:avLst>
+              <a:gd name="adj" fmla="val 0"/>
+            </a:avLst>
+          </a:prstGeom>
+          <a:solidFill>
+            <a:srgbClr val="7A263A"/>
+          </a:solidFill>
+          <a:ln w="101600">
+            <a:noFill/>
+          </a:ln>
+        </p:spPr>
+        <p:style>
+          <a:lnRef idx="2">
+            <a:schemeClr val="accent1">
+              <a:shade val="50000"/>
+            </a:schemeClr>
+          </a:lnRef>
+          <a:fillRef idx="1">
+            <a:schemeClr val="accent1"/>
+          </a:fillRef>
+          <a:effectRef idx="0">
+            <a:schemeClr val="accent1"/>
+          </a:effectRef>
+          <a:fontRef idx="minor">
+            <a:schemeClr val="lt1"/>
+          </a:fontRef>
+        </p:style>
+        <p:txBody>
+          <a:bodyPr rtlCol="0" anchor="ctr"/>
+          <a:lstStyle/>
+          <a:p>
+            <a:pPr algn="ctr"/>
+            <a:endParaRPr lang="en-GB" sz="1808">
+              <a:solidFill>
+                <a:srgbClr val="95BFE5"/>
+              </a:solidFill>
+            </a:endParaRPr>
+          </a:p>
+        </p:txBody>
+      </p:sp>
+      <p:sp>
+        <p:nvSpPr>
+          <p:cNvPr id="4" name="Rectangle: Rounded Corners 3">
+            <a:extLst>
+              <a:ext uri="{FF2B5EF4-FFF2-40B4-BE49-F238E27FC236}">
+                <a16:creationId xmlns:a16="http://schemas.microsoft.com/office/drawing/2014/main" id="{CAC95C35-1B48-AA1E-545D-C3E97BCC7321}"/>
+              </a:ext>
+            </a:extLst>
+          </p:cNvPr>
+          <p:cNvSpPr/>
+          <p:nvPr/>
+        </p:nvSpPr>
+        <p:spPr>
+          <a:xfrm>
+            <a:off x="1175372" y="-6979"/>
+            <a:ext cx="4584078" cy="2516715"/>
+          </a:xfrm>
+          <a:prstGeom prst="roundRect">
+            <a:avLst>
+              <a:gd name="adj" fmla="val 0"/>
+            </a:avLst>
+          </a:prstGeom>
+          <a:solidFill>
+            <a:srgbClr val="FEC601"/>
+          </a:solidFill>
+          <a:ln w="101600">
+            <a:noFill/>
+          </a:ln>
+        </p:spPr>
+        <p:style>
+          <a:lnRef idx="2">
+            <a:schemeClr val="accent1">
+              <a:shade val="50000"/>
+            </a:schemeClr>
+          </a:lnRef>
+          <a:fillRef idx="1">
+            <a:schemeClr val="accent1"/>
+          </a:fillRef>
+          <a:effectRef idx="0">
+            <a:schemeClr val="accent1"/>
+          </a:effectRef>
+          <a:fontRef idx="minor">
+            <a:schemeClr val="lt1"/>
+          </a:fontRef>
+        </p:style>
+        <p:txBody>
+          <a:bodyPr rtlCol="0" anchor="ctr"/>
+          <a:lstStyle/>
+          <a:p>
+            <a:pPr algn="ctr"/>
+            <a:endParaRPr lang="en-GB" sz="1808">
+              <a:solidFill>
+                <a:srgbClr val="95BFE5"/>
+              </a:solidFill>
+            </a:endParaRPr>
+          </a:p>
+        </p:txBody>
+      </p:sp>
+      <p:sp>
+        <p:nvSpPr>
+          <p:cNvPr id="5" name="Rectangle: Rounded Corners 4">
+            <a:extLst>
+              <a:ext uri="{FF2B5EF4-FFF2-40B4-BE49-F238E27FC236}">
+                <a16:creationId xmlns:a16="http://schemas.microsoft.com/office/drawing/2014/main" id="{4035679B-9375-4A3B-9740-2D1E7E3D6445}"/>
+              </a:ext>
+            </a:extLst>
+          </p:cNvPr>
+          <p:cNvSpPr/>
+          <p:nvPr/>
+        </p:nvSpPr>
+        <p:spPr>
+          <a:xfrm>
+            <a:off x="0" y="2544866"/>
+            <a:ext cx="1138136" cy="1750564"/>
+          </a:xfrm>
+          <a:prstGeom prst="roundRect">
+            <a:avLst>
+              <a:gd name="adj" fmla="val 0"/>
+            </a:avLst>
+          </a:prstGeom>
+          <a:solidFill>
+            <a:srgbClr val="2364AA"/>
+          </a:solidFill>
+          <a:ln w="101600">
+            <a:noFill/>
+          </a:ln>
+        </p:spPr>
+        <p:style>
+          <a:lnRef idx="2">
+            <a:schemeClr val="accent1">
+              <a:shade val="50000"/>
+            </a:schemeClr>
+          </a:lnRef>
+          <a:fillRef idx="1">
+            <a:schemeClr val="accent1"/>
+          </a:fillRef>
+          <a:effectRef idx="0">
+            <a:schemeClr val="accent1"/>
+          </a:effectRef>
+          <a:fontRef idx="minor">
+            <a:schemeClr val="lt1"/>
+          </a:fontRef>
+        </p:style>
+        <p:txBody>
+          <a:bodyPr rtlCol="0" anchor="ctr"/>
+          <a:lstStyle/>
+          <a:p>
+            <a:pPr algn="ctr"/>
+            <a:endParaRPr lang="en-GB" sz="1808">
+              <a:solidFill>
+                <a:srgbClr val="95BFE5"/>
+              </a:solidFill>
+            </a:endParaRPr>
+          </a:p>
+        </p:txBody>
+      </p:sp>
+      <p:sp>
+        <p:nvSpPr>
+          <p:cNvPr id="3" name="TextBox 2">
+            <a:extLst>
+              <a:ext uri="{FF2B5EF4-FFF2-40B4-BE49-F238E27FC236}">
+                <a16:creationId xmlns:a16="http://schemas.microsoft.com/office/drawing/2014/main" id="{56BA9D04-7576-0017-8F07-92AFBC13D6A6}"/>
+              </a:ext>
+            </a:extLst>
+          </p:cNvPr>
+          <p:cNvSpPr txBox="1"/>
+          <p:nvPr/>
+        </p:nvSpPr>
+        <p:spPr>
+          <a:xfrm>
+            <a:off x="1155920" y="2351235"/>
+            <a:ext cx="4584078" cy="1200329"/>
+          </a:xfrm>
+          <a:prstGeom prst="rect">
+            <a:avLst/>
+          </a:prstGeom>
+          <a:noFill/>
+        </p:spPr>
+        <p:txBody>
+          <a:bodyPr wrap="square" rtlCol="0">
+            <a:spAutoFit/>
+          </a:bodyPr>
+          <a:lstStyle/>
+          <a:p>
+            <a:r>
+              <a:rPr lang="en-GB" sz="7200" b="1">
+                <a:solidFill>
+                  <a:schemeClr val="bg1"/>
+                </a:solidFill>
+                <a:latin typeface="Android Insomnia" pitchFamily="2" charset="-128"/>
+                <a:ea typeface="Android Insomnia" pitchFamily="2" charset="-128"/>
+                <a:cs typeface="Android Insomnia" pitchFamily="2" charset="-128"/>
+              </a:rPr>
+              <a:t>causeway</a:t>
+            </a:r>
+          </a:p>
+        </p:txBody>
+      </p:sp>
+      <p:sp>
+        <p:nvSpPr>
+          <p:cNvPr id="10" name="TextBox 9">
+            <a:extLst>
+              <a:ext uri="{FF2B5EF4-FFF2-40B4-BE49-F238E27FC236}">
+                <a16:creationId xmlns:a16="http://schemas.microsoft.com/office/drawing/2014/main" id="{C64F2FFB-CDB5-6BCD-6256-EE2A05FDCE17}"/>
+              </a:ext>
+            </a:extLst>
+          </p:cNvPr>
+          <p:cNvSpPr txBox="1"/>
+          <p:nvPr/>
+        </p:nvSpPr>
+        <p:spPr>
+          <a:xfrm>
+            <a:off x="-75188" y="1760070"/>
+            <a:ext cx="1336806" cy="830997"/>
+          </a:xfrm>
+          <a:prstGeom prst="rect">
+            <a:avLst/>
+          </a:prstGeom>
+          <a:noFill/>
+        </p:spPr>
+        <p:txBody>
+          <a:bodyPr wrap="square" rtlCol="0">
+            <a:spAutoFit/>
+          </a:bodyPr>
+          <a:lstStyle/>
+          <a:p>
+            <a:r>
+              <a:rPr lang="en-US" sz="4800" b="1">
+                <a:solidFill>
+                  <a:schemeClr val="bg1"/>
+                </a:solidFill>
+                <a:latin typeface="Android Insomnia" pitchFamily="2" charset="-128"/>
+                <a:ea typeface="Android Insomnia" pitchFamily="2" charset="-128"/>
+                <a:cs typeface="Android Insomnia" pitchFamily="2" charset="-128"/>
+              </a:rPr>
+              <a:t>asf</a:t>
+            </a:r>
+            <a:endParaRPr lang="en-GB" sz="4800" b="1">
+              <a:solidFill>
+                <a:schemeClr val="bg1"/>
+              </a:solidFill>
+              <a:latin typeface="Android Insomnia" pitchFamily="2" charset="-128"/>
+              <a:ea typeface="Android Insomnia" pitchFamily="2" charset="-128"/>
+              <a:cs typeface="Android Insomnia" pitchFamily="2" charset="-128"/>
+            </a:endParaRPr>
+          </a:p>
+        </p:txBody>
+      </p:sp>
+    </p:spTree>
+    <p:extLst>
+      <p:ext uri="{BB962C8B-B14F-4D97-AF65-F5344CB8AC3E}">
         <p14:creationId xmlns:p14="http://schemas.microsoft.com/office/powerpoint/2010/main" val="1760134204"/>
       </p:ext>
     </p:extLst>
@@ -4383,7 +5095,7 @@
 </p:sld>
 </file>
 
-<file path=ppt/slides/slide11.xml><?xml version="1.0" encoding="utf-8"?>
+<file path=ppt/slides/slide13.xml><?xml version="1.0" encoding="utf-8"?>
 <p:sld xmlns:a="http://schemas.openxmlformats.org/drawingml/2006/main" xmlns:r="http://schemas.openxmlformats.org/officeDocument/2006/relationships" xmlns:p="http://schemas.openxmlformats.org/presentationml/2006/main">
   <p:cSld>
     <p:spTree>
@@ -4863,7 +5575,7 @@
 </p:sld>
 </file>
 
-<file path=ppt/slides/slide12.xml><?xml version="1.0" encoding="utf-8"?>
+<file path=ppt/slides/slide14.xml><?xml version="1.0" encoding="utf-8"?>
 <p:sld xmlns:a="http://schemas.openxmlformats.org/drawingml/2006/main" xmlns:r="http://schemas.openxmlformats.org/officeDocument/2006/relationships" xmlns:p="http://schemas.openxmlformats.org/presentationml/2006/main">
   <p:cSld>
     <p:spTree>
@@ -5332,7 +6044,7 @@
 </p:sld>
 </file>
 
-<file path=ppt/slides/slide13.xml><?xml version="1.0" encoding="utf-8"?>
+<file path=ppt/slides/slide15.xml><?xml version="1.0" encoding="utf-8"?>
 <p:sld xmlns:a="http://schemas.openxmlformats.org/drawingml/2006/main" xmlns:r="http://schemas.openxmlformats.org/officeDocument/2006/relationships" xmlns:p="http://schemas.openxmlformats.org/presentationml/2006/main">
   <p:cSld>
     <p:spTree>
@@ -5802,6 +6514,688 @@
 </file>
 
 <file path=ppt/slides/slide2.xml><?xml version="1.0" encoding="utf-8"?>
+<p:sld xmlns:a="http://schemas.openxmlformats.org/drawingml/2006/main" xmlns:r="http://schemas.openxmlformats.org/officeDocument/2006/relationships" xmlns:p="http://schemas.openxmlformats.org/presentationml/2006/main">
+  <p:cSld>
+    <p:spTree>
+      <p:nvGrpSpPr>
+        <p:cNvPr id="1" name=""/>
+        <p:cNvGrpSpPr/>
+        <p:nvPr/>
+      </p:nvGrpSpPr>
+      <p:grpSpPr>
+        <a:xfrm>
+          <a:off x="0" y="0"/>
+          <a:ext cx="0" cy="0"/>
+          <a:chOff x="0" y="0"/>
+          <a:chExt cx="0" cy="0"/>
+        </a:xfrm>
+      </p:grpSpPr>
+      <p:sp>
+        <p:nvSpPr>
+          <p:cNvPr id="5" name="Rectangle: Rounded Corners 4">
+            <a:extLst>
+              <a:ext uri="{FF2B5EF4-FFF2-40B4-BE49-F238E27FC236}">
+                <a16:creationId xmlns:a16="http://schemas.microsoft.com/office/drawing/2014/main" id="{4035679B-9375-4A3B-9740-2D1E7E3D6445}"/>
+              </a:ext>
+            </a:extLst>
+          </p:cNvPr>
+          <p:cNvSpPr/>
+          <p:nvPr/>
+        </p:nvSpPr>
+        <p:spPr>
+          <a:xfrm>
+            <a:off x="1" y="2888566"/>
+            <a:ext cx="1005184" cy="1391334"/>
+          </a:xfrm>
+          <a:prstGeom prst="roundRect">
+            <a:avLst>
+              <a:gd name="adj" fmla="val 0"/>
+            </a:avLst>
+          </a:prstGeom>
+          <a:solidFill>
+            <a:srgbClr val="7A263A"/>
+          </a:solidFill>
+          <a:ln w="101600">
+            <a:noFill/>
+          </a:ln>
+        </p:spPr>
+        <p:style>
+          <a:lnRef idx="2">
+            <a:schemeClr val="accent1">
+              <a:shade val="50000"/>
+            </a:schemeClr>
+          </a:lnRef>
+          <a:fillRef idx="1">
+            <a:schemeClr val="accent1"/>
+          </a:fillRef>
+          <a:effectRef idx="0">
+            <a:schemeClr val="accent1"/>
+          </a:effectRef>
+          <a:fontRef idx="minor">
+            <a:schemeClr val="lt1"/>
+          </a:fontRef>
+        </p:style>
+        <p:txBody>
+          <a:bodyPr rtlCol="0" anchor="ctr"/>
+          <a:lstStyle/>
+          <a:p>
+            <a:pPr algn="ctr"/>
+            <a:endParaRPr lang="en-GB" sz="1808">
+              <a:solidFill>
+                <a:srgbClr val="95BFE5"/>
+              </a:solidFill>
+            </a:endParaRPr>
+          </a:p>
+        </p:txBody>
+      </p:sp>
+      <p:sp>
+        <p:nvSpPr>
+          <p:cNvPr id="7" name="Rectangle: Rounded Corners 6">
+            <a:extLst>
+              <a:ext uri="{FF2B5EF4-FFF2-40B4-BE49-F238E27FC236}">
+                <a16:creationId xmlns:a16="http://schemas.microsoft.com/office/drawing/2014/main" id="{33E43F3B-B6E1-7210-879B-27AFE9595588}"/>
+              </a:ext>
+            </a:extLst>
+          </p:cNvPr>
+          <p:cNvSpPr/>
+          <p:nvPr/>
+        </p:nvSpPr>
+        <p:spPr>
+          <a:xfrm>
+            <a:off x="0" y="0"/>
+            <a:ext cx="1009007" cy="2888566"/>
+          </a:xfrm>
+          <a:prstGeom prst="roundRect">
+            <a:avLst>
+              <a:gd name="adj" fmla="val 0"/>
+            </a:avLst>
+          </a:prstGeom>
+          <a:solidFill>
+            <a:srgbClr val="EEB4B3"/>
+          </a:solidFill>
+          <a:ln w="101600">
+            <a:noFill/>
+          </a:ln>
+        </p:spPr>
+        <p:style>
+          <a:lnRef idx="2">
+            <a:schemeClr val="accent1">
+              <a:shade val="50000"/>
+            </a:schemeClr>
+          </a:lnRef>
+          <a:fillRef idx="1">
+            <a:schemeClr val="accent1"/>
+          </a:fillRef>
+          <a:effectRef idx="0">
+            <a:schemeClr val="accent1"/>
+          </a:effectRef>
+          <a:fontRef idx="minor">
+            <a:schemeClr val="lt1"/>
+          </a:fontRef>
+        </p:style>
+        <p:txBody>
+          <a:bodyPr rtlCol="0" anchor="ctr"/>
+          <a:lstStyle/>
+          <a:p>
+            <a:pPr algn="ctr"/>
+            <a:endParaRPr lang="en-GB" sz="1808">
+              <a:solidFill>
+                <a:srgbClr val="95BFE5"/>
+              </a:solidFill>
+            </a:endParaRPr>
+          </a:p>
+        </p:txBody>
+      </p:sp>
+      <p:sp>
+        <p:nvSpPr>
+          <p:cNvPr id="6" name="Rectangle: Rounded Corners 5">
+            <a:extLst>
+              <a:ext uri="{FF2B5EF4-FFF2-40B4-BE49-F238E27FC236}">
+                <a16:creationId xmlns:a16="http://schemas.microsoft.com/office/drawing/2014/main" id="{FEC4D2F5-1B5F-8B94-75B0-128AD20C2F6A}"/>
+              </a:ext>
+            </a:extLst>
+          </p:cNvPr>
+          <p:cNvSpPr/>
+          <p:nvPr/>
+        </p:nvSpPr>
+        <p:spPr>
+          <a:xfrm>
+            <a:off x="1005185" y="2888563"/>
+            <a:ext cx="4754809" cy="1391335"/>
+          </a:xfrm>
+          <a:prstGeom prst="roundRect">
+            <a:avLst>
+              <a:gd name="adj" fmla="val 0"/>
+            </a:avLst>
+          </a:prstGeom>
+          <a:solidFill>
+            <a:srgbClr val="5AB1BB"/>
+          </a:solidFill>
+          <a:ln w="101600">
+            <a:noFill/>
+          </a:ln>
+        </p:spPr>
+        <p:style>
+          <a:lnRef idx="2">
+            <a:schemeClr val="accent1">
+              <a:shade val="50000"/>
+            </a:schemeClr>
+          </a:lnRef>
+          <a:fillRef idx="1">
+            <a:schemeClr val="accent1"/>
+          </a:fillRef>
+          <a:effectRef idx="0">
+            <a:schemeClr val="accent1"/>
+          </a:effectRef>
+          <a:fontRef idx="minor">
+            <a:schemeClr val="lt1"/>
+          </a:fontRef>
+        </p:style>
+        <p:txBody>
+          <a:bodyPr rtlCol="0" anchor="ctr"/>
+          <a:lstStyle/>
+          <a:p>
+            <a:pPr algn="ctr"/>
+            <a:endParaRPr lang="en-GB" sz="1808">
+              <a:solidFill>
+                <a:srgbClr val="95BFE5"/>
+              </a:solidFill>
+            </a:endParaRPr>
+          </a:p>
+        </p:txBody>
+      </p:sp>
+      <p:sp>
+        <p:nvSpPr>
+          <p:cNvPr id="4" name="Rectangle: Rounded Corners 3">
+            <a:extLst>
+              <a:ext uri="{FF2B5EF4-FFF2-40B4-BE49-F238E27FC236}">
+                <a16:creationId xmlns:a16="http://schemas.microsoft.com/office/drawing/2014/main" id="{CAC95C35-1B48-AA1E-545D-C3E97BCC7321}"/>
+              </a:ext>
+            </a:extLst>
+          </p:cNvPr>
+          <p:cNvSpPr/>
+          <p:nvPr/>
+        </p:nvSpPr>
+        <p:spPr>
+          <a:xfrm>
+            <a:off x="1009007" y="0"/>
+            <a:ext cx="4750442" cy="2888563"/>
+          </a:xfrm>
+          <a:prstGeom prst="roundRect">
+            <a:avLst>
+              <a:gd name="adj" fmla="val 0"/>
+            </a:avLst>
+          </a:prstGeom>
+          <a:solidFill>
+            <a:srgbClr val="FEC601"/>
+          </a:solidFill>
+          <a:ln w="101600">
+            <a:noFill/>
+          </a:ln>
+        </p:spPr>
+        <p:style>
+          <a:lnRef idx="2">
+            <a:schemeClr val="accent1">
+              <a:shade val="50000"/>
+            </a:schemeClr>
+          </a:lnRef>
+          <a:fillRef idx="1">
+            <a:schemeClr val="accent1"/>
+          </a:fillRef>
+          <a:effectRef idx="0">
+            <a:schemeClr val="accent1"/>
+          </a:effectRef>
+          <a:fontRef idx="minor">
+            <a:schemeClr val="lt1"/>
+          </a:fontRef>
+        </p:style>
+        <p:txBody>
+          <a:bodyPr rtlCol="0" anchor="ctr"/>
+          <a:lstStyle/>
+          <a:p>
+            <a:pPr algn="ctr"/>
+            <a:endParaRPr lang="en-GB" sz="1808">
+              <a:solidFill>
+                <a:srgbClr val="95BFE5"/>
+              </a:solidFill>
+            </a:endParaRPr>
+          </a:p>
+        </p:txBody>
+      </p:sp>
+      <p:sp>
+        <p:nvSpPr>
+          <p:cNvPr id="8" name="Rectangle 7">
+            <a:extLst>
+              <a:ext uri="{FF2B5EF4-FFF2-40B4-BE49-F238E27FC236}">
+                <a16:creationId xmlns:a16="http://schemas.microsoft.com/office/drawing/2014/main" id="{5D4276C9-F9BD-8619-EB66-DEB5749921FA}"/>
+              </a:ext>
+            </a:extLst>
+          </p:cNvPr>
+          <p:cNvSpPr/>
+          <p:nvPr/>
+        </p:nvSpPr>
+        <p:spPr>
+          <a:xfrm>
+            <a:off x="991008" y="0"/>
+            <a:ext cx="18000" cy="4279900"/>
+          </a:xfrm>
+          <a:prstGeom prst="rect">
+            <a:avLst/>
+          </a:prstGeom>
+          <a:solidFill>
+            <a:schemeClr val="bg1"/>
+          </a:solidFill>
+          <a:ln>
+            <a:noFill/>
+          </a:ln>
+        </p:spPr>
+        <p:style>
+          <a:lnRef idx="2">
+            <a:schemeClr val="accent1">
+              <a:shade val="50000"/>
+            </a:schemeClr>
+          </a:lnRef>
+          <a:fillRef idx="1">
+            <a:schemeClr val="accent1"/>
+          </a:fillRef>
+          <a:effectRef idx="0">
+            <a:schemeClr val="accent1"/>
+          </a:effectRef>
+          <a:fontRef idx="minor">
+            <a:schemeClr val="lt1"/>
+          </a:fontRef>
+        </p:style>
+        <p:txBody>
+          <a:bodyPr rtlCol="0" anchor="ctr"/>
+          <a:lstStyle/>
+          <a:p>
+            <a:pPr algn="ctr"/>
+            <a:endParaRPr lang="en-GB"/>
+          </a:p>
+        </p:txBody>
+      </p:sp>
+      <p:sp>
+        <p:nvSpPr>
+          <p:cNvPr id="9" name="Rectangle 8">
+            <a:extLst>
+              <a:ext uri="{FF2B5EF4-FFF2-40B4-BE49-F238E27FC236}">
+                <a16:creationId xmlns:a16="http://schemas.microsoft.com/office/drawing/2014/main" id="{E4D5289E-5595-F824-BC85-D610EDDC6522}"/>
+              </a:ext>
+            </a:extLst>
+          </p:cNvPr>
+          <p:cNvSpPr/>
+          <p:nvPr/>
+        </p:nvSpPr>
+        <p:spPr>
+          <a:xfrm rot="16200000" flipH="1">
+            <a:off x="2877497" y="3336"/>
+            <a:ext cx="18000" cy="5759448"/>
+          </a:xfrm>
+          <a:prstGeom prst="rect">
+            <a:avLst/>
+          </a:prstGeom>
+          <a:solidFill>
+            <a:schemeClr val="bg1"/>
+          </a:solidFill>
+          <a:ln>
+            <a:noFill/>
+          </a:ln>
+        </p:spPr>
+        <p:style>
+          <a:lnRef idx="2">
+            <a:schemeClr val="accent1">
+              <a:shade val="50000"/>
+            </a:schemeClr>
+          </a:lnRef>
+          <a:fillRef idx="1">
+            <a:schemeClr val="accent1"/>
+          </a:fillRef>
+          <a:effectRef idx="0">
+            <a:schemeClr val="accent1"/>
+          </a:effectRef>
+          <a:fontRef idx="minor">
+            <a:schemeClr val="lt1"/>
+          </a:fontRef>
+        </p:style>
+        <p:txBody>
+          <a:bodyPr rtlCol="0" anchor="ctr"/>
+          <a:lstStyle/>
+          <a:p>
+            <a:pPr algn="ctr"/>
+            <a:endParaRPr lang="en-GB"/>
+          </a:p>
+        </p:txBody>
+      </p:sp>
+      <p:sp>
+        <p:nvSpPr>
+          <p:cNvPr id="10" name="Rectangle 9">
+            <a:extLst>
+              <a:ext uri="{FF2B5EF4-FFF2-40B4-BE49-F238E27FC236}">
+                <a16:creationId xmlns:a16="http://schemas.microsoft.com/office/drawing/2014/main" id="{C65601BE-192E-813C-EEB7-CFE305106A10}"/>
+              </a:ext>
+            </a:extLst>
+          </p:cNvPr>
+          <p:cNvSpPr/>
+          <p:nvPr/>
+        </p:nvSpPr>
+        <p:spPr>
+          <a:xfrm>
+            <a:off x="1117" y="-2"/>
+            <a:ext cx="45719" cy="4279900"/>
+          </a:xfrm>
+          <a:prstGeom prst="rect">
+            <a:avLst/>
+          </a:prstGeom>
+          <a:solidFill>
+            <a:schemeClr val="bg1"/>
+          </a:solidFill>
+          <a:ln>
+            <a:noFill/>
+          </a:ln>
+        </p:spPr>
+        <p:style>
+          <a:lnRef idx="2">
+            <a:schemeClr val="accent1">
+              <a:shade val="50000"/>
+            </a:schemeClr>
+          </a:lnRef>
+          <a:fillRef idx="1">
+            <a:schemeClr val="accent1"/>
+          </a:fillRef>
+          <a:effectRef idx="0">
+            <a:schemeClr val="accent1"/>
+          </a:effectRef>
+          <a:fontRef idx="minor">
+            <a:schemeClr val="lt1"/>
+          </a:fontRef>
+        </p:style>
+        <p:txBody>
+          <a:bodyPr rtlCol="0" anchor="ctr"/>
+          <a:lstStyle/>
+          <a:p>
+            <a:pPr algn="ctr"/>
+            <a:endParaRPr lang="en-GB"/>
+          </a:p>
+        </p:txBody>
+      </p:sp>
+      <p:sp>
+        <p:nvSpPr>
+          <p:cNvPr id="11" name="Rectangle 10">
+            <a:extLst>
+              <a:ext uri="{FF2B5EF4-FFF2-40B4-BE49-F238E27FC236}">
+                <a16:creationId xmlns:a16="http://schemas.microsoft.com/office/drawing/2014/main" id="{08037E0D-654E-A639-AD5F-D7B6409DD2A4}"/>
+              </a:ext>
+            </a:extLst>
+          </p:cNvPr>
+          <p:cNvSpPr/>
+          <p:nvPr/>
+        </p:nvSpPr>
+        <p:spPr>
+          <a:xfrm>
+            <a:off x="5725974" y="-2"/>
+            <a:ext cx="45719" cy="4279900"/>
+          </a:xfrm>
+          <a:prstGeom prst="rect">
+            <a:avLst/>
+          </a:prstGeom>
+          <a:solidFill>
+            <a:schemeClr val="bg1"/>
+          </a:solidFill>
+          <a:ln>
+            <a:noFill/>
+          </a:ln>
+        </p:spPr>
+        <p:style>
+          <a:lnRef idx="2">
+            <a:schemeClr val="accent1">
+              <a:shade val="50000"/>
+            </a:schemeClr>
+          </a:lnRef>
+          <a:fillRef idx="1">
+            <a:schemeClr val="accent1"/>
+          </a:fillRef>
+          <a:effectRef idx="0">
+            <a:schemeClr val="accent1"/>
+          </a:effectRef>
+          <a:fontRef idx="minor">
+            <a:schemeClr val="lt1"/>
+          </a:fontRef>
+        </p:style>
+        <p:txBody>
+          <a:bodyPr rtlCol="0" anchor="ctr"/>
+          <a:lstStyle/>
+          <a:p>
+            <a:pPr algn="ctr"/>
+            <a:endParaRPr lang="en-GB"/>
+          </a:p>
+        </p:txBody>
+      </p:sp>
+      <p:sp>
+        <p:nvSpPr>
+          <p:cNvPr id="12" name="Rectangle 11">
+            <a:extLst>
+              <a:ext uri="{FF2B5EF4-FFF2-40B4-BE49-F238E27FC236}">
+                <a16:creationId xmlns:a16="http://schemas.microsoft.com/office/drawing/2014/main" id="{EC667CEE-01F4-9CEB-5FC2-DB9FB45ED64E}"/>
+              </a:ext>
+            </a:extLst>
+          </p:cNvPr>
+          <p:cNvSpPr/>
+          <p:nvPr/>
+        </p:nvSpPr>
+        <p:spPr>
+          <a:xfrm rot="16200000">
+            <a:off x="2870745" y="-2855229"/>
+            <a:ext cx="45719" cy="5756175"/>
+          </a:xfrm>
+          <a:prstGeom prst="rect">
+            <a:avLst/>
+          </a:prstGeom>
+          <a:solidFill>
+            <a:schemeClr val="bg1"/>
+          </a:solidFill>
+          <a:ln>
+            <a:noFill/>
+          </a:ln>
+        </p:spPr>
+        <p:style>
+          <a:lnRef idx="2">
+            <a:schemeClr val="accent1">
+              <a:shade val="50000"/>
+            </a:schemeClr>
+          </a:lnRef>
+          <a:fillRef idx="1">
+            <a:schemeClr val="accent1"/>
+          </a:fillRef>
+          <a:effectRef idx="0">
+            <a:schemeClr val="accent1"/>
+          </a:effectRef>
+          <a:fontRef idx="minor">
+            <a:schemeClr val="lt1"/>
+          </a:fontRef>
+        </p:style>
+        <p:txBody>
+          <a:bodyPr rtlCol="0" anchor="ctr"/>
+          <a:lstStyle/>
+          <a:p>
+            <a:pPr algn="ctr"/>
+            <a:endParaRPr lang="en-GB"/>
+          </a:p>
+        </p:txBody>
+      </p:sp>
+      <p:sp>
+        <p:nvSpPr>
+          <p:cNvPr id="13" name="Rectangle 12">
+            <a:extLst>
+              <a:ext uri="{FF2B5EF4-FFF2-40B4-BE49-F238E27FC236}">
+                <a16:creationId xmlns:a16="http://schemas.microsoft.com/office/drawing/2014/main" id="{AADF7C12-4DEF-223D-E974-D5F4C67D52C8}"/>
+              </a:ext>
+            </a:extLst>
+          </p:cNvPr>
+          <p:cNvSpPr/>
+          <p:nvPr/>
+        </p:nvSpPr>
+        <p:spPr>
+          <a:xfrm rot="16200000">
+            <a:off x="2855225" y="1387629"/>
+            <a:ext cx="45719" cy="5756175"/>
+          </a:xfrm>
+          <a:prstGeom prst="rect">
+            <a:avLst/>
+          </a:prstGeom>
+          <a:solidFill>
+            <a:schemeClr val="bg1"/>
+          </a:solidFill>
+          <a:ln>
+            <a:noFill/>
+          </a:ln>
+        </p:spPr>
+        <p:style>
+          <a:lnRef idx="2">
+            <a:schemeClr val="accent1">
+              <a:shade val="50000"/>
+            </a:schemeClr>
+          </a:lnRef>
+          <a:fillRef idx="1">
+            <a:schemeClr val="accent1"/>
+          </a:fillRef>
+          <a:effectRef idx="0">
+            <a:schemeClr val="accent1"/>
+          </a:effectRef>
+          <a:fontRef idx="minor">
+            <a:schemeClr val="lt1"/>
+          </a:fontRef>
+        </p:style>
+        <p:txBody>
+          <a:bodyPr rtlCol="0" anchor="ctr"/>
+          <a:lstStyle/>
+          <a:p>
+            <a:pPr algn="ctr"/>
+            <a:endParaRPr lang="en-GB"/>
+          </a:p>
+        </p:txBody>
+      </p:sp>
+    </p:spTree>
+    <p:extLst>
+      <p:ext uri="{BB962C8B-B14F-4D97-AF65-F5344CB8AC3E}">
+        <p14:creationId xmlns:p14="http://schemas.microsoft.com/office/powerpoint/2010/main" val="618369118"/>
+      </p:ext>
+    </p:extLst>
+  </p:cSld>
+  <p:clrMapOvr>
+    <a:masterClrMapping/>
+  </p:clrMapOvr>
+</p:sld>
+</file>
+
+<file path=ppt/slides/slide3.xml><?xml version="1.0" encoding="utf-8"?>
+<p:sld xmlns:a="http://schemas.openxmlformats.org/drawingml/2006/main" xmlns:r="http://schemas.openxmlformats.org/officeDocument/2006/relationships" xmlns:p="http://schemas.openxmlformats.org/presentationml/2006/main">
+  <p:cSld>
+    <p:spTree>
+      <p:nvGrpSpPr>
+        <p:cNvPr id="1" name=""/>
+        <p:cNvGrpSpPr/>
+        <p:nvPr/>
+      </p:nvGrpSpPr>
+      <p:grpSpPr>
+        <a:xfrm>
+          <a:off x="0" y="0"/>
+          <a:ext cx="0" cy="0"/>
+          <a:chOff x="0" y="0"/>
+          <a:chExt cx="0" cy="0"/>
+        </a:xfrm>
+      </p:grpSpPr>
+      <p:sp>
+        <p:nvSpPr>
+          <p:cNvPr id="2" name="TextBox 1">
+            <a:extLst>
+              <a:ext uri="{FF2B5EF4-FFF2-40B4-BE49-F238E27FC236}">
+                <a16:creationId xmlns:a16="http://schemas.microsoft.com/office/drawing/2014/main" id="{8EED776C-72E3-DEDA-D8B3-A0854A7419A4}"/>
+              </a:ext>
+            </a:extLst>
+          </p:cNvPr>
+          <p:cNvSpPr txBox="1"/>
+          <p:nvPr/>
+        </p:nvSpPr>
+        <p:spPr>
+          <a:xfrm>
+            <a:off x="1072045" y="269934"/>
+            <a:ext cx="4682799" cy="1200329"/>
+          </a:xfrm>
+          <a:prstGeom prst="rect">
+            <a:avLst/>
+          </a:prstGeom>
+          <a:noFill/>
+        </p:spPr>
+        <p:txBody>
+          <a:bodyPr wrap="square" rtlCol="0">
+            <a:spAutoFit/>
+          </a:bodyPr>
+          <a:lstStyle/>
+          <a:p>
+            <a:r>
+              <a:rPr lang="en-GB" sz="7200" b="1">
+                <a:solidFill>
+                  <a:srgbClr val="7A263A"/>
+                </a:solidFill>
+                <a:latin typeface="Android Insomnia" pitchFamily="2" charset="-128"/>
+                <a:ea typeface="Android Insomnia" pitchFamily="2" charset="-128"/>
+                <a:cs typeface="Android Insomnia" pitchFamily="2" charset="-128"/>
+              </a:rPr>
+              <a:t>causeway</a:t>
+            </a:r>
+          </a:p>
+        </p:txBody>
+      </p:sp>
+      <p:pic>
+        <p:nvPicPr>
+          <p:cNvPr id="4" name="Picture 3" descr="Shape, treemap chart&#10;&#10;Description automatically generated">
+            <a:extLst>
+              <a:ext uri="{FF2B5EF4-FFF2-40B4-BE49-F238E27FC236}">
+                <a16:creationId xmlns:a16="http://schemas.microsoft.com/office/drawing/2014/main" id="{7C18C310-575D-A2FF-80C9-94A5511BDD1E}"/>
+              </a:ext>
+            </a:extLst>
+          </p:cNvPr>
+          <p:cNvPicPr>
+            <a:picLocks noChangeAspect="1"/>
+          </p:cNvPicPr>
+          <p:nvPr/>
+        </p:nvPicPr>
+        <p:blipFill>
+          <a:blip r:embed="rId2">
+            <a:extLst>
+              <a:ext uri="{28A0092B-C50C-407E-A947-70E740481C1C}">
+                <a14:useLocalDpi xmlns:a14="http://schemas.microsoft.com/office/drawing/2010/main" val="0"/>
+              </a:ext>
+            </a:extLst>
+          </a:blip>
+          <a:stretch>
+            <a:fillRect/>
+          </a:stretch>
+        </p:blipFill>
+        <p:spPr>
+          <a:xfrm>
+            <a:off x="121426" y="536884"/>
+            <a:ext cx="943976" cy="700571"/>
+          </a:xfrm>
+          <a:prstGeom prst="rect">
+            <a:avLst/>
+          </a:prstGeom>
+        </p:spPr>
+      </p:pic>
+    </p:spTree>
+    <p:extLst>
+      <p:ext uri="{BB962C8B-B14F-4D97-AF65-F5344CB8AC3E}">
+        <p14:creationId xmlns:p14="http://schemas.microsoft.com/office/powerpoint/2010/main" val="2397171519"/>
+      </p:ext>
+    </p:extLst>
+  </p:cSld>
+  <p:clrMapOvr>
+    <a:masterClrMapping/>
+  </p:clrMapOvr>
+</p:sld>
+</file>
+
+<file path=ppt/slides/slide4.xml><?xml version="1.0" encoding="utf-8"?>
 <p:sld xmlns:a="http://schemas.openxmlformats.org/drawingml/2006/main" xmlns:r="http://schemas.openxmlformats.org/officeDocument/2006/relationships" xmlns:p="http://schemas.openxmlformats.org/presentationml/2006/main">
   <p:cSld>
     <p:spTree>
@@ -6580,7 +7974,7 @@
 </p:sld>
 </file>
 
-<file path=ppt/slides/slide3.xml><?xml version="1.0" encoding="utf-8"?>
+<file path=ppt/slides/slide5.xml><?xml version="1.0" encoding="utf-8"?>
 <p:sld xmlns:a="http://schemas.openxmlformats.org/drawingml/2006/main" xmlns:r="http://schemas.openxmlformats.org/officeDocument/2006/relationships" xmlns:p="http://schemas.openxmlformats.org/presentationml/2006/main">
   <p:cSld>
     <p:spTree>
@@ -7029,922 +8423,6 @@
     <p:extLst>
       <p:ext uri="{BB962C8B-B14F-4D97-AF65-F5344CB8AC3E}">
         <p14:creationId xmlns:p14="http://schemas.microsoft.com/office/powerpoint/2010/main" val="3200045194"/>
-      </p:ext>
-    </p:extLst>
-  </p:cSld>
-  <p:clrMapOvr>
-    <a:masterClrMapping/>
-  </p:clrMapOvr>
-</p:sld>
-</file>
-
-<file path=ppt/slides/slide4.xml><?xml version="1.0" encoding="utf-8"?>
-<p:sld xmlns:a="http://schemas.openxmlformats.org/drawingml/2006/main" xmlns:r="http://schemas.openxmlformats.org/officeDocument/2006/relationships" xmlns:p="http://schemas.openxmlformats.org/presentationml/2006/main">
-  <p:cSld>
-    <p:spTree>
-      <p:nvGrpSpPr>
-        <p:cNvPr id="1" name=""/>
-        <p:cNvGrpSpPr/>
-        <p:nvPr/>
-      </p:nvGrpSpPr>
-      <p:grpSpPr>
-        <a:xfrm>
-          <a:off x="0" y="0"/>
-          <a:ext cx="0" cy="0"/>
-          <a:chOff x="0" y="0"/>
-          <a:chExt cx="0" cy="0"/>
-        </a:xfrm>
-      </p:grpSpPr>
-      <p:sp>
-        <p:nvSpPr>
-          <p:cNvPr id="5" name="Rectangle: Rounded Corners 4">
-            <a:extLst>
-              <a:ext uri="{FF2B5EF4-FFF2-40B4-BE49-F238E27FC236}">
-                <a16:creationId xmlns:a16="http://schemas.microsoft.com/office/drawing/2014/main" id="{4035679B-9375-4A3B-9740-2D1E7E3D6445}"/>
-              </a:ext>
-            </a:extLst>
-          </p:cNvPr>
-          <p:cNvSpPr/>
-          <p:nvPr/>
-        </p:nvSpPr>
-        <p:spPr>
-          <a:xfrm>
-            <a:off x="1" y="2888566"/>
-            <a:ext cx="965996" cy="1391334"/>
-          </a:xfrm>
-          <a:prstGeom prst="roundRect">
-            <a:avLst>
-              <a:gd name="adj" fmla="val 0"/>
-            </a:avLst>
-          </a:prstGeom>
-          <a:solidFill>
-            <a:srgbClr val="EEB4B3"/>
-          </a:solidFill>
-          <a:ln w="101600">
-            <a:noFill/>
-          </a:ln>
-        </p:spPr>
-        <p:style>
-          <a:lnRef idx="2">
-            <a:schemeClr val="accent1">
-              <a:shade val="50000"/>
-            </a:schemeClr>
-          </a:lnRef>
-          <a:fillRef idx="1">
-            <a:schemeClr val="accent1"/>
-          </a:fillRef>
-          <a:effectRef idx="0">
-            <a:schemeClr val="accent1"/>
-          </a:effectRef>
-          <a:fontRef idx="minor">
-            <a:schemeClr val="lt1"/>
-          </a:fontRef>
-        </p:style>
-        <p:txBody>
-          <a:bodyPr rtlCol="0" anchor="ctr"/>
-          <a:lstStyle/>
-          <a:p>
-            <a:pPr algn="ctr"/>
-            <a:endParaRPr lang="en-GB" sz="1808">
-              <a:solidFill>
-                <a:srgbClr val="95BFE5"/>
-              </a:solidFill>
-            </a:endParaRPr>
-          </a:p>
-        </p:txBody>
-      </p:sp>
-      <p:sp>
-        <p:nvSpPr>
-          <p:cNvPr id="7" name="Rectangle: Rounded Corners 6">
-            <a:extLst>
-              <a:ext uri="{FF2B5EF4-FFF2-40B4-BE49-F238E27FC236}">
-                <a16:creationId xmlns:a16="http://schemas.microsoft.com/office/drawing/2014/main" id="{33E43F3B-B6E1-7210-879B-27AFE9595588}"/>
-              </a:ext>
-            </a:extLst>
-          </p:cNvPr>
-          <p:cNvSpPr/>
-          <p:nvPr/>
-        </p:nvSpPr>
-        <p:spPr>
-          <a:xfrm>
-            <a:off x="1" y="0"/>
-            <a:ext cx="965996" cy="2888566"/>
-          </a:xfrm>
-          <a:prstGeom prst="roundRect">
-            <a:avLst>
-              <a:gd name="adj" fmla="val 0"/>
-            </a:avLst>
-          </a:prstGeom>
-          <a:solidFill>
-            <a:srgbClr val="5AB1BB"/>
-          </a:solidFill>
-          <a:ln w="101600">
-            <a:noFill/>
-          </a:ln>
-        </p:spPr>
-        <p:style>
-          <a:lnRef idx="2">
-            <a:schemeClr val="accent1">
-              <a:shade val="50000"/>
-            </a:schemeClr>
-          </a:lnRef>
-          <a:fillRef idx="1">
-            <a:schemeClr val="accent1"/>
-          </a:fillRef>
-          <a:effectRef idx="0">
-            <a:schemeClr val="accent1"/>
-          </a:effectRef>
-          <a:fontRef idx="minor">
-            <a:schemeClr val="lt1"/>
-          </a:fontRef>
-        </p:style>
-        <p:txBody>
-          <a:bodyPr rtlCol="0" anchor="ctr"/>
-          <a:lstStyle/>
-          <a:p>
-            <a:pPr algn="ctr"/>
-            <a:endParaRPr lang="en-GB" sz="1808">
-              <a:solidFill>
-                <a:srgbClr val="95BFE5"/>
-              </a:solidFill>
-            </a:endParaRPr>
-          </a:p>
-        </p:txBody>
-      </p:sp>
-      <p:sp>
-        <p:nvSpPr>
-          <p:cNvPr id="6" name="Rectangle: Rounded Corners 5">
-            <a:extLst>
-              <a:ext uri="{FF2B5EF4-FFF2-40B4-BE49-F238E27FC236}">
-                <a16:creationId xmlns:a16="http://schemas.microsoft.com/office/drawing/2014/main" id="{FEC4D2F5-1B5F-8B94-75B0-128AD20C2F6A}"/>
-              </a:ext>
-            </a:extLst>
-          </p:cNvPr>
-          <p:cNvSpPr/>
-          <p:nvPr/>
-        </p:nvSpPr>
-        <p:spPr>
-          <a:xfrm>
-            <a:off x="965997" y="2888563"/>
-            <a:ext cx="4793997" cy="1391335"/>
-          </a:xfrm>
-          <a:prstGeom prst="roundRect">
-            <a:avLst>
-              <a:gd name="adj" fmla="val 0"/>
-            </a:avLst>
-          </a:prstGeom>
-          <a:solidFill>
-            <a:srgbClr val="7A263A"/>
-          </a:solidFill>
-          <a:ln w="101600">
-            <a:noFill/>
-          </a:ln>
-        </p:spPr>
-        <p:style>
-          <a:lnRef idx="2">
-            <a:schemeClr val="accent1">
-              <a:shade val="50000"/>
-            </a:schemeClr>
-          </a:lnRef>
-          <a:fillRef idx="1">
-            <a:schemeClr val="accent1"/>
-          </a:fillRef>
-          <a:effectRef idx="0">
-            <a:schemeClr val="accent1"/>
-          </a:effectRef>
-          <a:fontRef idx="minor">
-            <a:schemeClr val="lt1"/>
-          </a:fontRef>
-        </p:style>
-        <p:txBody>
-          <a:bodyPr rtlCol="0" anchor="ctr"/>
-          <a:lstStyle/>
-          <a:p>
-            <a:pPr algn="ctr"/>
-            <a:endParaRPr lang="en-GB" sz="1808">
-              <a:solidFill>
-                <a:srgbClr val="95BFE5"/>
-              </a:solidFill>
-            </a:endParaRPr>
-          </a:p>
-        </p:txBody>
-      </p:sp>
-      <p:sp>
-        <p:nvSpPr>
-          <p:cNvPr id="2" name="TextBox 1">
-            <a:extLst>
-              <a:ext uri="{FF2B5EF4-FFF2-40B4-BE49-F238E27FC236}">
-                <a16:creationId xmlns:a16="http://schemas.microsoft.com/office/drawing/2014/main" id="{4D875408-3E42-5D08-7FED-62C7D1F59918}"/>
-              </a:ext>
-            </a:extLst>
-          </p:cNvPr>
-          <p:cNvSpPr txBox="1"/>
-          <p:nvPr/>
-        </p:nvSpPr>
-        <p:spPr>
-          <a:xfrm rot="16200000">
-            <a:off x="-567708" y="1808118"/>
-            <a:ext cx="2262759" cy="1446550"/>
-          </a:xfrm>
-          <a:prstGeom prst="rect">
-            <a:avLst/>
-          </a:prstGeom>
-          <a:noFill/>
-        </p:spPr>
-        <p:txBody>
-          <a:bodyPr wrap="square" rtlCol="0">
-            <a:spAutoFit/>
-          </a:bodyPr>
-          <a:lstStyle/>
-          <a:p>
-            <a:r>
-              <a:rPr lang="en-GB" sz="8800" b="1">
-                <a:solidFill>
-                  <a:schemeClr val="bg1"/>
-                </a:solidFill>
-                <a:latin typeface="Android Insomnia" pitchFamily="2" charset="-128"/>
-                <a:ea typeface="Android Insomnia" pitchFamily="2" charset="-128"/>
-                <a:cs typeface="Android Insomnia" pitchFamily="2" charset="-128"/>
-              </a:rPr>
-              <a:t>asf</a:t>
-            </a:r>
-          </a:p>
-        </p:txBody>
-      </p:sp>
-      <p:sp>
-        <p:nvSpPr>
-          <p:cNvPr id="4" name="Rectangle: Rounded Corners 3">
-            <a:extLst>
-              <a:ext uri="{FF2B5EF4-FFF2-40B4-BE49-F238E27FC236}">
-                <a16:creationId xmlns:a16="http://schemas.microsoft.com/office/drawing/2014/main" id="{CAC95C35-1B48-AA1E-545D-C3E97BCC7321}"/>
-              </a:ext>
-            </a:extLst>
-          </p:cNvPr>
-          <p:cNvSpPr/>
-          <p:nvPr/>
-        </p:nvSpPr>
-        <p:spPr>
-          <a:xfrm>
-            <a:off x="965997" y="0"/>
-            <a:ext cx="4793452" cy="2888563"/>
-          </a:xfrm>
-          <a:prstGeom prst="roundRect">
-            <a:avLst>
-              <a:gd name="adj" fmla="val 0"/>
-            </a:avLst>
-          </a:prstGeom>
-          <a:solidFill>
-            <a:srgbClr val="FEC601"/>
-          </a:solidFill>
-          <a:ln w="101600">
-            <a:noFill/>
-          </a:ln>
-        </p:spPr>
-        <p:style>
-          <a:lnRef idx="2">
-            <a:schemeClr val="accent1">
-              <a:shade val="50000"/>
-            </a:schemeClr>
-          </a:lnRef>
-          <a:fillRef idx="1">
-            <a:schemeClr val="accent1"/>
-          </a:fillRef>
-          <a:effectRef idx="0">
-            <a:schemeClr val="accent1"/>
-          </a:effectRef>
-          <a:fontRef idx="minor">
-            <a:schemeClr val="lt1"/>
-          </a:fontRef>
-        </p:style>
-        <p:txBody>
-          <a:bodyPr rtlCol="0" anchor="ctr"/>
-          <a:lstStyle/>
-          <a:p>
-            <a:pPr algn="ctr"/>
-            <a:endParaRPr lang="en-GB" sz="1808">
-              <a:solidFill>
-                <a:srgbClr val="95BFE5"/>
-              </a:solidFill>
-            </a:endParaRPr>
-          </a:p>
-        </p:txBody>
-      </p:sp>
-      <p:sp>
-        <p:nvSpPr>
-          <p:cNvPr id="3" name="TextBox 2">
-            <a:extLst>
-              <a:ext uri="{FF2B5EF4-FFF2-40B4-BE49-F238E27FC236}">
-                <a16:creationId xmlns:a16="http://schemas.microsoft.com/office/drawing/2014/main" id="{56BA9D04-7576-0017-8F07-92AFBC13D6A6}"/>
-              </a:ext>
-            </a:extLst>
-          </p:cNvPr>
-          <p:cNvSpPr txBox="1"/>
-          <p:nvPr/>
-        </p:nvSpPr>
-        <p:spPr>
-          <a:xfrm>
-            <a:off x="188643" y="2444114"/>
-            <a:ext cx="5675652" cy="1446550"/>
-          </a:xfrm>
-          <a:prstGeom prst="rect">
-            <a:avLst/>
-          </a:prstGeom>
-          <a:noFill/>
-        </p:spPr>
-        <p:txBody>
-          <a:bodyPr wrap="square" rtlCol="0">
-            <a:spAutoFit/>
-          </a:bodyPr>
-          <a:lstStyle/>
-          <a:p>
-            <a:r>
-              <a:rPr lang="en-GB" sz="8800" b="1">
-                <a:solidFill>
-                  <a:schemeClr val="bg1"/>
-                </a:solidFill>
-                <a:latin typeface="Android Insomnia" pitchFamily="2" charset="-128"/>
-                <a:ea typeface="Android Insomnia" pitchFamily="2" charset="-128"/>
-                <a:cs typeface="Android Insomnia" pitchFamily="2" charset="-128"/>
-              </a:rPr>
-              <a:t>causeway</a:t>
-            </a:r>
-            <a:endParaRPr lang="en-GB" sz="8800" b="1">
-              <a:solidFill>
-                <a:srgbClr val="7A263A"/>
-              </a:solidFill>
-              <a:latin typeface="Android Insomnia" pitchFamily="2" charset="-128"/>
-              <a:ea typeface="Android Insomnia" pitchFamily="2" charset="-128"/>
-              <a:cs typeface="Android Insomnia" pitchFamily="2" charset="-128"/>
-            </a:endParaRPr>
-          </a:p>
-        </p:txBody>
-      </p:sp>
-      <p:sp>
-        <p:nvSpPr>
-          <p:cNvPr id="8" name="Rectangle 7">
-            <a:extLst>
-              <a:ext uri="{FF2B5EF4-FFF2-40B4-BE49-F238E27FC236}">
-                <a16:creationId xmlns:a16="http://schemas.microsoft.com/office/drawing/2014/main" id="{5D4276C9-F9BD-8619-EB66-DEB5749921FA}"/>
-              </a:ext>
-            </a:extLst>
-          </p:cNvPr>
-          <p:cNvSpPr/>
-          <p:nvPr/>
-        </p:nvSpPr>
-        <p:spPr>
-          <a:xfrm>
-            <a:off x="953751" y="0"/>
-            <a:ext cx="18000" cy="4279900"/>
-          </a:xfrm>
-          <a:prstGeom prst="rect">
-            <a:avLst/>
-          </a:prstGeom>
-          <a:solidFill>
-            <a:schemeClr val="bg1"/>
-          </a:solidFill>
-          <a:ln>
-            <a:noFill/>
-          </a:ln>
-        </p:spPr>
-        <p:style>
-          <a:lnRef idx="2">
-            <a:schemeClr val="accent1">
-              <a:shade val="50000"/>
-            </a:schemeClr>
-          </a:lnRef>
-          <a:fillRef idx="1">
-            <a:schemeClr val="accent1"/>
-          </a:fillRef>
-          <a:effectRef idx="0">
-            <a:schemeClr val="accent1"/>
-          </a:effectRef>
-          <a:fontRef idx="minor">
-            <a:schemeClr val="lt1"/>
-          </a:fontRef>
-        </p:style>
-        <p:txBody>
-          <a:bodyPr rtlCol="0" anchor="ctr"/>
-          <a:lstStyle/>
-          <a:p>
-            <a:pPr algn="ctr"/>
-            <a:endParaRPr lang="en-GB"/>
-          </a:p>
-        </p:txBody>
-      </p:sp>
-      <p:sp>
-        <p:nvSpPr>
-          <p:cNvPr id="9" name="Rectangle 8">
-            <a:extLst>
-              <a:ext uri="{FF2B5EF4-FFF2-40B4-BE49-F238E27FC236}">
-                <a16:creationId xmlns:a16="http://schemas.microsoft.com/office/drawing/2014/main" id="{E4D5289E-5595-F824-BC85-D610EDDC6522}"/>
-              </a:ext>
-            </a:extLst>
-          </p:cNvPr>
-          <p:cNvSpPr/>
-          <p:nvPr/>
-        </p:nvSpPr>
-        <p:spPr>
-          <a:xfrm rot="16200000" flipH="1">
-            <a:off x="2870723" y="3336"/>
-            <a:ext cx="18000" cy="5759448"/>
-          </a:xfrm>
-          <a:prstGeom prst="rect">
-            <a:avLst/>
-          </a:prstGeom>
-          <a:solidFill>
-            <a:schemeClr val="bg1"/>
-          </a:solidFill>
-          <a:ln>
-            <a:noFill/>
-          </a:ln>
-        </p:spPr>
-        <p:style>
-          <a:lnRef idx="2">
-            <a:schemeClr val="accent1">
-              <a:shade val="50000"/>
-            </a:schemeClr>
-          </a:lnRef>
-          <a:fillRef idx="1">
-            <a:schemeClr val="accent1"/>
-          </a:fillRef>
-          <a:effectRef idx="0">
-            <a:schemeClr val="accent1"/>
-          </a:effectRef>
-          <a:fontRef idx="minor">
-            <a:schemeClr val="lt1"/>
-          </a:fontRef>
-        </p:style>
-        <p:txBody>
-          <a:bodyPr rtlCol="0" anchor="ctr"/>
-          <a:lstStyle/>
-          <a:p>
-            <a:pPr algn="ctr"/>
-            <a:endParaRPr lang="en-GB"/>
-          </a:p>
-        </p:txBody>
-      </p:sp>
-    </p:spTree>
-    <p:extLst>
-      <p:ext uri="{BB962C8B-B14F-4D97-AF65-F5344CB8AC3E}">
-        <p14:creationId xmlns:p14="http://schemas.microsoft.com/office/powerpoint/2010/main" val="1710341074"/>
-      </p:ext>
-    </p:extLst>
-  </p:cSld>
-  <p:clrMapOvr>
-    <a:masterClrMapping/>
-  </p:clrMapOvr>
-</p:sld>
-</file>
-
-<file path=ppt/slides/slide5.xml><?xml version="1.0" encoding="utf-8"?>
-<p:sld xmlns:a="http://schemas.openxmlformats.org/drawingml/2006/main" xmlns:r="http://schemas.openxmlformats.org/officeDocument/2006/relationships" xmlns:p="http://schemas.openxmlformats.org/presentationml/2006/main">
-  <p:cSld>
-    <p:spTree>
-      <p:nvGrpSpPr>
-        <p:cNvPr id="1" name=""/>
-        <p:cNvGrpSpPr/>
-        <p:nvPr/>
-      </p:nvGrpSpPr>
-      <p:grpSpPr>
-        <a:xfrm>
-          <a:off x="0" y="0"/>
-          <a:ext cx="0" cy="0"/>
-          <a:chOff x="0" y="0"/>
-          <a:chExt cx="0" cy="0"/>
-        </a:xfrm>
-      </p:grpSpPr>
-      <p:sp>
-        <p:nvSpPr>
-          <p:cNvPr id="5" name="Rectangle: Rounded Corners 4">
-            <a:extLst>
-              <a:ext uri="{FF2B5EF4-FFF2-40B4-BE49-F238E27FC236}">
-                <a16:creationId xmlns:a16="http://schemas.microsoft.com/office/drawing/2014/main" id="{4035679B-9375-4A3B-9740-2D1E7E3D6445}"/>
-              </a:ext>
-            </a:extLst>
-          </p:cNvPr>
-          <p:cNvSpPr/>
-          <p:nvPr/>
-        </p:nvSpPr>
-        <p:spPr>
-          <a:xfrm>
-            <a:off x="1" y="2888566"/>
-            <a:ext cx="965996" cy="1391334"/>
-          </a:xfrm>
-          <a:prstGeom prst="roundRect">
-            <a:avLst>
-              <a:gd name="adj" fmla="val 0"/>
-            </a:avLst>
-          </a:prstGeom>
-          <a:solidFill>
-            <a:srgbClr val="5AB1BB"/>
-          </a:solidFill>
-          <a:ln w="101600">
-            <a:noFill/>
-          </a:ln>
-        </p:spPr>
-        <p:style>
-          <a:lnRef idx="2">
-            <a:schemeClr val="accent1">
-              <a:shade val="50000"/>
-            </a:schemeClr>
-          </a:lnRef>
-          <a:fillRef idx="1">
-            <a:schemeClr val="accent1"/>
-          </a:fillRef>
-          <a:effectRef idx="0">
-            <a:schemeClr val="accent1"/>
-          </a:effectRef>
-          <a:fontRef idx="minor">
-            <a:schemeClr val="lt1"/>
-          </a:fontRef>
-        </p:style>
-        <p:txBody>
-          <a:bodyPr rtlCol="0" anchor="ctr"/>
-          <a:lstStyle/>
-          <a:p>
-            <a:pPr algn="ctr"/>
-            <a:endParaRPr lang="en-GB" sz="1808">
-              <a:solidFill>
-                <a:srgbClr val="95BFE5"/>
-              </a:solidFill>
-            </a:endParaRPr>
-          </a:p>
-        </p:txBody>
-      </p:sp>
-      <p:sp>
-        <p:nvSpPr>
-          <p:cNvPr id="7" name="Rectangle: Rounded Corners 6">
-            <a:extLst>
-              <a:ext uri="{FF2B5EF4-FFF2-40B4-BE49-F238E27FC236}">
-                <a16:creationId xmlns:a16="http://schemas.microsoft.com/office/drawing/2014/main" id="{33E43F3B-B6E1-7210-879B-27AFE9595588}"/>
-              </a:ext>
-            </a:extLst>
-          </p:cNvPr>
-          <p:cNvSpPr/>
-          <p:nvPr/>
-        </p:nvSpPr>
-        <p:spPr>
-          <a:xfrm>
-            <a:off x="1" y="0"/>
-            <a:ext cx="965996" cy="2888566"/>
-          </a:xfrm>
-          <a:prstGeom prst="roundRect">
-            <a:avLst>
-              <a:gd name="adj" fmla="val 0"/>
-            </a:avLst>
-          </a:prstGeom>
-          <a:solidFill>
-            <a:srgbClr val="EEB4B3"/>
-          </a:solidFill>
-          <a:ln w="101600">
-            <a:noFill/>
-          </a:ln>
-        </p:spPr>
-        <p:style>
-          <a:lnRef idx="2">
-            <a:schemeClr val="accent1">
-              <a:shade val="50000"/>
-            </a:schemeClr>
-          </a:lnRef>
-          <a:fillRef idx="1">
-            <a:schemeClr val="accent1"/>
-          </a:fillRef>
-          <a:effectRef idx="0">
-            <a:schemeClr val="accent1"/>
-          </a:effectRef>
-          <a:fontRef idx="minor">
-            <a:schemeClr val="lt1"/>
-          </a:fontRef>
-        </p:style>
-        <p:txBody>
-          <a:bodyPr rtlCol="0" anchor="ctr"/>
-          <a:lstStyle/>
-          <a:p>
-            <a:pPr algn="ctr"/>
-            <a:endParaRPr lang="en-GB" sz="1808">
-              <a:solidFill>
-                <a:srgbClr val="95BFE5"/>
-              </a:solidFill>
-            </a:endParaRPr>
-          </a:p>
-        </p:txBody>
-      </p:sp>
-      <p:sp>
-        <p:nvSpPr>
-          <p:cNvPr id="6" name="Rectangle: Rounded Corners 5">
-            <a:extLst>
-              <a:ext uri="{FF2B5EF4-FFF2-40B4-BE49-F238E27FC236}">
-                <a16:creationId xmlns:a16="http://schemas.microsoft.com/office/drawing/2014/main" id="{FEC4D2F5-1B5F-8B94-75B0-128AD20C2F6A}"/>
-              </a:ext>
-            </a:extLst>
-          </p:cNvPr>
-          <p:cNvSpPr/>
-          <p:nvPr/>
-        </p:nvSpPr>
-        <p:spPr>
-          <a:xfrm>
-            <a:off x="965997" y="2888563"/>
-            <a:ext cx="4793997" cy="1391335"/>
-          </a:xfrm>
-          <a:prstGeom prst="roundRect">
-            <a:avLst>
-              <a:gd name="adj" fmla="val 0"/>
-            </a:avLst>
-          </a:prstGeom>
-          <a:solidFill>
-            <a:srgbClr val="7A263A"/>
-          </a:solidFill>
-          <a:ln w="101600">
-            <a:noFill/>
-          </a:ln>
-        </p:spPr>
-        <p:style>
-          <a:lnRef idx="2">
-            <a:schemeClr val="accent1">
-              <a:shade val="50000"/>
-            </a:schemeClr>
-          </a:lnRef>
-          <a:fillRef idx="1">
-            <a:schemeClr val="accent1"/>
-          </a:fillRef>
-          <a:effectRef idx="0">
-            <a:schemeClr val="accent1"/>
-          </a:effectRef>
-          <a:fontRef idx="minor">
-            <a:schemeClr val="lt1"/>
-          </a:fontRef>
-        </p:style>
-        <p:txBody>
-          <a:bodyPr rtlCol="0" anchor="ctr"/>
-          <a:lstStyle/>
-          <a:p>
-            <a:pPr algn="ctr"/>
-            <a:endParaRPr lang="en-GB" sz="1808">
-              <a:solidFill>
-                <a:srgbClr val="95BFE5"/>
-              </a:solidFill>
-            </a:endParaRPr>
-          </a:p>
-        </p:txBody>
-      </p:sp>
-      <p:sp>
-        <p:nvSpPr>
-          <p:cNvPr id="2" name="TextBox 1">
-            <a:extLst>
-              <a:ext uri="{FF2B5EF4-FFF2-40B4-BE49-F238E27FC236}">
-                <a16:creationId xmlns:a16="http://schemas.microsoft.com/office/drawing/2014/main" id="{4D875408-3E42-5D08-7FED-62C7D1F59918}"/>
-              </a:ext>
-            </a:extLst>
-          </p:cNvPr>
-          <p:cNvSpPr txBox="1"/>
-          <p:nvPr/>
-        </p:nvSpPr>
-        <p:spPr>
-          <a:xfrm rot="16200000">
-            <a:off x="-567708" y="1808118"/>
-            <a:ext cx="2262759" cy="1446550"/>
-          </a:xfrm>
-          <a:prstGeom prst="rect">
-            <a:avLst/>
-          </a:prstGeom>
-          <a:noFill/>
-        </p:spPr>
-        <p:txBody>
-          <a:bodyPr wrap="square" rtlCol="0">
-            <a:spAutoFit/>
-          </a:bodyPr>
-          <a:lstStyle/>
-          <a:p>
-            <a:r>
-              <a:rPr lang="en-GB" sz="8800" b="1">
-                <a:solidFill>
-                  <a:schemeClr val="bg1"/>
-                </a:solidFill>
-                <a:latin typeface="Android Insomnia" pitchFamily="2" charset="-128"/>
-                <a:ea typeface="Android Insomnia" pitchFamily="2" charset="-128"/>
-                <a:cs typeface="Android Insomnia" pitchFamily="2" charset="-128"/>
-              </a:rPr>
-              <a:t>asf</a:t>
-            </a:r>
-          </a:p>
-        </p:txBody>
-      </p:sp>
-      <p:sp>
-        <p:nvSpPr>
-          <p:cNvPr id="4" name="Rectangle: Rounded Corners 3">
-            <a:extLst>
-              <a:ext uri="{FF2B5EF4-FFF2-40B4-BE49-F238E27FC236}">
-                <a16:creationId xmlns:a16="http://schemas.microsoft.com/office/drawing/2014/main" id="{CAC95C35-1B48-AA1E-545D-C3E97BCC7321}"/>
-              </a:ext>
-            </a:extLst>
-          </p:cNvPr>
-          <p:cNvSpPr/>
-          <p:nvPr/>
-        </p:nvSpPr>
-        <p:spPr>
-          <a:xfrm>
-            <a:off x="965997" y="0"/>
-            <a:ext cx="4793452" cy="2888563"/>
-          </a:xfrm>
-          <a:prstGeom prst="roundRect">
-            <a:avLst>
-              <a:gd name="adj" fmla="val 0"/>
-            </a:avLst>
-          </a:prstGeom>
-          <a:solidFill>
-            <a:srgbClr val="FEC601"/>
-          </a:solidFill>
-          <a:ln w="101600">
-            <a:noFill/>
-          </a:ln>
-        </p:spPr>
-        <p:style>
-          <a:lnRef idx="2">
-            <a:schemeClr val="accent1">
-              <a:shade val="50000"/>
-            </a:schemeClr>
-          </a:lnRef>
-          <a:fillRef idx="1">
-            <a:schemeClr val="accent1"/>
-          </a:fillRef>
-          <a:effectRef idx="0">
-            <a:schemeClr val="accent1"/>
-          </a:effectRef>
-          <a:fontRef idx="minor">
-            <a:schemeClr val="lt1"/>
-          </a:fontRef>
-        </p:style>
-        <p:txBody>
-          <a:bodyPr rtlCol="0" anchor="ctr"/>
-          <a:lstStyle/>
-          <a:p>
-            <a:pPr algn="ctr"/>
-            <a:endParaRPr lang="en-GB" sz="1808">
-              <a:solidFill>
-                <a:srgbClr val="95BFE5"/>
-              </a:solidFill>
-            </a:endParaRPr>
-          </a:p>
-        </p:txBody>
-      </p:sp>
-      <p:sp>
-        <p:nvSpPr>
-          <p:cNvPr id="3" name="TextBox 2">
-            <a:extLst>
-              <a:ext uri="{FF2B5EF4-FFF2-40B4-BE49-F238E27FC236}">
-                <a16:creationId xmlns:a16="http://schemas.microsoft.com/office/drawing/2014/main" id="{56BA9D04-7576-0017-8F07-92AFBC13D6A6}"/>
-              </a:ext>
-            </a:extLst>
-          </p:cNvPr>
-          <p:cNvSpPr txBox="1"/>
-          <p:nvPr/>
-        </p:nvSpPr>
-        <p:spPr>
-          <a:xfrm>
-            <a:off x="188643" y="2444114"/>
-            <a:ext cx="5675652" cy="1446550"/>
-          </a:xfrm>
-          <a:prstGeom prst="rect">
-            <a:avLst/>
-          </a:prstGeom>
-          <a:noFill/>
-        </p:spPr>
-        <p:txBody>
-          <a:bodyPr wrap="square" rtlCol="0">
-            <a:spAutoFit/>
-          </a:bodyPr>
-          <a:lstStyle/>
-          <a:p>
-            <a:r>
-              <a:rPr lang="en-GB" sz="8800" b="1">
-                <a:solidFill>
-                  <a:schemeClr val="bg1"/>
-                </a:solidFill>
-                <a:latin typeface="Android Insomnia" pitchFamily="2" charset="-128"/>
-                <a:ea typeface="Android Insomnia" pitchFamily="2" charset="-128"/>
-                <a:cs typeface="Android Insomnia" pitchFamily="2" charset="-128"/>
-              </a:rPr>
-              <a:t>causeway</a:t>
-            </a:r>
-            <a:endParaRPr lang="en-GB" sz="8800" b="1">
-              <a:solidFill>
-                <a:srgbClr val="7A263A"/>
-              </a:solidFill>
-              <a:latin typeface="Android Insomnia" pitchFamily="2" charset="-128"/>
-              <a:ea typeface="Android Insomnia" pitchFamily="2" charset="-128"/>
-              <a:cs typeface="Android Insomnia" pitchFamily="2" charset="-128"/>
-            </a:endParaRPr>
-          </a:p>
-        </p:txBody>
-      </p:sp>
-      <p:sp>
-        <p:nvSpPr>
-          <p:cNvPr id="8" name="Rectangle 7">
-            <a:extLst>
-              <a:ext uri="{FF2B5EF4-FFF2-40B4-BE49-F238E27FC236}">
-                <a16:creationId xmlns:a16="http://schemas.microsoft.com/office/drawing/2014/main" id="{5D4276C9-F9BD-8619-EB66-DEB5749921FA}"/>
-              </a:ext>
-            </a:extLst>
-          </p:cNvPr>
-          <p:cNvSpPr/>
-          <p:nvPr/>
-        </p:nvSpPr>
-        <p:spPr>
-          <a:xfrm>
-            <a:off x="953751" y="0"/>
-            <a:ext cx="18000" cy="4279900"/>
-          </a:xfrm>
-          <a:prstGeom prst="rect">
-            <a:avLst/>
-          </a:prstGeom>
-          <a:solidFill>
-            <a:schemeClr val="bg1"/>
-          </a:solidFill>
-          <a:ln>
-            <a:noFill/>
-          </a:ln>
-        </p:spPr>
-        <p:style>
-          <a:lnRef idx="2">
-            <a:schemeClr val="accent1">
-              <a:shade val="50000"/>
-            </a:schemeClr>
-          </a:lnRef>
-          <a:fillRef idx="1">
-            <a:schemeClr val="accent1"/>
-          </a:fillRef>
-          <a:effectRef idx="0">
-            <a:schemeClr val="accent1"/>
-          </a:effectRef>
-          <a:fontRef idx="minor">
-            <a:schemeClr val="lt1"/>
-          </a:fontRef>
-        </p:style>
-        <p:txBody>
-          <a:bodyPr rtlCol="0" anchor="ctr"/>
-          <a:lstStyle/>
-          <a:p>
-            <a:pPr algn="ctr"/>
-            <a:endParaRPr lang="en-GB"/>
-          </a:p>
-        </p:txBody>
-      </p:sp>
-      <p:sp>
-        <p:nvSpPr>
-          <p:cNvPr id="9" name="Rectangle 8">
-            <a:extLst>
-              <a:ext uri="{FF2B5EF4-FFF2-40B4-BE49-F238E27FC236}">
-                <a16:creationId xmlns:a16="http://schemas.microsoft.com/office/drawing/2014/main" id="{E4D5289E-5595-F824-BC85-D610EDDC6522}"/>
-              </a:ext>
-            </a:extLst>
-          </p:cNvPr>
-          <p:cNvSpPr/>
-          <p:nvPr/>
-        </p:nvSpPr>
-        <p:spPr>
-          <a:xfrm rot="16200000" flipH="1">
-            <a:off x="2870723" y="3336"/>
-            <a:ext cx="18000" cy="5759448"/>
-          </a:xfrm>
-          <a:prstGeom prst="rect">
-            <a:avLst/>
-          </a:prstGeom>
-          <a:solidFill>
-            <a:schemeClr val="bg1"/>
-          </a:solidFill>
-          <a:ln>
-            <a:noFill/>
-          </a:ln>
-        </p:spPr>
-        <p:style>
-          <a:lnRef idx="2">
-            <a:schemeClr val="accent1">
-              <a:shade val="50000"/>
-            </a:schemeClr>
-          </a:lnRef>
-          <a:fillRef idx="1">
-            <a:schemeClr val="accent1"/>
-          </a:fillRef>
-          <a:effectRef idx="0">
-            <a:schemeClr val="accent1"/>
-          </a:effectRef>
-          <a:fontRef idx="minor">
-            <a:schemeClr val="lt1"/>
-          </a:fontRef>
-        </p:style>
-        <p:txBody>
-          <a:bodyPr rtlCol="0" anchor="ctr"/>
-          <a:lstStyle/>
-          <a:p>
-            <a:pPr algn="ctr"/>
-            <a:endParaRPr lang="en-GB"/>
-          </a:p>
-        </p:txBody>
-      </p:sp>
-    </p:spTree>
-    <p:extLst>
-      <p:ext uri="{BB962C8B-B14F-4D97-AF65-F5344CB8AC3E}">
-        <p14:creationId xmlns:p14="http://schemas.microsoft.com/office/powerpoint/2010/main" val="1224057133"/>
       </p:ext>
     </p:extLst>
   </p:cSld>
@@ -7973,10 +8451,10 @@
       </p:grpSpPr>
       <p:sp>
         <p:nvSpPr>
-          <p:cNvPr id="12" name="Rectangle: Rounded Corners 11">
-            <a:extLst>
-              <a:ext uri="{FF2B5EF4-FFF2-40B4-BE49-F238E27FC236}">
-                <a16:creationId xmlns:a16="http://schemas.microsoft.com/office/drawing/2014/main" id="{A31F33E6-48C6-2F14-D301-2E0B7985B91A}"/>
+          <p:cNvPr id="5" name="Rectangle: Rounded Corners 4">
+            <a:extLst>
+              <a:ext uri="{FF2B5EF4-FFF2-40B4-BE49-F238E27FC236}">
+                <a16:creationId xmlns:a16="http://schemas.microsoft.com/office/drawing/2014/main" id="{4035679B-9375-4A3B-9740-2D1E7E3D6445}"/>
               </a:ext>
             </a:extLst>
           </p:cNvPr>
@@ -7985,8 +8463,8 @@
         </p:nvSpPr>
         <p:spPr>
           <a:xfrm>
-            <a:off x="0" y="-6980"/>
-            <a:ext cx="1138136" cy="2509736"/>
+            <a:off x="1" y="2888566"/>
+            <a:ext cx="965996" cy="1391334"/>
           </a:xfrm>
           <a:prstGeom prst="roundRect">
             <a:avLst>
@@ -8031,10 +8509,10 @@
       </p:sp>
       <p:sp>
         <p:nvSpPr>
-          <p:cNvPr id="6" name="Rectangle: Rounded Corners 5">
-            <a:extLst>
-              <a:ext uri="{FF2B5EF4-FFF2-40B4-BE49-F238E27FC236}">
-                <a16:creationId xmlns:a16="http://schemas.microsoft.com/office/drawing/2014/main" id="{FEC4D2F5-1B5F-8B94-75B0-128AD20C2F6A}"/>
+          <p:cNvPr id="7" name="Rectangle: Rounded Corners 6">
+            <a:extLst>
+              <a:ext uri="{FF2B5EF4-FFF2-40B4-BE49-F238E27FC236}">
+                <a16:creationId xmlns:a16="http://schemas.microsoft.com/office/drawing/2014/main" id="{33E43F3B-B6E1-7210-879B-27AFE9595588}"/>
               </a:ext>
             </a:extLst>
           </p:cNvPr>
@@ -8043,8 +8521,8 @@
         </p:nvSpPr>
         <p:spPr>
           <a:xfrm>
-            <a:off x="1175372" y="2544866"/>
-            <a:ext cx="4584078" cy="1735034"/>
+            <a:off x="1" y="0"/>
+            <a:ext cx="965996" cy="2888566"/>
           </a:xfrm>
           <a:prstGeom prst="roundRect">
             <a:avLst>
@@ -8052,7 +8530,7 @@
             </a:avLst>
           </a:prstGeom>
           <a:solidFill>
-            <a:srgbClr val="7A263A"/>
+            <a:srgbClr val="5AB1BB"/>
           </a:solidFill>
           <a:ln w="101600">
             <a:noFill/>
@@ -8089,10 +8567,10 @@
       </p:sp>
       <p:sp>
         <p:nvSpPr>
-          <p:cNvPr id="4" name="Rectangle: Rounded Corners 3">
-            <a:extLst>
-              <a:ext uri="{FF2B5EF4-FFF2-40B4-BE49-F238E27FC236}">
-                <a16:creationId xmlns:a16="http://schemas.microsoft.com/office/drawing/2014/main" id="{CAC95C35-1B48-AA1E-545D-C3E97BCC7321}"/>
+          <p:cNvPr id="6" name="Rectangle: Rounded Corners 5">
+            <a:extLst>
+              <a:ext uri="{FF2B5EF4-FFF2-40B4-BE49-F238E27FC236}">
+                <a16:creationId xmlns:a16="http://schemas.microsoft.com/office/drawing/2014/main" id="{FEC4D2F5-1B5F-8B94-75B0-128AD20C2F6A}"/>
               </a:ext>
             </a:extLst>
           </p:cNvPr>
@@ -8101,8 +8579,8 @@
         </p:nvSpPr>
         <p:spPr>
           <a:xfrm>
-            <a:off x="1175372" y="0"/>
-            <a:ext cx="4584078" cy="2502756"/>
+            <a:off x="965997" y="2888563"/>
+            <a:ext cx="4793997" cy="1391335"/>
           </a:xfrm>
           <a:prstGeom prst="roundRect">
             <a:avLst>
@@ -8110,7 +8588,7 @@
             </a:avLst>
           </a:prstGeom>
           <a:solidFill>
-            <a:srgbClr val="FEC601"/>
+            <a:srgbClr val="7A263A"/>
           </a:solidFill>
           <a:ln w="101600">
             <a:noFill/>
@@ -8147,10 +8625,52 @@
       </p:sp>
       <p:sp>
         <p:nvSpPr>
-          <p:cNvPr id="5" name="Rectangle: Rounded Corners 4">
-            <a:extLst>
-              <a:ext uri="{FF2B5EF4-FFF2-40B4-BE49-F238E27FC236}">
-                <a16:creationId xmlns:a16="http://schemas.microsoft.com/office/drawing/2014/main" id="{4035679B-9375-4A3B-9740-2D1E7E3D6445}"/>
+          <p:cNvPr id="2" name="TextBox 1">
+            <a:extLst>
+              <a:ext uri="{FF2B5EF4-FFF2-40B4-BE49-F238E27FC236}">
+                <a16:creationId xmlns:a16="http://schemas.microsoft.com/office/drawing/2014/main" id="{4D875408-3E42-5D08-7FED-62C7D1F59918}"/>
+              </a:ext>
+            </a:extLst>
+          </p:cNvPr>
+          <p:cNvSpPr txBox="1"/>
+          <p:nvPr/>
+        </p:nvSpPr>
+        <p:spPr>
+          <a:xfrm rot="16200000">
+            <a:off x="-567708" y="1808118"/>
+            <a:ext cx="2262759" cy="1446550"/>
+          </a:xfrm>
+          <a:prstGeom prst="rect">
+            <a:avLst/>
+          </a:prstGeom>
+          <a:noFill/>
+        </p:spPr>
+        <p:txBody>
+          <a:bodyPr wrap="square" rtlCol="0">
+            <a:spAutoFit/>
+          </a:bodyPr>
+          <a:lstStyle/>
+          <a:p>
+            <a:r>
+              <a:rPr lang="en-GB" sz="8800" b="1">
+                <a:solidFill>
+                  <a:schemeClr val="bg1"/>
+                </a:solidFill>
+                <a:latin typeface="Android Insomnia" pitchFamily="2" charset="-128"/>
+                <a:ea typeface="Android Insomnia" pitchFamily="2" charset="-128"/>
+                <a:cs typeface="Android Insomnia" pitchFamily="2" charset="-128"/>
+              </a:rPr>
+              <a:t>asf</a:t>
+            </a:r>
+          </a:p>
+        </p:txBody>
+      </p:sp>
+      <p:sp>
+        <p:nvSpPr>
+          <p:cNvPr id="4" name="Rectangle: Rounded Corners 3">
+            <a:extLst>
+              <a:ext uri="{FF2B5EF4-FFF2-40B4-BE49-F238E27FC236}">
+                <a16:creationId xmlns:a16="http://schemas.microsoft.com/office/drawing/2014/main" id="{CAC95C35-1B48-AA1E-545D-C3E97BCC7321}"/>
               </a:ext>
             </a:extLst>
           </p:cNvPr>
@@ -8159,8 +8679,8 @@
         </p:nvSpPr>
         <p:spPr>
           <a:xfrm>
-            <a:off x="0" y="2544866"/>
-            <a:ext cx="1138136" cy="1735034"/>
+            <a:off x="965997" y="0"/>
+            <a:ext cx="4793452" cy="2888563"/>
           </a:xfrm>
           <a:prstGeom prst="roundRect">
             <a:avLst>
@@ -8168,7 +8688,7 @@
             </a:avLst>
           </a:prstGeom>
           <a:solidFill>
-            <a:srgbClr val="5AB1BB"/>
+            <a:srgbClr val="FEC601"/>
           </a:solidFill>
           <a:ln w="101600">
             <a:noFill/>
@@ -8217,8 +8737,8 @@
         </p:nvSpPr>
         <p:spPr>
           <a:xfrm>
-            <a:off x="1162900" y="2351235"/>
-            <a:ext cx="4584078" cy="1200329"/>
+            <a:off x="188643" y="2444114"/>
+            <a:ext cx="5675652" cy="1446550"/>
           </a:xfrm>
           <a:prstGeom prst="rect">
             <a:avLst/>
@@ -8232,7 +8752,7 @@
           <a:lstStyle/>
           <a:p>
             <a:r>
-              <a:rPr lang="en-GB" sz="7200" b="1">
+              <a:rPr lang="en-GB" sz="8800" b="1">
                 <a:solidFill>
                   <a:schemeClr val="bg1"/>
                 </a:solidFill>
@@ -8242,51 +8762,9 @@
               </a:rPr>
               <a:t>causeway</a:t>
             </a:r>
-          </a:p>
-        </p:txBody>
-      </p:sp>
-      <p:sp>
-        <p:nvSpPr>
-          <p:cNvPr id="10" name="TextBox 9">
-            <a:extLst>
-              <a:ext uri="{FF2B5EF4-FFF2-40B4-BE49-F238E27FC236}">
-                <a16:creationId xmlns:a16="http://schemas.microsoft.com/office/drawing/2014/main" id="{C64F2FFB-CDB5-6BCD-6256-EE2A05FDCE17}"/>
-              </a:ext>
-            </a:extLst>
-          </p:cNvPr>
-          <p:cNvSpPr txBox="1"/>
-          <p:nvPr/>
-        </p:nvSpPr>
-        <p:spPr>
-          <a:xfrm>
-            <a:off x="-75188" y="1760070"/>
-            <a:ext cx="1336806" cy="830997"/>
-          </a:xfrm>
-          <a:prstGeom prst="rect">
-            <a:avLst/>
-          </a:prstGeom>
-          <a:noFill/>
-        </p:spPr>
-        <p:txBody>
-          <a:bodyPr wrap="square" rtlCol="0">
-            <a:spAutoFit/>
-          </a:bodyPr>
-          <a:lstStyle/>
-          <a:p>
-            <a:r>
-              <a:rPr lang="en-US" sz="4800" b="1">
-                <a:solidFill>
-                  <a:schemeClr val="bg1"/>
-                </a:solidFill>
-                <a:latin typeface="Android Insomnia" pitchFamily="2" charset="-128"/>
-                <a:ea typeface="Android Insomnia" pitchFamily="2" charset="-128"/>
-                <a:cs typeface="Android Insomnia" pitchFamily="2" charset="-128"/>
-              </a:rPr>
-              <a:t>asf</a:t>
-            </a:r>
-            <a:endParaRPr lang="en-GB" sz="4800" b="1">
+            <a:endParaRPr lang="en-GB" sz="8800" b="1">
               <a:solidFill>
-                <a:schemeClr val="bg1"/>
+                <a:srgbClr val="7A263A"/>
               </a:solidFill>
               <a:latin typeface="Android Insomnia" pitchFamily="2" charset="-128"/>
               <a:ea typeface="Android Insomnia" pitchFamily="2" charset="-128"/>
@@ -8295,10 +8773,114 @@
           </a:p>
         </p:txBody>
       </p:sp>
+      <p:sp>
+        <p:nvSpPr>
+          <p:cNvPr id="8" name="Rectangle 7">
+            <a:extLst>
+              <a:ext uri="{FF2B5EF4-FFF2-40B4-BE49-F238E27FC236}">
+                <a16:creationId xmlns:a16="http://schemas.microsoft.com/office/drawing/2014/main" id="{5D4276C9-F9BD-8619-EB66-DEB5749921FA}"/>
+              </a:ext>
+            </a:extLst>
+          </p:cNvPr>
+          <p:cNvSpPr/>
+          <p:nvPr/>
+        </p:nvSpPr>
+        <p:spPr>
+          <a:xfrm>
+            <a:off x="953751" y="0"/>
+            <a:ext cx="18000" cy="4279900"/>
+          </a:xfrm>
+          <a:prstGeom prst="rect">
+            <a:avLst/>
+          </a:prstGeom>
+          <a:solidFill>
+            <a:schemeClr val="bg1"/>
+          </a:solidFill>
+          <a:ln>
+            <a:noFill/>
+          </a:ln>
+        </p:spPr>
+        <p:style>
+          <a:lnRef idx="2">
+            <a:schemeClr val="accent1">
+              <a:shade val="50000"/>
+            </a:schemeClr>
+          </a:lnRef>
+          <a:fillRef idx="1">
+            <a:schemeClr val="accent1"/>
+          </a:fillRef>
+          <a:effectRef idx="0">
+            <a:schemeClr val="accent1"/>
+          </a:effectRef>
+          <a:fontRef idx="minor">
+            <a:schemeClr val="lt1"/>
+          </a:fontRef>
+        </p:style>
+        <p:txBody>
+          <a:bodyPr rtlCol="0" anchor="ctr"/>
+          <a:lstStyle/>
+          <a:p>
+            <a:pPr algn="ctr"/>
+            <a:endParaRPr lang="en-GB"/>
+          </a:p>
+        </p:txBody>
+      </p:sp>
+      <p:sp>
+        <p:nvSpPr>
+          <p:cNvPr id="9" name="Rectangle 8">
+            <a:extLst>
+              <a:ext uri="{FF2B5EF4-FFF2-40B4-BE49-F238E27FC236}">
+                <a16:creationId xmlns:a16="http://schemas.microsoft.com/office/drawing/2014/main" id="{E4D5289E-5595-F824-BC85-D610EDDC6522}"/>
+              </a:ext>
+            </a:extLst>
+          </p:cNvPr>
+          <p:cNvSpPr/>
+          <p:nvPr/>
+        </p:nvSpPr>
+        <p:spPr>
+          <a:xfrm rot="16200000" flipH="1">
+            <a:off x="2870723" y="3336"/>
+            <a:ext cx="18000" cy="5759448"/>
+          </a:xfrm>
+          <a:prstGeom prst="rect">
+            <a:avLst/>
+          </a:prstGeom>
+          <a:solidFill>
+            <a:schemeClr val="bg1"/>
+          </a:solidFill>
+          <a:ln>
+            <a:noFill/>
+          </a:ln>
+        </p:spPr>
+        <p:style>
+          <a:lnRef idx="2">
+            <a:schemeClr val="accent1">
+              <a:shade val="50000"/>
+            </a:schemeClr>
+          </a:lnRef>
+          <a:fillRef idx="1">
+            <a:schemeClr val="accent1"/>
+          </a:fillRef>
+          <a:effectRef idx="0">
+            <a:schemeClr val="accent1"/>
+          </a:effectRef>
+          <a:fontRef idx="minor">
+            <a:schemeClr val="lt1"/>
+          </a:fontRef>
+        </p:style>
+        <p:txBody>
+          <a:bodyPr rtlCol="0" anchor="ctr"/>
+          <a:lstStyle/>
+          <a:p>
+            <a:pPr algn="ctr"/>
+            <a:endParaRPr lang="en-GB"/>
+          </a:p>
+        </p:txBody>
+      </p:sp>
     </p:spTree>
     <p:extLst>
       <p:ext uri="{BB962C8B-B14F-4D97-AF65-F5344CB8AC3E}">
-        <p14:creationId xmlns:p14="http://schemas.microsoft.com/office/powerpoint/2010/main" val="237684728"/>
+        <p14:creationId xmlns:p14="http://schemas.microsoft.com/office/powerpoint/2010/main" val="1710341074"/>
       </p:ext>
     </p:extLst>
   </p:cSld>
@@ -8649,10 +9231,114 @@
           </a:p>
         </p:txBody>
       </p:sp>
+      <p:sp>
+        <p:nvSpPr>
+          <p:cNvPr id="8" name="Rectangle 7">
+            <a:extLst>
+              <a:ext uri="{FF2B5EF4-FFF2-40B4-BE49-F238E27FC236}">
+                <a16:creationId xmlns:a16="http://schemas.microsoft.com/office/drawing/2014/main" id="{5D4276C9-F9BD-8619-EB66-DEB5749921FA}"/>
+              </a:ext>
+            </a:extLst>
+          </p:cNvPr>
+          <p:cNvSpPr/>
+          <p:nvPr/>
+        </p:nvSpPr>
+        <p:spPr>
+          <a:xfrm>
+            <a:off x="953751" y="0"/>
+            <a:ext cx="18000" cy="4279900"/>
+          </a:xfrm>
+          <a:prstGeom prst="rect">
+            <a:avLst/>
+          </a:prstGeom>
+          <a:solidFill>
+            <a:schemeClr val="bg1"/>
+          </a:solidFill>
+          <a:ln>
+            <a:noFill/>
+          </a:ln>
+        </p:spPr>
+        <p:style>
+          <a:lnRef idx="2">
+            <a:schemeClr val="accent1">
+              <a:shade val="50000"/>
+            </a:schemeClr>
+          </a:lnRef>
+          <a:fillRef idx="1">
+            <a:schemeClr val="accent1"/>
+          </a:fillRef>
+          <a:effectRef idx="0">
+            <a:schemeClr val="accent1"/>
+          </a:effectRef>
+          <a:fontRef idx="minor">
+            <a:schemeClr val="lt1"/>
+          </a:fontRef>
+        </p:style>
+        <p:txBody>
+          <a:bodyPr rtlCol="0" anchor="ctr"/>
+          <a:lstStyle/>
+          <a:p>
+            <a:pPr algn="ctr"/>
+            <a:endParaRPr lang="en-GB"/>
+          </a:p>
+        </p:txBody>
+      </p:sp>
+      <p:sp>
+        <p:nvSpPr>
+          <p:cNvPr id="9" name="Rectangle 8">
+            <a:extLst>
+              <a:ext uri="{FF2B5EF4-FFF2-40B4-BE49-F238E27FC236}">
+                <a16:creationId xmlns:a16="http://schemas.microsoft.com/office/drawing/2014/main" id="{E4D5289E-5595-F824-BC85-D610EDDC6522}"/>
+              </a:ext>
+            </a:extLst>
+          </p:cNvPr>
+          <p:cNvSpPr/>
+          <p:nvPr/>
+        </p:nvSpPr>
+        <p:spPr>
+          <a:xfrm rot="16200000" flipH="1">
+            <a:off x="2870723" y="3336"/>
+            <a:ext cx="18000" cy="5759448"/>
+          </a:xfrm>
+          <a:prstGeom prst="rect">
+            <a:avLst/>
+          </a:prstGeom>
+          <a:solidFill>
+            <a:schemeClr val="bg1"/>
+          </a:solidFill>
+          <a:ln>
+            <a:noFill/>
+          </a:ln>
+        </p:spPr>
+        <p:style>
+          <a:lnRef idx="2">
+            <a:schemeClr val="accent1">
+              <a:shade val="50000"/>
+            </a:schemeClr>
+          </a:lnRef>
+          <a:fillRef idx="1">
+            <a:schemeClr val="accent1"/>
+          </a:fillRef>
+          <a:effectRef idx="0">
+            <a:schemeClr val="accent1"/>
+          </a:effectRef>
+          <a:fontRef idx="minor">
+            <a:schemeClr val="lt1"/>
+          </a:fontRef>
+        </p:style>
+        <p:txBody>
+          <a:bodyPr rtlCol="0" anchor="ctr"/>
+          <a:lstStyle/>
+          <a:p>
+            <a:pPr algn="ctr"/>
+            <a:endParaRPr lang="en-GB"/>
+          </a:p>
+        </p:txBody>
+      </p:sp>
     </p:spTree>
     <p:extLst>
       <p:ext uri="{BB962C8B-B14F-4D97-AF65-F5344CB8AC3E}">
-        <p14:creationId xmlns:p14="http://schemas.microsoft.com/office/powerpoint/2010/main" val="801946939"/>
+        <p14:creationId xmlns:p14="http://schemas.microsoft.com/office/powerpoint/2010/main" val="1224057133"/>
       </p:ext>
     </p:extLst>
   </p:cSld>
@@ -8693,7 +9379,7 @@
         </p:nvSpPr>
         <p:spPr>
           <a:xfrm>
-            <a:off x="0" y="0"/>
+            <a:off x="0" y="-6980"/>
             <a:ext cx="1138136" cy="2509736"/>
           </a:xfrm>
           <a:prstGeom prst="roundRect">
@@ -8809,8 +9495,8 @@
         </p:nvSpPr>
         <p:spPr>
           <a:xfrm>
-            <a:off x="1175372" y="-13959"/>
-            <a:ext cx="4584078" cy="2516715"/>
+            <a:off x="1175372" y="0"/>
+            <a:ext cx="4584078" cy="2502756"/>
           </a:xfrm>
           <a:prstGeom prst="roundRect">
             <a:avLst>
@@ -8925,7 +9611,7 @@
         </p:nvSpPr>
         <p:spPr>
           <a:xfrm>
-            <a:off x="1155920" y="2351235"/>
+            <a:off x="1162900" y="2351235"/>
             <a:ext cx="4584078" cy="1200329"/>
           </a:xfrm>
           <a:prstGeom prst="rect">
@@ -9006,7 +9692,7 @@
     </p:spTree>
     <p:extLst>
       <p:ext uri="{BB962C8B-B14F-4D97-AF65-F5344CB8AC3E}">
-        <p14:creationId xmlns:p14="http://schemas.microsoft.com/office/powerpoint/2010/main" val="494928356"/>
+        <p14:creationId xmlns:p14="http://schemas.microsoft.com/office/powerpoint/2010/main" val="237684728"/>
       </p:ext>
     </p:extLst>
   </p:cSld>
@@ -9035,10 +9721,10 @@
       </p:grpSpPr>
       <p:sp>
         <p:nvSpPr>
-          <p:cNvPr id="12" name="Rectangle: Rounded Corners 11">
-            <a:extLst>
-              <a:ext uri="{FF2B5EF4-FFF2-40B4-BE49-F238E27FC236}">
-                <a16:creationId xmlns:a16="http://schemas.microsoft.com/office/drawing/2014/main" id="{A31F33E6-48C6-2F14-D301-2E0B7985B91A}"/>
+          <p:cNvPr id="5" name="Rectangle: Rounded Corners 4">
+            <a:extLst>
+              <a:ext uri="{FF2B5EF4-FFF2-40B4-BE49-F238E27FC236}">
+                <a16:creationId xmlns:a16="http://schemas.microsoft.com/office/drawing/2014/main" id="{4035679B-9375-4A3B-9740-2D1E7E3D6445}"/>
               </a:ext>
             </a:extLst>
           </p:cNvPr>
@@ -9047,8 +9733,8 @@
         </p:nvSpPr>
         <p:spPr>
           <a:xfrm>
-            <a:off x="0" y="0"/>
-            <a:ext cx="1138136" cy="2509736"/>
+            <a:off x="1" y="2888566"/>
+            <a:ext cx="965996" cy="1391334"/>
           </a:xfrm>
           <a:prstGeom prst="roundRect">
             <a:avLst>
@@ -9056,7 +9742,7 @@
             </a:avLst>
           </a:prstGeom>
           <a:solidFill>
-            <a:srgbClr val="EEB4B3"/>
+            <a:srgbClr val="5AB1BB"/>
           </a:solidFill>
           <a:ln w="101600">
             <a:noFill/>
@@ -9093,10 +9779,10 @@
       </p:sp>
       <p:sp>
         <p:nvSpPr>
-          <p:cNvPr id="6" name="Rectangle: Rounded Corners 5">
-            <a:extLst>
-              <a:ext uri="{FF2B5EF4-FFF2-40B4-BE49-F238E27FC236}">
-                <a16:creationId xmlns:a16="http://schemas.microsoft.com/office/drawing/2014/main" id="{FEC4D2F5-1B5F-8B94-75B0-128AD20C2F6A}"/>
+          <p:cNvPr id="7" name="Rectangle: Rounded Corners 6">
+            <a:extLst>
+              <a:ext uri="{FF2B5EF4-FFF2-40B4-BE49-F238E27FC236}">
+                <a16:creationId xmlns:a16="http://schemas.microsoft.com/office/drawing/2014/main" id="{33E43F3B-B6E1-7210-879B-27AFE9595588}"/>
               </a:ext>
             </a:extLst>
           </p:cNvPr>
@@ -9105,8 +9791,8 @@
         </p:nvSpPr>
         <p:spPr>
           <a:xfrm>
-            <a:off x="1175372" y="2544866"/>
-            <a:ext cx="4584078" cy="1750564"/>
+            <a:off x="1" y="0"/>
+            <a:ext cx="965996" cy="2888566"/>
           </a:xfrm>
           <a:prstGeom prst="roundRect">
             <a:avLst>
@@ -9114,7 +9800,7 @@
             </a:avLst>
           </a:prstGeom>
           <a:solidFill>
-            <a:srgbClr val="7A263A"/>
+            <a:srgbClr val="EEB4B3"/>
           </a:solidFill>
           <a:ln w="101600">
             <a:noFill/>
@@ -9151,10 +9837,10 @@
       </p:sp>
       <p:sp>
         <p:nvSpPr>
-          <p:cNvPr id="4" name="Rectangle: Rounded Corners 3">
-            <a:extLst>
-              <a:ext uri="{FF2B5EF4-FFF2-40B4-BE49-F238E27FC236}">
-                <a16:creationId xmlns:a16="http://schemas.microsoft.com/office/drawing/2014/main" id="{CAC95C35-1B48-AA1E-545D-C3E97BCC7321}"/>
+          <p:cNvPr id="6" name="Rectangle: Rounded Corners 5">
+            <a:extLst>
+              <a:ext uri="{FF2B5EF4-FFF2-40B4-BE49-F238E27FC236}">
+                <a16:creationId xmlns:a16="http://schemas.microsoft.com/office/drawing/2014/main" id="{FEC4D2F5-1B5F-8B94-75B0-128AD20C2F6A}"/>
               </a:ext>
             </a:extLst>
           </p:cNvPr>
@@ -9163,8 +9849,8 @@
         </p:nvSpPr>
         <p:spPr>
           <a:xfrm>
-            <a:off x="1175372" y="-6979"/>
-            <a:ext cx="4584078" cy="2516715"/>
+            <a:off x="965997" y="2888563"/>
+            <a:ext cx="4793997" cy="1391335"/>
           </a:xfrm>
           <a:prstGeom prst="roundRect">
             <a:avLst>
@@ -9172,7 +9858,7 @@
             </a:avLst>
           </a:prstGeom>
           <a:solidFill>
-            <a:srgbClr val="FEC601"/>
+            <a:srgbClr val="7A263A"/>
           </a:solidFill>
           <a:ln w="101600">
             <a:noFill/>
@@ -9209,10 +9895,52 @@
       </p:sp>
       <p:sp>
         <p:nvSpPr>
-          <p:cNvPr id="5" name="Rectangle: Rounded Corners 4">
-            <a:extLst>
-              <a:ext uri="{FF2B5EF4-FFF2-40B4-BE49-F238E27FC236}">
-                <a16:creationId xmlns:a16="http://schemas.microsoft.com/office/drawing/2014/main" id="{4035679B-9375-4A3B-9740-2D1E7E3D6445}"/>
+          <p:cNvPr id="2" name="TextBox 1">
+            <a:extLst>
+              <a:ext uri="{FF2B5EF4-FFF2-40B4-BE49-F238E27FC236}">
+                <a16:creationId xmlns:a16="http://schemas.microsoft.com/office/drawing/2014/main" id="{4D875408-3E42-5D08-7FED-62C7D1F59918}"/>
+              </a:ext>
+            </a:extLst>
+          </p:cNvPr>
+          <p:cNvSpPr txBox="1"/>
+          <p:nvPr/>
+        </p:nvSpPr>
+        <p:spPr>
+          <a:xfrm rot="16200000">
+            <a:off x="-567708" y="1808118"/>
+            <a:ext cx="2262759" cy="1446550"/>
+          </a:xfrm>
+          <a:prstGeom prst="rect">
+            <a:avLst/>
+          </a:prstGeom>
+          <a:noFill/>
+        </p:spPr>
+        <p:txBody>
+          <a:bodyPr wrap="square" rtlCol="0">
+            <a:spAutoFit/>
+          </a:bodyPr>
+          <a:lstStyle/>
+          <a:p>
+            <a:r>
+              <a:rPr lang="en-GB" sz="8800" b="1">
+                <a:solidFill>
+                  <a:schemeClr val="bg1"/>
+                </a:solidFill>
+                <a:latin typeface="Android Insomnia" pitchFamily="2" charset="-128"/>
+                <a:ea typeface="Android Insomnia" pitchFamily="2" charset="-128"/>
+                <a:cs typeface="Android Insomnia" pitchFamily="2" charset="-128"/>
+              </a:rPr>
+              <a:t>asf</a:t>
+            </a:r>
+          </a:p>
+        </p:txBody>
+      </p:sp>
+      <p:sp>
+        <p:nvSpPr>
+          <p:cNvPr id="4" name="Rectangle: Rounded Corners 3">
+            <a:extLst>
+              <a:ext uri="{FF2B5EF4-FFF2-40B4-BE49-F238E27FC236}">
+                <a16:creationId xmlns:a16="http://schemas.microsoft.com/office/drawing/2014/main" id="{CAC95C35-1B48-AA1E-545D-C3E97BCC7321}"/>
               </a:ext>
             </a:extLst>
           </p:cNvPr>
@@ -9221,8 +9949,8 @@
         </p:nvSpPr>
         <p:spPr>
           <a:xfrm>
-            <a:off x="0" y="2544866"/>
-            <a:ext cx="1138136" cy="1750564"/>
+            <a:off x="965997" y="0"/>
+            <a:ext cx="4793452" cy="2888563"/>
           </a:xfrm>
           <a:prstGeom prst="roundRect">
             <a:avLst>
@@ -9230,7 +9958,7 @@
             </a:avLst>
           </a:prstGeom>
           <a:solidFill>
-            <a:srgbClr val="2364AA"/>
+            <a:srgbClr val="FEC601"/>
           </a:solidFill>
           <a:ln w="101600">
             <a:noFill/>
@@ -9279,8 +10007,8 @@
         </p:nvSpPr>
         <p:spPr>
           <a:xfrm>
-            <a:off x="1155920" y="2351235"/>
-            <a:ext cx="4584078" cy="1200329"/>
+            <a:off x="188643" y="2444114"/>
+            <a:ext cx="5675652" cy="1446550"/>
           </a:xfrm>
           <a:prstGeom prst="rect">
             <a:avLst/>
@@ -9294,7 +10022,7 @@
           <a:lstStyle/>
           <a:p>
             <a:r>
-              <a:rPr lang="en-GB" sz="7200" b="1">
+              <a:rPr lang="en-GB" sz="8800" b="1">
                 <a:solidFill>
                   <a:schemeClr val="bg1"/>
                 </a:solidFill>
@@ -9304,51 +10032,9 @@
               </a:rPr>
               <a:t>causeway</a:t>
             </a:r>
-          </a:p>
-        </p:txBody>
-      </p:sp>
-      <p:sp>
-        <p:nvSpPr>
-          <p:cNvPr id="10" name="TextBox 9">
-            <a:extLst>
-              <a:ext uri="{FF2B5EF4-FFF2-40B4-BE49-F238E27FC236}">
-                <a16:creationId xmlns:a16="http://schemas.microsoft.com/office/drawing/2014/main" id="{C64F2FFB-CDB5-6BCD-6256-EE2A05FDCE17}"/>
-              </a:ext>
-            </a:extLst>
-          </p:cNvPr>
-          <p:cNvSpPr txBox="1"/>
-          <p:nvPr/>
-        </p:nvSpPr>
-        <p:spPr>
-          <a:xfrm>
-            <a:off x="-75188" y="1760070"/>
-            <a:ext cx="1336806" cy="830997"/>
-          </a:xfrm>
-          <a:prstGeom prst="rect">
-            <a:avLst/>
-          </a:prstGeom>
-          <a:noFill/>
-        </p:spPr>
-        <p:txBody>
-          <a:bodyPr wrap="square" rtlCol="0">
-            <a:spAutoFit/>
-          </a:bodyPr>
-          <a:lstStyle/>
-          <a:p>
-            <a:r>
-              <a:rPr lang="en-US" sz="4800" b="1">
-                <a:solidFill>
-                  <a:schemeClr val="bg1"/>
-                </a:solidFill>
-                <a:latin typeface="Android Insomnia" pitchFamily="2" charset="-128"/>
-                <a:ea typeface="Android Insomnia" pitchFamily="2" charset="-128"/>
-                <a:cs typeface="Android Insomnia" pitchFamily="2" charset="-128"/>
-              </a:rPr>
-              <a:t>asf</a:t>
-            </a:r>
-            <a:endParaRPr lang="en-GB" sz="4800" b="1">
+            <a:endParaRPr lang="en-GB" sz="8800" b="1">
               <a:solidFill>
-                <a:schemeClr val="bg1"/>
+                <a:srgbClr val="7A263A"/>
               </a:solidFill>
               <a:latin typeface="Android Insomnia" pitchFamily="2" charset="-128"/>
               <a:ea typeface="Android Insomnia" pitchFamily="2" charset="-128"/>
@@ -9360,7 +10046,7 @@
     </p:spTree>
     <p:extLst>
       <p:ext uri="{BB962C8B-B14F-4D97-AF65-F5344CB8AC3E}">
-        <p14:creationId xmlns:p14="http://schemas.microsoft.com/office/powerpoint/2010/main" val="2424248051"/>
+        <p14:creationId xmlns:p14="http://schemas.microsoft.com/office/powerpoint/2010/main" val="801946939"/>
       </p:ext>
     </p:extLst>
   </p:cSld>

</xml_diff>